<commit_message>
House of Force module changes
* Reorder code vs. diagrams in slides
* Add a better visual for the initial attack idea
* First draft of the solution for the exercise
</commit_message>
<xml_diff>
--- a/modules/house_of_force/house_of_force.pptx
+++ b/modules/house_of_force/house_of_force.pptx
@@ -5,7 +5,7 @@
     <p:sldMasterId id="2147483660" r:id="rId1"/>
   </p:sldMasterIdLst>
   <p:notesMasterIdLst>
-    <p:notesMasterId r:id="rId61"/>
+    <p:notesMasterId r:id="rId63"/>
   </p:notesMasterIdLst>
   <p:sldIdLst>
     <p:sldId id="327" r:id="rId2"/>
@@ -19,7 +19,7 @@
     <p:sldId id="501" r:id="rId10"/>
     <p:sldId id="503" r:id="rId11"/>
     <p:sldId id="506" r:id="rId12"/>
-    <p:sldId id="563" r:id="rId13"/>
+    <p:sldId id="566" r:id="rId13"/>
     <p:sldId id="512" r:id="rId14"/>
     <p:sldId id="507" r:id="rId15"/>
     <p:sldId id="527" r:id="rId16"/>
@@ -32,41 +32,43 @@
     <p:sldId id="564" r:id="rId23"/>
     <p:sldId id="529" r:id="rId24"/>
     <p:sldId id="517" r:id="rId25"/>
-    <p:sldId id="518" r:id="rId26"/>
-    <p:sldId id="520" r:id="rId27"/>
-    <p:sldId id="521" r:id="rId28"/>
-    <p:sldId id="522" r:id="rId29"/>
-    <p:sldId id="516" r:id="rId30"/>
-    <p:sldId id="504" r:id="rId31"/>
-    <p:sldId id="559" r:id="rId32"/>
-    <p:sldId id="525" r:id="rId33"/>
-    <p:sldId id="536" r:id="rId34"/>
-    <p:sldId id="537" r:id="rId35"/>
-    <p:sldId id="531" r:id="rId36"/>
-    <p:sldId id="532" r:id="rId37"/>
-    <p:sldId id="533" r:id="rId38"/>
-    <p:sldId id="535" r:id="rId39"/>
-    <p:sldId id="538" r:id="rId40"/>
-    <p:sldId id="540" r:id="rId41"/>
-    <p:sldId id="546" r:id="rId42"/>
-    <p:sldId id="544" r:id="rId43"/>
-    <p:sldId id="543" r:id="rId44"/>
-    <p:sldId id="542" r:id="rId45"/>
-    <p:sldId id="541" r:id="rId46"/>
-    <p:sldId id="545" r:id="rId47"/>
-    <p:sldId id="552" r:id="rId48"/>
-    <p:sldId id="547" r:id="rId49"/>
-    <p:sldId id="549" r:id="rId50"/>
-    <p:sldId id="550" r:id="rId51"/>
-    <p:sldId id="551" r:id="rId52"/>
-    <p:sldId id="553" r:id="rId53"/>
-    <p:sldId id="554" r:id="rId54"/>
-    <p:sldId id="555" r:id="rId55"/>
-    <p:sldId id="556" r:id="rId56"/>
-    <p:sldId id="505" r:id="rId57"/>
-    <p:sldId id="565" r:id="rId58"/>
-    <p:sldId id="557" r:id="rId59"/>
-    <p:sldId id="524" r:id="rId60"/>
+    <p:sldId id="567" r:id="rId26"/>
+    <p:sldId id="563" r:id="rId27"/>
+    <p:sldId id="518" r:id="rId28"/>
+    <p:sldId id="520" r:id="rId29"/>
+    <p:sldId id="521" r:id="rId30"/>
+    <p:sldId id="522" r:id="rId31"/>
+    <p:sldId id="516" r:id="rId32"/>
+    <p:sldId id="504" r:id="rId33"/>
+    <p:sldId id="559" r:id="rId34"/>
+    <p:sldId id="525" r:id="rId35"/>
+    <p:sldId id="536" r:id="rId36"/>
+    <p:sldId id="537" r:id="rId37"/>
+    <p:sldId id="531" r:id="rId38"/>
+    <p:sldId id="532" r:id="rId39"/>
+    <p:sldId id="533" r:id="rId40"/>
+    <p:sldId id="535" r:id="rId41"/>
+    <p:sldId id="538" r:id="rId42"/>
+    <p:sldId id="540" r:id="rId43"/>
+    <p:sldId id="546" r:id="rId44"/>
+    <p:sldId id="544" r:id="rId45"/>
+    <p:sldId id="543" r:id="rId46"/>
+    <p:sldId id="542" r:id="rId47"/>
+    <p:sldId id="541" r:id="rId48"/>
+    <p:sldId id="545" r:id="rId49"/>
+    <p:sldId id="552" r:id="rId50"/>
+    <p:sldId id="547" r:id="rId51"/>
+    <p:sldId id="549" r:id="rId52"/>
+    <p:sldId id="550" r:id="rId53"/>
+    <p:sldId id="551" r:id="rId54"/>
+    <p:sldId id="553" r:id="rId55"/>
+    <p:sldId id="554" r:id="rId56"/>
+    <p:sldId id="555" r:id="rId57"/>
+    <p:sldId id="556" r:id="rId58"/>
+    <p:sldId id="505" r:id="rId59"/>
+    <p:sldId id="565" r:id="rId60"/>
+    <p:sldId id="557" r:id="rId61"/>
+    <p:sldId id="524" r:id="rId62"/>
   </p:sldIdLst>
   <p:sldSz cx="9144000" cy="5143500" type="screen16x9"/>
   <p:notesSz cx="6858000" cy="9144000"/>
@@ -26444,7 +26446,7 @@
           <a:p>
             <a:fld id="{2DA23E8D-1792-1541-9147-970A8DD8A355}" type="datetimeFigureOut">
               <a:rPr lang="en-US" smtClean="0"/>
-              <a:t>9/19/21</a:t>
+              <a:t>9/22/21</a:t>
             </a:fld>
             <a:endParaRPr lang="en-US" dirty="0"/>
           </a:p>
@@ -26857,6 +26859,99 @@
           <a:lstStyle/>
           <a:p>
             <a:r>
+              <a:rPr lang="en-US" dirty="0"/>
+              <a:t>- Increase the top chunk size range</a:t>
+            </a:r>
+          </a:p>
+          <a:p>
+            <a:r>
+              <a:rPr lang="en-US" dirty="0"/>
+              <a:t>- Move the pointer over the top of some target</a:t>
+            </a:r>
+          </a:p>
+        </p:txBody>
+      </p:sp>
+      <p:sp>
+        <p:nvSpPr>
+          <p:cNvPr id="4" name="Slide Number Placeholder 3"/>
+          <p:cNvSpPr>
+            <a:spLocks noGrp="1"/>
+          </p:cNvSpPr>
+          <p:nvPr>
+            <p:ph type="sldNum" sz="quarter" idx="5"/>
+          </p:nvPr>
+        </p:nvSpPr>
+        <p:spPr/>
+        <p:txBody>
+          <a:bodyPr/>
+          <a:lstStyle/>
+          <a:p>
+            <a:fld id="{AC55928C-CD14-454C-B617-1AFCF9A58596}" type="slidenum">
+              <a:rPr lang="en-US" smtClean="0"/>
+              <a:t>12</a:t>
+            </a:fld>
+            <a:endParaRPr lang="en-US" dirty="0"/>
+          </a:p>
+        </p:txBody>
+      </p:sp>
+    </p:spTree>
+    <p:extLst>
+      <p:ext uri="{BB962C8B-B14F-4D97-AF65-F5344CB8AC3E}">
+        <p14:creationId xmlns:p14="http://schemas.microsoft.com/office/powerpoint/2010/main" val="1026022159"/>
+      </p:ext>
+    </p:extLst>
+  </p:cSld>
+  <p:clrMapOvr>
+    <a:masterClrMapping/>
+  </p:clrMapOvr>
+</p:notes>
+</file>
+
+<file path=ppt/notesSlides/notesSlide3.xml><?xml version="1.0" encoding="utf-8"?>
+<p:notes xmlns:a="http://schemas.openxmlformats.org/drawingml/2006/main" xmlns:r="http://schemas.openxmlformats.org/officeDocument/2006/relationships" xmlns:p="http://schemas.openxmlformats.org/presentationml/2006/main">
+  <p:cSld>
+    <p:spTree>
+      <p:nvGrpSpPr>
+        <p:cNvPr id="1" name=""/>
+        <p:cNvGrpSpPr/>
+        <p:nvPr/>
+      </p:nvGrpSpPr>
+      <p:grpSpPr>
+        <a:xfrm>
+          <a:off x="0" y="0"/>
+          <a:ext cx="0" cy="0"/>
+          <a:chOff x="0" y="0"/>
+          <a:chExt cx="0" cy="0"/>
+        </a:xfrm>
+      </p:grpSpPr>
+      <p:sp>
+        <p:nvSpPr>
+          <p:cNvPr id="2" name="Slide Image Placeholder 1"/>
+          <p:cNvSpPr>
+            <a:spLocks noGrp="1" noRot="1" noChangeAspect="1"/>
+          </p:cNvSpPr>
+          <p:nvPr>
+            <p:ph type="sldImg"/>
+          </p:nvPr>
+        </p:nvSpPr>
+        <p:spPr/>
+      </p:sp>
+      <p:sp>
+        <p:nvSpPr>
+          <p:cNvPr id="3" name="Notes Placeholder 2"/>
+          <p:cNvSpPr>
+            <a:spLocks noGrp="1"/>
+          </p:cNvSpPr>
+          <p:nvPr>
+            <p:ph type="body" idx="1"/>
+          </p:nvPr>
+        </p:nvSpPr>
+        <p:spPr/>
+        <p:txBody>
+          <a:bodyPr/>
+          <a:lstStyle/>
+          <a:p>
+            <a:r>
               <a:rPr lang="en-US" dirty="0" err="1"/>
               <a:t>Morecore</a:t>
             </a:r>
@@ -26916,6 +27011,99 @@
     <p:extLst>
       <p:ext uri="{BB962C8B-B14F-4D97-AF65-F5344CB8AC3E}">
         <p14:creationId xmlns:p14="http://schemas.microsoft.com/office/powerpoint/2010/main" val="887646793"/>
+      </p:ext>
+    </p:extLst>
+  </p:cSld>
+  <p:clrMapOvr>
+    <a:masterClrMapping/>
+  </p:clrMapOvr>
+</p:notes>
+</file>
+
+<file path=ppt/notesSlides/notesSlide4.xml><?xml version="1.0" encoding="utf-8"?>
+<p:notes xmlns:a="http://schemas.openxmlformats.org/drawingml/2006/main" xmlns:r="http://schemas.openxmlformats.org/officeDocument/2006/relationships" xmlns:p="http://schemas.openxmlformats.org/presentationml/2006/main">
+  <p:cSld>
+    <p:spTree>
+      <p:nvGrpSpPr>
+        <p:cNvPr id="1" name=""/>
+        <p:cNvGrpSpPr/>
+        <p:nvPr/>
+      </p:nvGrpSpPr>
+      <p:grpSpPr>
+        <a:xfrm>
+          <a:off x="0" y="0"/>
+          <a:ext cx="0" cy="0"/>
+          <a:chOff x="0" y="0"/>
+          <a:chExt cx="0" cy="0"/>
+        </a:xfrm>
+      </p:grpSpPr>
+      <p:sp>
+        <p:nvSpPr>
+          <p:cNvPr id="2" name="Slide Image Placeholder 1"/>
+          <p:cNvSpPr>
+            <a:spLocks noGrp="1" noRot="1" noChangeAspect="1"/>
+          </p:cNvSpPr>
+          <p:nvPr>
+            <p:ph type="sldImg"/>
+          </p:nvPr>
+        </p:nvSpPr>
+        <p:spPr/>
+      </p:sp>
+      <p:sp>
+        <p:nvSpPr>
+          <p:cNvPr id="3" name="Notes Placeholder 2"/>
+          <p:cNvSpPr>
+            <a:spLocks noGrp="1"/>
+          </p:cNvSpPr>
+          <p:nvPr>
+            <p:ph type="body" idx="1"/>
+          </p:nvPr>
+        </p:nvSpPr>
+        <p:spPr/>
+        <p:txBody>
+          <a:bodyPr/>
+          <a:lstStyle/>
+          <a:p>
+            <a:r>
+              <a:rPr lang="en-US" dirty="0"/>
+              <a:t>Call out the shrinking operation that is underlined</a:t>
+            </a:r>
+          </a:p>
+          <a:p>
+            <a:r>
+              <a:rPr lang="en-US" dirty="0"/>
+              <a:t>Call out the bad ‘if’ statement check.</a:t>
+            </a:r>
+          </a:p>
+        </p:txBody>
+      </p:sp>
+      <p:sp>
+        <p:nvSpPr>
+          <p:cNvPr id="4" name="Slide Number Placeholder 3"/>
+          <p:cNvSpPr>
+            <a:spLocks noGrp="1"/>
+          </p:cNvSpPr>
+          <p:nvPr>
+            <p:ph type="sldNum" sz="quarter" idx="5"/>
+          </p:nvPr>
+        </p:nvSpPr>
+        <p:spPr/>
+        <p:txBody>
+          <a:bodyPr/>
+          <a:lstStyle/>
+          <a:p>
+            <a:fld id="{AC55928C-CD14-454C-B617-1AFCF9A58596}" type="slidenum">
+              <a:rPr lang="en-US" smtClean="0"/>
+              <a:t>26</a:t>
+            </a:fld>
+            <a:endParaRPr lang="en-US" dirty="0"/>
+          </a:p>
+        </p:txBody>
+      </p:sp>
+    </p:spTree>
+    <p:extLst>
+      <p:ext uri="{BB962C8B-B14F-4D97-AF65-F5344CB8AC3E}">
+        <p14:creationId xmlns:p14="http://schemas.microsoft.com/office/powerpoint/2010/main" val="2237338929"/>
       </p:ext>
     </p:extLst>
   </p:cSld>
@@ -27128,7 +27316,7 @@
                 <a:latin typeface="Calibri"/>
               </a:rPr>
               <a:pPr/>
-              <a:t>9/19/21</a:t>
+              <a:t>9/22/21</a:t>
             </a:fld>
             <a:endParaRPr lang="en-US" dirty="0">
               <a:solidFill>
@@ -27381,7 +27569,7 @@
                 <a:latin typeface="Calibri"/>
               </a:rPr>
               <a:pPr/>
-              <a:t>9/19/21</a:t>
+              <a:t>9/22/21</a:t>
             </a:fld>
             <a:endParaRPr lang="en-US" dirty="0">
               <a:solidFill>
@@ -27596,7 +27784,7 @@
                 <a:latin typeface="Calibri"/>
               </a:rPr>
               <a:pPr/>
-              <a:t>9/19/21</a:t>
+              <a:t>9/22/21</a:t>
             </a:fld>
             <a:endParaRPr lang="en-US" dirty="0">
               <a:solidFill>
@@ -27880,7 +28068,7 @@
                 <a:latin typeface="Calibri"/>
               </a:rPr>
               <a:pPr/>
-              <a:t>9/19/21</a:t>
+              <a:t>9/22/21</a:t>
             </a:fld>
             <a:endParaRPr lang="en-US" dirty="0">
               <a:solidFill>
@@ -28222,7 +28410,7 @@
                 <a:latin typeface="Calibri"/>
               </a:rPr>
               <a:pPr/>
-              <a:t>9/19/21</a:t>
+              <a:t>9/22/21</a:t>
             </a:fld>
             <a:endParaRPr lang="en-US" dirty="0">
               <a:solidFill>
@@ -28550,7 +28738,7 @@
                 <a:latin typeface="Calibri"/>
               </a:rPr>
               <a:pPr/>
-              <a:t>9/19/21</a:t>
+              <a:t>9/22/21</a:t>
             </a:fld>
             <a:endParaRPr lang="en-US" dirty="0">
               <a:solidFill>
@@ -29039,7 +29227,7 @@
                 <a:latin typeface="Calibri"/>
               </a:rPr>
               <a:pPr/>
-              <a:t>9/19/21</a:t>
+              <a:t>9/22/21</a:t>
             </a:fld>
             <a:endParaRPr lang="en-US" dirty="0">
               <a:solidFill>
@@ -29222,7 +29410,7 @@
                 <a:latin typeface="Calibri"/>
               </a:rPr>
               <a:pPr/>
-              <a:t>9/19/21</a:t>
+              <a:t>9/22/21</a:t>
             </a:fld>
             <a:endParaRPr lang="en-US" dirty="0">
               <a:solidFill>
@@ -29468,7 +29656,7 @@
                 <a:latin typeface="Calibri"/>
               </a:rPr>
               <a:pPr/>
-              <a:t>9/19/21</a:t>
+              <a:t>9/22/21</a:t>
             </a:fld>
             <a:endParaRPr lang="en-US" dirty="0">
               <a:solidFill>
@@ -29810,7 +29998,7 @@
                 <a:latin typeface="Calibri"/>
               </a:rPr>
               <a:pPr/>
-              <a:t>9/19/21</a:t>
+              <a:t>9/22/21</a:t>
             </a:fld>
             <a:endParaRPr lang="en-US" dirty="0">
               <a:solidFill>
@@ -30102,7 +30290,7 @@
                 <a:latin typeface="Calibri"/>
               </a:rPr>
               <a:pPr/>
-              <a:t>9/19/21</a:t>
+              <a:t>9/22/21</a:t>
             </a:fld>
             <a:endParaRPr lang="en-US" dirty="0">
               <a:solidFill>
@@ -30352,7 +30540,7 @@
                 <a:latin typeface="Calibri"/>
               </a:rPr>
               <a:pPr defTabSz="914400"/>
-              <a:t>9/19/21</a:t>
+              <a:t>9/22/21</a:t>
             </a:fld>
             <a:endParaRPr lang="en-US" dirty="0">
               <a:solidFill>
@@ -31396,10 +31584,10 @@
       </p:grpSpPr>
       <p:sp>
         <p:nvSpPr>
-          <p:cNvPr id="2" name="Title 1">
+          <p:cNvPr id="17" name="Title 1">
             <a:extLst>
               <a:ext uri="{FF2B5EF4-FFF2-40B4-BE49-F238E27FC236}">
-                <a16:creationId xmlns:a16="http://schemas.microsoft.com/office/drawing/2014/main" id="{FCB0CC07-4340-E940-9C92-652BD57A446B}"/>
+                <a16:creationId xmlns:a16="http://schemas.microsoft.com/office/drawing/2014/main" id="{A2D2500C-0B6C-40FF-995B-2B24638597BF}"/>
               </a:ext>
             </a:extLst>
           </p:cNvPr>
@@ -31412,160 +31600,27 @@
         </p:nvSpPr>
         <p:spPr>
           <a:xfrm>
-            <a:off x="629841" y="342900"/>
-            <a:ext cx="2949178" cy="1200150"/>
+            <a:off x="985919" y="77602"/>
+            <a:ext cx="7886700" cy="994172"/>
           </a:xfrm>
         </p:spPr>
         <p:txBody>
-          <a:bodyPr anchor="b">
-            <a:normAutofit/>
-          </a:bodyPr>
+          <a:bodyPr/>
           <a:lstStyle/>
           <a:p>
             <a:r>
               <a:rPr lang="en-US" dirty="0"/>
-              <a:t>Havoc Causing </a:t>
-            </a:r>
-            <a:r>
-              <a:rPr lang="en-US" dirty="0">
-                <a:sym typeface="Wingdings" pitchFamily="2" charset="2"/>
-              </a:rPr>
-              <a:t></a:t>
-            </a:r>
-            <a:endParaRPr lang="en-US" dirty="0"/>
-          </a:p>
-        </p:txBody>
-      </p:sp>
-      <p:sp>
-        <p:nvSpPr>
-          <p:cNvPr id="14" name="Text Placeholder 3">
-            <a:extLst>
-              <a:ext uri="{FF2B5EF4-FFF2-40B4-BE49-F238E27FC236}">
-                <a16:creationId xmlns:a16="http://schemas.microsoft.com/office/drawing/2014/main" id="{60FA88BD-D51B-474C-A880-FE8812476686}"/>
-              </a:ext>
-            </a:extLst>
-          </p:cNvPr>
-          <p:cNvSpPr>
-            <a:spLocks noGrp="1"/>
-          </p:cNvSpPr>
-          <p:nvPr>
-            <p:ph type="body" sz="half" idx="2"/>
-          </p:nvPr>
-        </p:nvSpPr>
-        <p:spPr>
-          <a:xfrm>
-            <a:off x="629841" y="1543052"/>
-            <a:ext cx="2949178" cy="2858691"/>
-          </a:xfrm>
-        </p:spPr>
-        <p:txBody>
-          <a:bodyPr>
-            <a:normAutofit lnSpcReduction="10000"/>
-          </a:bodyPr>
-          <a:lstStyle/>
-          <a:p>
-            <a:pPr marL="285750" indent="-285750">
-              <a:buFont typeface="Arial" panose="020B0604020202020204" pitchFamily="34" charset="0"/>
-              <a:buChar char="•"/>
-            </a:pPr>
-            <a:r>
-              <a:rPr lang="en-US" dirty="0"/>
-              <a:t>Victim: </a:t>
-            </a:r>
-          </a:p>
-          <a:p>
-            <a:pPr marL="742950" lvl="1" indent="-285750">
-              <a:buFont typeface="Arial" panose="020B0604020202020204" pitchFamily="34" charset="0"/>
-              <a:buChar char="•"/>
-            </a:pPr>
-            <a:r>
-              <a:rPr lang="en-US" dirty="0"/>
-              <a:t>Pointer to the top chunk</a:t>
-            </a:r>
-          </a:p>
-          <a:p>
-            <a:pPr marL="285750" indent="-285750">
-              <a:buFont typeface="Arial" panose="020B0604020202020204" pitchFamily="34" charset="0"/>
-              <a:buChar char="•"/>
-            </a:pPr>
-            <a:r>
-              <a:rPr lang="en-US" dirty="0"/>
-              <a:t>Size: </a:t>
-            </a:r>
-          </a:p>
-          <a:p>
-            <a:pPr marL="742950" lvl="1" indent="-285750">
-              <a:buFont typeface="Arial" panose="020B0604020202020204" pitchFamily="34" charset="0"/>
-              <a:buChar char="•"/>
-            </a:pPr>
-            <a:r>
-              <a:rPr lang="en-US" dirty="0"/>
-              <a:t>Size of the top chunk</a:t>
-            </a:r>
-          </a:p>
-          <a:p>
-            <a:pPr marL="285750" indent="-285750">
-              <a:buFont typeface="Arial" panose="020B0604020202020204" pitchFamily="34" charset="0"/>
-              <a:buChar char="•"/>
-            </a:pPr>
-            <a:r>
-              <a:rPr lang="en-US" dirty="0" err="1"/>
-              <a:t>Nb</a:t>
-            </a:r>
-            <a:r>
-              <a:rPr lang="en-US" dirty="0"/>
-              <a:t>: </a:t>
-            </a:r>
-          </a:p>
-          <a:p>
-            <a:pPr marL="742950" lvl="1" indent="-285750">
-              <a:buFont typeface="Arial" panose="020B0604020202020204" pitchFamily="34" charset="0"/>
-              <a:buChar char="•"/>
-            </a:pPr>
-            <a:r>
-              <a:rPr lang="en-US" dirty="0"/>
-              <a:t>Amount of memory asked for</a:t>
-            </a:r>
-          </a:p>
-          <a:p>
-            <a:pPr marL="285750" indent="-285750">
-              <a:buFont typeface="Arial" panose="020B0604020202020204" pitchFamily="34" charset="0"/>
-              <a:buChar char="•"/>
-            </a:pPr>
-            <a:endParaRPr lang="en-US" dirty="0"/>
-          </a:p>
-          <a:p>
-            <a:pPr marL="285750" indent="-285750">
-              <a:buFont typeface="Arial" panose="020B0604020202020204" pitchFamily="34" charset="0"/>
-              <a:buChar char="•"/>
-            </a:pPr>
-            <a:r>
-              <a:rPr lang="en-US" dirty="0"/>
-              <a:t>No logic for protections against crazy large chunk sizes!</a:t>
-            </a:r>
-          </a:p>
-          <a:p>
-            <a:pPr marL="285750" indent="-285750">
-              <a:buFont typeface="Arial" panose="020B0604020202020204" pitchFamily="34" charset="0"/>
-              <a:buChar char="•"/>
-            </a:pPr>
-            <a:endParaRPr lang="en-US" dirty="0"/>
-          </a:p>
-          <a:p>
-            <a:pPr marL="285750" indent="-285750">
-              <a:buFont typeface="Arial" panose="020B0604020202020204" pitchFamily="34" charset="0"/>
-              <a:buChar char="•"/>
-            </a:pPr>
-            <a:endParaRPr lang="en-US" dirty="0"/>
+              <a:t>Attack Idea – Visual </a:t>
+            </a:r>
           </a:p>
         </p:txBody>
       </p:sp>
       <p:pic>
         <p:nvPicPr>
-          <p:cNvPr id="9" name="Content Placeholder 8" descr="A picture containing text&#10;&#10;Description automatically generated">
+          <p:cNvPr id="9" name="Picture 8" descr="Top Chunk After Corruption">
             <a:extLst>
               <a:ext uri="{FF2B5EF4-FFF2-40B4-BE49-F238E27FC236}">
-                <a16:creationId xmlns:a16="http://schemas.microsoft.com/office/drawing/2014/main" id="{D5EDF6A9-B44C-2145-901C-8B24E0197154}"/>
+                <a16:creationId xmlns:a16="http://schemas.microsoft.com/office/drawing/2014/main" id="{D56331E5-66F4-1149-A9E1-2C83E3F4DFC4}"/>
               </a:ext>
             </a:extLst>
           </p:cNvPr>
@@ -31573,38 +31628,6 @@
             <a:picLocks noChangeAspect="1"/>
           </p:cNvPicPr>
           <p:nvPr/>
-        </p:nvPicPr>
-        <p:blipFill rotWithShape="1">
-          <a:blip r:embed="rId2"/>
-          <a:srcRect r="48098"/>
-          <a:stretch/>
-        </p:blipFill>
-        <p:spPr>
-          <a:xfrm>
-            <a:off x="3885009" y="483021"/>
-            <a:ext cx="4629150" cy="2574226"/>
-          </a:xfrm>
-          <a:prstGeom prst="rect">
-            <a:avLst/>
-          </a:prstGeom>
-          <a:noFill/>
-        </p:spPr>
-      </p:pic>
-      <p:pic>
-        <p:nvPicPr>
-          <p:cNvPr id="6" name="Content Placeholder 5" descr="Creating the new user chunk">
-            <a:extLst>
-              <a:ext uri="{FF2B5EF4-FFF2-40B4-BE49-F238E27FC236}">
-                <a16:creationId xmlns:a16="http://schemas.microsoft.com/office/drawing/2014/main" id="{3A8F00F6-6826-CE4F-B819-470015E05B0A}"/>
-              </a:ext>
-            </a:extLst>
-          </p:cNvPr>
-          <p:cNvPicPr>
-            <a:picLocks noGrp="1" noChangeAspect="1"/>
-          </p:cNvPicPr>
-          <p:nvPr>
-            <p:ph idx="1"/>
-          </p:nvPr>
         </p:nvPicPr>
         <p:blipFill>
           <a:blip r:embed="rId3"/>
@@ -31614,17 +31637,21 @@
         </p:blipFill>
         <p:spPr>
           <a:xfrm>
-            <a:off x="4429326" y="1862545"/>
-            <a:ext cx="4519365" cy="1014550"/>
+            <a:off x="1449902" y="1102888"/>
+            <a:ext cx="2467856" cy="3263504"/>
           </a:xfrm>
+          <a:prstGeom prst="rect">
+            <a:avLst/>
+          </a:prstGeom>
+          <a:noFill/>
         </p:spPr>
       </p:pic>
       <p:cxnSp>
         <p:nvCxnSpPr>
-          <p:cNvPr id="11" name="Straight Connector 10">
+          <p:cNvPr id="14" name="Straight Arrow Connector 13">
             <a:extLst>
               <a:ext uri="{FF2B5EF4-FFF2-40B4-BE49-F238E27FC236}">
-                <a16:creationId xmlns:a16="http://schemas.microsoft.com/office/drawing/2014/main" id="{8E4F8849-3C75-FB49-8C5A-052FAA6BF5E2}"/>
+                <a16:creationId xmlns:a16="http://schemas.microsoft.com/office/drawing/2014/main" id="{D889CEF9-E89E-9543-9277-AADB94D46171}"/>
               </a:ext>
             </a:extLst>
           </p:cNvPr>
@@ -31635,13 +31662,57 @@
         </p:nvCxnSpPr>
         <p:spPr>
           <a:xfrm>
-            <a:off x="4572000" y="2491851"/>
-            <a:ext cx="4190260" cy="0"/>
+            <a:off x="730301" y="1102888"/>
+            <a:ext cx="719601" cy="0"/>
+          </a:xfrm>
+          <a:prstGeom prst="straightConnector1">
+            <a:avLst/>
+          </a:prstGeom>
+          <a:ln w="57150">
+            <a:solidFill>
+              <a:srgbClr val="FF0000"/>
+            </a:solidFill>
+            <a:tailEnd type="triangle"/>
+          </a:ln>
+        </p:spPr>
+        <p:style>
+          <a:lnRef idx="1">
+            <a:schemeClr val="accent1"/>
+          </a:lnRef>
+          <a:fillRef idx="0">
+            <a:schemeClr val="accent1"/>
+          </a:fillRef>
+          <a:effectRef idx="0">
+            <a:schemeClr val="accent1"/>
+          </a:effectRef>
+          <a:fontRef idx="minor">
+            <a:schemeClr val="tx1"/>
+          </a:fontRef>
+        </p:style>
+      </p:cxnSp>
+      <p:cxnSp>
+        <p:nvCxnSpPr>
+          <p:cNvPr id="15" name="Straight Connector 14">
+            <a:extLst>
+              <a:ext uri="{FF2B5EF4-FFF2-40B4-BE49-F238E27FC236}">
+                <a16:creationId xmlns:a16="http://schemas.microsoft.com/office/drawing/2014/main" id="{1C641F18-E91C-8847-9FD9-3E32DCB79FF7}"/>
+              </a:ext>
+            </a:extLst>
+          </p:cNvPr>
+          <p:cNvCxnSpPr>
+            <a:cxnSpLocks/>
+          </p:cNvCxnSpPr>
+          <p:nvPr/>
+        </p:nvCxnSpPr>
+        <p:spPr>
+          <a:xfrm>
+            <a:off x="730301" y="1102888"/>
+            <a:ext cx="10431" cy="3263504"/>
           </a:xfrm>
           <a:prstGeom prst="line">
             <a:avLst/>
           </a:prstGeom>
-          <a:ln w="57150">
+          <a:ln w="47625">
             <a:solidFill>
               <a:srgbClr val="FF0000"/>
             </a:solidFill>
@@ -31649,23 +31720,361 @@
         </p:spPr>
         <p:style>
           <a:lnRef idx="1">
-            <a:schemeClr val="accent2"/>
+            <a:schemeClr val="accent1"/>
           </a:lnRef>
           <a:fillRef idx="0">
-            <a:schemeClr val="accent2"/>
+            <a:schemeClr val="accent1"/>
           </a:fillRef>
           <a:effectRef idx="0">
-            <a:schemeClr val="accent2"/>
+            <a:schemeClr val="accent1"/>
           </a:effectRef>
           <a:fontRef idx="minor">
             <a:schemeClr val="tx1"/>
           </a:fontRef>
         </p:style>
       </p:cxnSp>
+      <p:cxnSp>
+        <p:nvCxnSpPr>
+          <p:cNvPr id="16" name="Straight Arrow Connector 15">
+            <a:extLst>
+              <a:ext uri="{FF2B5EF4-FFF2-40B4-BE49-F238E27FC236}">
+                <a16:creationId xmlns:a16="http://schemas.microsoft.com/office/drawing/2014/main" id="{EA3177A3-68D6-DB47-9537-143416D34D80}"/>
+              </a:ext>
+            </a:extLst>
+          </p:cNvPr>
+          <p:cNvCxnSpPr>
+            <a:cxnSpLocks/>
+          </p:cNvCxnSpPr>
+          <p:nvPr/>
+        </p:nvCxnSpPr>
+        <p:spPr>
+          <a:xfrm>
+            <a:off x="740732" y="4366392"/>
+            <a:ext cx="719601" cy="0"/>
+          </a:xfrm>
+          <a:prstGeom prst="straightConnector1">
+            <a:avLst/>
+          </a:prstGeom>
+          <a:ln w="57150">
+            <a:solidFill>
+              <a:srgbClr val="FF0000"/>
+            </a:solidFill>
+            <a:tailEnd type="triangle"/>
+          </a:ln>
+        </p:spPr>
+        <p:style>
+          <a:lnRef idx="1">
+            <a:schemeClr val="accent1"/>
+          </a:lnRef>
+          <a:fillRef idx="0">
+            <a:schemeClr val="accent1"/>
+          </a:fillRef>
+          <a:effectRef idx="0">
+            <a:schemeClr val="accent1"/>
+          </a:effectRef>
+          <a:fontRef idx="minor">
+            <a:schemeClr val="tx1"/>
+          </a:fontRef>
+        </p:style>
+      </p:cxnSp>
+      <p:pic>
+        <p:nvPicPr>
+          <p:cNvPr id="10" name="Picture 9" descr="Top Chunk After Corruption">
+            <a:extLst>
+              <a:ext uri="{FF2B5EF4-FFF2-40B4-BE49-F238E27FC236}">
+                <a16:creationId xmlns:a16="http://schemas.microsoft.com/office/drawing/2014/main" id="{A8580D36-B426-9342-B17E-D64061FA9311}"/>
+              </a:ext>
+            </a:extLst>
+          </p:cNvPr>
+          <p:cNvPicPr>
+            <a:picLocks noChangeAspect="1"/>
+          </p:cNvPicPr>
+          <p:nvPr/>
+        </p:nvPicPr>
+        <p:blipFill>
+          <a:blip r:embed="rId3"/>
+          <a:stretch>
+            <a:fillRect/>
+          </a:stretch>
+        </p:blipFill>
+        <p:spPr>
+          <a:xfrm>
+            <a:off x="6150433" y="1120463"/>
+            <a:ext cx="2454566" cy="3245930"/>
+          </a:xfrm>
+          <a:prstGeom prst="rect">
+            <a:avLst/>
+          </a:prstGeom>
+          <a:noFill/>
+        </p:spPr>
+      </p:pic>
+      <p:sp>
+        <p:nvSpPr>
+          <p:cNvPr id="11" name="TextBox 10">
+            <a:extLst>
+              <a:ext uri="{FF2B5EF4-FFF2-40B4-BE49-F238E27FC236}">
+                <a16:creationId xmlns:a16="http://schemas.microsoft.com/office/drawing/2014/main" id="{F637518E-63ED-FB46-BEA7-508AF9354805}"/>
+              </a:ext>
+            </a:extLst>
+          </p:cNvPr>
+          <p:cNvSpPr txBox="1"/>
+          <p:nvPr/>
+        </p:nvSpPr>
+        <p:spPr>
+          <a:xfrm>
+            <a:off x="4616001" y="4065144"/>
+            <a:ext cx="764697" cy="369332"/>
+          </a:xfrm>
+          <a:prstGeom prst="rect">
+            <a:avLst/>
+          </a:prstGeom>
+          <a:noFill/>
+        </p:spPr>
+        <p:txBody>
+          <a:bodyPr wrap="none" rtlCol="0">
+            <a:spAutoFit/>
+          </a:bodyPr>
+          <a:lstStyle/>
+          <a:p>
+            <a:r>
+              <a:rPr lang="en-US" dirty="0">
+                <a:solidFill>
+                  <a:srgbClr val="FF0000"/>
+                </a:solidFill>
+              </a:rPr>
+              <a:t>Target</a:t>
+            </a:r>
+          </a:p>
+        </p:txBody>
+      </p:sp>
+      <p:sp>
+        <p:nvSpPr>
+          <p:cNvPr id="12" name="TextBox 11">
+            <a:extLst>
+              <a:ext uri="{FF2B5EF4-FFF2-40B4-BE49-F238E27FC236}">
+                <a16:creationId xmlns:a16="http://schemas.microsoft.com/office/drawing/2014/main" id="{30E61409-7E7B-3D4F-BA16-A9A9D70F102F}"/>
+              </a:ext>
+            </a:extLst>
+          </p:cNvPr>
+          <p:cNvSpPr txBox="1"/>
+          <p:nvPr/>
+        </p:nvSpPr>
+        <p:spPr>
+          <a:xfrm>
+            <a:off x="4359081" y="3702394"/>
+            <a:ext cx="1140377" cy="369332"/>
+          </a:xfrm>
+          <a:prstGeom prst="rect">
+            <a:avLst/>
+          </a:prstGeom>
+          <a:noFill/>
+        </p:spPr>
+        <p:txBody>
+          <a:bodyPr wrap="none" rtlCol="0">
+            <a:spAutoFit/>
+          </a:bodyPr>
+          <a:lstStyle/>
+          <a:p>
+            <a:r>
+              <a:rPr lang="en-US" dirty="0">
+                <a:solidFill>
+                  <a:srgbClr val="00B050"/>
+                </a:solidFill>
+              </a:rPr>
+              <a:t>Top chunk</a:t>
+            </a:r>
+          </a:p>
+        </p:txBody>
+      </p:sp>
+      <p:cxnSp>
+        <p:nvCxnSpPr>
+          <p:cNvPr id="13" name="Straight Arrow Connector 12">
+            <a:extLst>
+              <a:ext uri="{FF2B5EF4-FFF2-40B4-BE49-F238E27FC236}">
+                <a16:creationId xmlns:a16="http://schemas.microsoft.com/office/drawing/2014/main" id="{80C001E2-4F5F-6549-B0A1-3F299F56621F}"/>
+              </a:ext>
+            </a:extLst>
+          </p:cNvPr>
+          <p:cNvCxnSpPr>
+            <a:cxnSpLocks/>
+          </p:cNvCxnSpPr>
+          <p:nvPr/>
+        </p:nvCxnSpPr>
+        <p:spPr>
+          <a:xfrm>
+            <a:off x="5434650" y="3900063"/>
+            <a:ext cx="719601" cy="0"/>
+          </a:xfrm>
+          <a:prstGeom prst="straightConnector1">
+            <a:avLst/>
+          </a:prstGeom>
+          <a:ln w="57150">
+            <a:solidFill>
+              <a:srgbClr val="FF0000"/>
+            </a:solidFill>
+            <a:tailEnd type="triangle"/>
+          </a:ln>
+        </p:spPr>
+        <p:style>
+          <a:lnRef idx="1">
+            <a:schemeClr val="accent1"/>
+          </a:lnRef>
+          <a:fillRef idx="0">
+            <a:schemeClr val="accent1"/>
+          </a:fillRef>
+          <a:effectRef idx="0">
+            <a:schemeClr val="accent1"/>
+          </a:effectRef>
+          <a:fontRef idx="minor">
+            <a:schemeClr val="tx1"/>
+          </a:fontRef>
+        </p:style>
+      </p:cxnSp>
+      <p:cxnSp>
+        <p:nvCxnSpPr>
+          <p:cNvPr id="18" name="Straight Connector 17">
+            <a:extLst>
+              <a:ext uri="{FF2B5EF4-FFF2-40B4-BE49-F238E27FC236}">
+                <a16:creationId xmlns:a16="http://schemas.microsoft.com/office/drawing/2014/main" id="{B2117EE2-FD5C-B549-A101-EEF10B266E77}"/>
+              </a:ext>
+            </a:extLst>
+          </p:cNvPr>
+          <p:cNvCxnSpPr>
+            <a:cxnSpLocks/>
+          </p:cNvCxnSpPr>
+          <p:nvPr/>
+        </p:nvCxnSpPr>
+        <p:spPr>
+          <a:xfrm>
+            <a:off x="5431992" y="3900063"/>
+            <a:ext cx="2658" cy="343325"/>
+          </a:xfrm>
+          <a:prstGeom prst="line">
+            <a:avLst/>
+          </a:prstGeom>
+          <a:ln w="47625">
+            <a:solidFill>
+              <a:srgbClr val="FF0000"/>
+            </a:solidFill>
+          </a:ln>
+        </p:spPr>
+        <p:style>
+          <a:lnRef idx="1">
+            <a:schemeClr val="accent1"/>
+          </a:lnRef>
+          <a:fillRef idx="0">
+            <a:schemeClr val="accent1"/>
+          </a:fillRef>
+          <a:effectRef idx="0">
+            <a:schemeClr val="accent1"/>
+          </a:effectRef>
+          <a:fontRef idx="minor">
+            <a:schemeClr val="tx1"/>
+          </a:fontRef>
+        </p:style>
+      </p:cxnSp>
+      <p:cxnSp>
+        <p:nvCxnSpPr>
+          <p:cNvPr id="20" name="Straight Arrow Connector 19">
+            <a:extLst>
+              <a:ext uri="{FF2B5EF4-FFF2-40B4-BE49-F238E27FC236}">
+                <a16:creationId xmlns:a16="http://schemas.microsoft.com/office/drawing/2014/main" id="{6691BD59-CE49-3241-AFE5-65CD7AB702BE}"/>
+              </a:ext>
+            </a:extLst>
+          </p:cNvPr>
+          <p:cNvCxnSpPr>
+            <a:cxnSpLocks/>
+          </p:cNvCxnSpPr>
+          <p:nvPr/>
+        </p:nvCxnSpPr>
+        <p:spPr>
+          <a:xfrm>
+            <a:off x="5434650" y="4243388"/>
+            <a:ext cx="719601" cy="0"/>
+          </a:xfrm>
+          <a:prstGeom prst="straightConnector1">
+            <a:avLst/>
+          </a:prstGeom>
+          <a:ln w="57150">
+            <a:solidFill>
+              <a:srgbClr val="FF0000"/>
+            </a:solidFill>
+            <a:tailEnd type="triangle"/>
+          </a:ln>
+        </p:spPr>
+        <p:style>
+          <a:lnRef idx="1">
+            <a:schemeClr val="accent1"/>
+          </a:lnRef>
+          <a:fillRef idx="0">
+            <a:schemeClr val="accent1"/>
+          </a:fillRef>
+          <a:effectRef idx="0">
+            <a:schemeClr val="accent1"/>
+          </a:effectRef>
+          <a:fontRef idx="minor">
+            <a:schemeClr val="tx1"/>
+          </a:fontRef>
+        </p:style>
+      </p:cxnSp>
+      <p:sp>
+        <p:nvSpPr>
+          <p:cNvPr id="4" name="Rectangle 3">
+            <a:extLst>
+              <a:ext uri="{FF2B5EF4-FFF2-40B4-BE49-F238E27FC236}">
+                <a16:creationId xmlns:a16="http://schemas.microsoft.com/office/drawing/2014/main" id="{DBD54F7F-7693-3D4D-BF9F-48F8466D142F}"/>
+              </a:ext>
+            </a:extLst>
+          </p:cNvPr>
+          <p:cNvSpPr/>
+          <p:nvPr/>
+        </p:nvSpPr>
+        <p:spPr>
+          <a:xfrm>
+            <a:off x="7270812" y="1014499"/>
+            <a:ext cx="968183" cy="914400"/>
+          </a:xfrm>
+          <a:prstGeom prst="rect">
+            <a:avLst/>
+          </a:prstGeom>
+          <a:solidFill>
+            <a:schemeClr val="bg1"/>
+          </a:solidFill>
+          <a:ln>
+            <a:solidFill>
+              <a:schemeClr val="bg1"/>
+            </a:solidFill>
+          </a:ln>
+        </p:spPr>
+        <p:style>
+          <a:lnRef idx="2">
+            <a:schemeClr val="accent1">
+              <a:shade val="50000"/>
+            </a:schemeClr>
+          </a:lnRef>
+          <a:fillRef idx="1">
+            <a:schemeClr val="accent1"/>
+          </a:fillRef>
+          <a:effectRef idx="0">
+            <a:schemeClr val="accent1"/>
+          </a:effectRef>
+          <a:fontRef idx="minor">
+            <a:schemeClr val="lt1"/>
+          </a:fontRef>
+        </p:style>
+        <p:txBody>
+          <a:bodyPr rtlCol="0" anchor="ctr"/>
+          <a:lstStyle/>
+          <a:p>
+            <a:pPr algn="ctr"/>
+            <a:endParaRPr lang="en-US" dirty="0"/>
+          </a:p>
+        </p:txBody>
+      </p:sp>
     </p:spTree>
     <p:extLst>
       <p:ext uri="{BB962C8B-B14F-4D97-AF65-F5344CB8AC3E}">
-        <p14:creationId xmlns:p14="http://schemas.microsoft.com/office/powerpoint/2010/main" val="3537791966"/>
+        <p14:creationId xmlns:p14="http://schemas.microsoft.com/office/powerpoint/2010/main" val="3275339213"/>
       </p:ext>
     </p:extLst>
   </p:cSld>
@@ -32766,11 +33175,11 @@
           <a:p>
             <a:r>
               <a:rPr lang="en-US" dirty="0"/>
-              <a:t>Just set to </a:t>
+              <a:t>Just set to 0xFFFFFFFFFFFFFFFF (</a:t>
             </a:r>
             <a:r>
               <a:rPr lang="en-US" b="1" dirty="0"/>
-              <a:t>-1</a:t>
+              <a:t>-1)</a:t>
             </a:r>
             <a:r>
               <a:rPr lang="en-US" b="1" i="1" dirty="0"/>
@@ -36909,7 +37318,15 @@
           <a:p>
             <a:r>
               <a:rPr lang="en-US" dirty="0"/>
-              <a:t>Allocate JUST before your target</a:t>
+              <a:t>Move the </a:t>
+            </a:r>
+            <a:r>
+              <a:rPr lang="en-US" b="1" i="1" dirty="0"/>
+              <a:t>top chunk pointer </a:t>
+            </a:r>
+            <a:r>
+              <a:rPr lang="en-US" dirty="0"/>
+              <a:t>just before the target</a:t>
             </a:r>
           </a:p>
           <a:p>
@@ -37099,6 +37516,1300 @@
           <p:cNvPr id="2" name="Title 1">
             <a:extLst>
               <a:ext uri="{FF2B5EF4-FFF2-40B4-BE49-F238E27FC236}">
+                <a16:creationId xmlns:a16="http://schemas.microsoft.com/office/drawing/2014/main" id="{8FB4D52A-330E-8643-AA8C-1371BC1EEC96}"/>
+              </a:ext>
+            </a:extLst>
+          </p:cNvPr>
+          <p:cNvSpPr>
+            <a:spLocks noGrp="1"/>
+          </p:cNvSpPr>
+          <p:nvPr>
+            <p:ph type="title"/>
+          </p:nvPr>
+        </p:nvSpPr>
+        <p:spPr>
+          <a:xfrm>
+            <a:off x="629841" y="273847"/>
+            <a:ext cx="7886700" cy="994172"/>
+          </a:xfrm>
+        </p:spPr>
+        <p:txBody>
+          <a:bodyPr anchor="ctr">
+            <a:normAutofit/>
+          </a:bodyPr>
+          <a:lstStyle/>
+          <a:p>
+            <a:r>
+              <a:rPr lang="en-US" dirty="0"/>
+              <a:t>Allocate Close to Target – </a:t>
+            </a:r>
+            <a:r>
+              <a:rPr lang="en-US" b="1" dirty="0"/>
+              <a:t>4</a:t>
+            </a:r>
+            <a:r>
+              <a:rPr lang="en-US" dirty="0"/>
+              <a:t> </a:t>
+            </a:r>
+          </a:p>
+        </p:txBody>
+      </p:sp>
+      <p:sp>
+        <p:nvSpPr>
+          <p:cNvPr id="3" name="Content Placeholder 2">
+            <a:extLst>
+              <a:ext uri="{FF2B5EF4-FFF2-40B4-BE49-F238E27FC236}">
+                <a16:creationId xmlns:a16="http://schemas.microsoft.com/office/drawing/2014/main" id="{819D1DEF-6A0F-8C4D-85FB-A84CB5993C98}"/>
+              </a:ext>
+            </a:extLst>
+          </p:cNvPr>
+          <p:cNvSpPr>
+            <a:spLocks noGrp="1"/>
+          </p:cNvSpPr>
+          <p:nvPr>
+            <p:ph sz="half" idx="2"/>
+          </p:nvPr>
+        </p:nvSpPr>
+        <p:spPr>
+          <a:xfrm>
+            <a:off x="629841" y="1143001"/>
+            <a:ext cx="7406327" cy="438287"/>
+          </a:xfrm>
+        </p:spPr>
+        <p:txBody>
+          <a:bodyPr>
+            <a:normAutofit/>
+          </a:bodyPr>
+          <a:lstStyle/>
+          <a:p>
+            <a:r>
+              <a:rPr lang="en-US" dirty="0"/>
+              <a:t>Size = (</a:t>
+            </a:r>
+            <a:r>
+              <a:rPr lang="en-US" dirty="0">
+                <a:solidFill>
+                  <a:srgbClr val="00B050"/>
+                </a:solidFill>
+              </a:rPr>
+              <a:t>target</a:t>
+            </a:r>
+            <a:r>
+              <a:rPr lang="en-US" dirty="0"/>
+              <a:t> </a:t>
+            </a:r>
+            <a:r>
+              <a:rPr lang="en-US" dirty="0" err="1"/>
+              <a:t>addr</a:t>
+            </a:r>
+            <a:r>
+              <a:rPr lang="en-US" dirty="0"/>
+              <a:t>) - (</a:t>
+            </a:r>
+            <a:r>
+              <a:rPr lang="en-US" dirty="0">
+                <a:solidFill>
+                  <a:srgbClr val="FF0000"/>
+                </a:solidFill>
+              </a:rPr>
+              <a:t>Top Chunk </a:t>
+            </a:r>
+            <a:r>
+              <a:rPr lang="en-US" dirty="0" err="1"/>
+              <a:t>addr</a:t>
+            </a:r>
+            <a:r>
+              <a:rPr lang="en-US" dirty="0"/>
+              <a:t>) – 0x20</a:t>
+            </a:r>
+          </a:p>
+        </p:txBody>
+      </p:sp>
+      <p:sp>
+        <p:nvSpPr>
+          <p:cNvPr id="7" name="Content Placeholder 2">
+            <a:extLst>
+              <a:ext uri="{FF2B5EF4-FFF2-40B4-BE49-F238E27FC236}">
+                <a16:creationId xmlns:a16="http://schemas.microsoft.com/office/drawing/2014/main" id="{1FF61647-1976-3545-BE05-F04D1A8FB8BB}"/>
+              </a:ext>
+            </a:extLst>
+          </p:cNvPr>
+          <p:cNvSpPr txBox="1">
+            <a:spLocks/>
+          </p:cNvSpPr>
+          <p:nvPr/>
+        </p:nvSpPr>
+        <p:spPr>
+          <a:xfrm>
+            <a:off x="5195890" y="4203964"/>
+            <a:ext cx="1228559" cy="438287"/>
+          </a:xfrm>
+          <a:prstGeom prst="rect">
+            <a:avLst/>
+          </a:prstGeom>
+        </p:spPr>
+        <p:txBody>
+          <a:bodyPr vert="horz" lIns="91440" tIns="45720" rIns="91440" bIns="45720" rtlCol="0">
+            <a:normAutofit/>
+          </a:bodyPr>
+          <a:lstStyle>
+            <a:lvl1pPr marL="228600" indent="-228600" algn="l" defTabSz="914400" rtl="0" eaLnBrk="1" latinLnBrk="0" hangingPunct="1">
+              <a:lnSpc>
+                <a:spcPct val="90000"/>
+              </a:lnSpc>
+              <a:spcBef>
+                <a:spcPts val="1000"/>
+              </a:spcBef>
+              <a:buFont typeface="Arial" panose="020B0604020202020204" pitchFamily="34" charset="0"/>
+              <a:buChar char="•"/>
+              <a:defRPr sz="2400" kern="1200">
+                <a:solidFill>
+                  <a:schemeClr val="tx1"/>
+                </a:solidFill>
+                <a:latin typeface="Avenir Book"/>
+                <a:ea typeface="+mn-ea"/>
+                <a:cs typeface="Avenir Book"/>
+              </a:defRPr>
+            </a:lvl1pPr>
+            <a:lvl2pPr marL="685800" indent="-228600" algn="l" defTabSz="914400" rtl="0" eaLnBrk="1" latinLnBrk="0" hangingPunct="1">
+              <a:lnSpc>
+                <a:spcPct val="90000"/>
+              </a:lnSpc>
+              <a:spcBef>
+                <a:spcPts val="500"/>
+              </a:spcBef>
+              <a:buFont typeface="Arial" panose="020B0604020202020204" pitchFamily="34" charset="0"/>
+              <a:buChar char="•"/>
+              <a:defRPr sz="2400" kern="1200">
+                <a:solidFill>
+                  <a:schemeClr val="tx1"/>
+                </a:solidFill>
+                <a:latin typeface="Avenir Book"/>
+                <a:ea typeface="+mn-ea"/>
+                <a:cs typeface="Avenir Book"/>
+              </a:defRPr>
+            </a:lvl2pPr>
+            <a:lvl3pPr marL="1143000" indent="-228600" algn="l" defTabSz="914400" rtl="0" eaLnBrk="1" latinLnBrk="0" hangingPunct="1">
+              <a:lnSpc>
+                <a:spcPct val="90000"/>
+              </a:lnSpc>
+              <a:spcBef>
+                <a:spcPts val="500"/>
+              </a:spcBef>
+              <a:buFont typeface="Arial" panose="020B0604020202020204" pitchFamily="34" charset="0"/>
+              <a:buChar char="•"/>
+              <a:defRPr sz="2400" kern="1200">
+                <a:solidFill>
+                  <a:schemeClr val="tx1"/>
+                </a:solidFill>
+                <a:latin typeface="Avenir Book"/>
+                <a:ea typeface="+mn-ea"/>
+                <a:cs typeface="Avenir Book"/>
+              </a:defRPr>
+            </a:lvl3pPr>
+            <a:lvl4pPr marL="1600200" indent="-228600" algn="l" defTabSz="914400" rtl="0" eaLnBrk="1" latinLnBrk="0" hangingPunct="1">
+              <a:lnSpc>
+                <a:spcPct val="90000"/>
+              </a:lnSpc>
+              <a:spcBef>
+                <a:spcPts val="500"/>
+              </a:spcBef>
+              <a:buFont typeface="Arial" panose="020B0604020202020204" pitchFamily="34" charset="0"/>
+              <a:buChar char="•"/>
+              <a:defRPr sz="2400" kern="1200">
+                <a:solidFill>
+                  <a:schemeClr val="tx1"/>
+                </a:solidFill>
+                <a:latin typeface="Avenir Book"/>
+                <a:ea typeface="+mn-ea"/>
+                <a:cs typeface="Avenir Book"/>
+              </a:defRPr>
+            </a:lvl4pPr>
+            <a:lvl5pPr marL="2057400" indent="-228600" algn="l" defTabSz="914400" rtl="0" eaLnBrk="1" latinLnBrk="0" hangingPunct="1">
+              <a:lnSpc>
+                <a:spcPct val="90000"/>
+              </a:lnSpc>
+              <a:spcBef>
+                <a:spcPts val="500"/>
+              </a:spcBef>
+              <a:buFont typeface="Arial" panose="020B0604020202020204" pitchFamily="34" charset="0"/>
+              <a:buChar char="•"/>
+              <a:defRPr sz="2400" kern="1200">
+                <a:solidFill>
+                  <a:schemeClr val="tx1"/>
+                </a:solidFill>
+                <a:latin typeface="Avenir Book"/>
+                <a:ea typeface="+mn-ea"/>
+                <a:cs typeface="Avenir Book"/>
+              </a:defRPr>
+            </a:lvl5pPr>
+            <a:lvl6pPr marL="2514600" indent="-228600" algn="l" defTabSz="914400" rtl="0" eaLnBrk="1" latinLnBrk="0" hangingPunct="1">
+              <a:lnSpc>
+                <a:spcPct val="90000"/>
+              </a:lnSpc>
+              <a:spcBef>
+                <a:spcPts val="500"/>
+              </a:spcBef>
+              <a:buFont typeface="Arial" panose="020B0604020202020204" pitchFamily="34" charset="0"/>
+              <a:buChar char="•"/>
+              <a:defRPr sz="1800" kern="1200">
+                <a:solidFill>
+                  <a:schemeClr val="tx1"/>
+                </a:solidFill>
+                <a:latin typeface="+mn-lt"/>
+                <a:ea typeface="+mn-ea"/>
+                <a:cs typeface="+mn-cs"/>
+              </a:defRPr>
+            </a:lvl6pPr>
+            <a:lvl7pPr marL="2971800" indent="-228600" algn="l" defTabSz="914400" rtl="0" eaLnBrk="1" latinLnBrk="0" hangingPunct="1">
+              <a:lnSpc>
+                <a:spcPct val="90000"/>
+              </a:lnSpc>
+              <a:spcBef>
+                <a:spcPts val="500"/>
+              </a:spcBef>
+              <a:buFont typeface="Arial" panose="020B0604020202020204" pitchFamily="34" charset="0"/>
+              <a:buChar char="•"/>
+              <a:defRPr sz="1800" kern="1200">
+                <a:solidFill>
+                  <a:schemeClr val="tx1"/>
+                </a:solidFill>
+                <a:latin typeface="+mn-lt"/>
+                <a:ea typeface="+mn-ea"/>
+                <a:cs typeface="+mn-cs"/>
+              </a:defRPr>
+            </a:lvl7pPr>
+            <a:lvl8pPr marL="3429000" indent="-228600" algn="l" defTabSz="914400" rtl="0" eaLnBrk="1" latinLnBrk="0" hangingPunct="1">
+              <a:lnSpc>
+                <a:spcPct val="90000"/>
+              </a:lnSpc>
+              <a:spcBef>
+                <a:spcPts val="500"/>
+              </a:spcBef>
+              <a:buFont typeface="Arial" panose="020B0604020202020204" pitchFamily="34" charset="0"/>
+              <a:buChar char="•"/>
+              <a:defRPr sz="1800" kern="1200">
+                <a:solidFill>
+                  <a:schemeClr val="tx1"/>
+                </a:solidFill>
+                <a:latin typeface="+mn-lt"/>
+                <a:ea typeface="+mn-ea"/>
+                <a:cs typeface="+mn-cs"/>
+              </a:defRPr>
+            </a:lvl8pPr>
+            <a:lvl9pPr marL="3886200" indent="-228600" algn="l" defTabSz="914400" rtl="0" eaLnBrk="1" latinLnBrk="0" hangingPunct="1">
+              <a:lnSpc>
+                <a:spcPct val="90000"/>
+              </a:lnSpc>
+              <a:spcBef>
+                <a:spcPts val="500"/>
+              </a:spcBef>
+              <a:buFont typeface="Arial" panose="020B0604020202020204" pitchFamily="34" charset="0"/>
+              <a:buChar char="•"/>
+              <a:defRPr sz="1800" kern="1200">
+                <a:solidFill>
+                  <a:schemeClr val="tx1"/>
+                </a:solidFill>
+                <a:latin typeface="+mn-lt"/>
+                <a:ea typeface="+mn-ea"/>
+                <a:cs typeface="+mn-cs"/>
+              </a:defRPr>
+            </a:lvl9pPr>
+          </a:lstStyle>
+          <a:p>
+            <a:endParaRPr lang="en-US" dirty="0"/>
+          </a:p>
+        </p:txBody>
+      </p:sp>
+      <p:sp>
+        <p:nvSpPr>
+          <p:cNvPr id="12" name="Content Placeholder 2">
+            <a:extLst>
+              <a:ext uri="{FF2B5EF4-FFF2-40B4-BE49-F238E27FC236}">
+                <a16:creationId xmlns:a16="http://schemas.microsoft.com/office/drawing/2014/main" id="{20DD4AB2-54D1-004C-822C-D6AEA325B895}"/>
+              </a:ext>
+            </a:extLst>
+          </p:cNvPr>
+          <p:cNvSpPr txBox="1">
+            <a:spLocks/>
+          </p:cNvSpPr>
+          <p:nvPr/>
+        </p:nvSpPr>
+        <p:spPr>
+          <a:xfrm>
+            <a:off x="694319" y="1581289"/>
+            <a:ext cx="3877682" cy="3060962"/>
+          </a:xfrm>
+          <a:prstGeom prst="rect">
+            <a:avLst/>
+          </a:prstGeom>
+        </p:spPr>
+        <p:txBody>
+          <a:bodyPr vert="horz" lIns="91440" tIns="45720" rIns="91440" bIns="45720" rtlCol="0">
+            <a:normAutofit/>
+          </a:bodyPr>
+          <a:lstStyle>
+            <a:lvl1pPr marL="228600" indent="-228600" algn="l" defTabSz="914400" rtl="0" eaLnBrk="1" latinLnBrk="0" hangingPunct="1">
+              <a:lnSpc>
+                <a:spcPct val="90000"/>
+              </a:lnSpc>
+              <a:spcBef>
+                <a:spcPts val="1000"/>
+              </a:spcBef>
+              <a:buFont typeface="Arial" panose="020B0604020202020204" pitchFamily="34" charset="0"/>
+              <a:buChar char="•"/>
+              <a:defRPr sz="2400" kern="1200">
+                <a:solidFill>
+                  <a:schemeClr val="tx1"/>
+                </a:solidFill>
+                <a:latin typeface="Avenir Book"/>
+                <a:ea typeface="+mn-ea"/>
+                <a:cs typeface="Avenir Book"/>
+              </a:defRPr>
+            </a:lvl1pPr>
+            <a:lvl2pPr marL="685800" indent="-228600" algn="l" defTabSz="914400" rtl="0" eaLnBrk="1" latinLnBrk="0" hangingPunct="1">
+              <a:lnSpc>
+                <a:spcPct val="90000"/>
+              </a:lnSpc>
+              <a:spcBef>
+                <a:spcPts val="500"/>
+              </a:spcBef>
+              <a:buFont typeface="Arial" panose="020B0604020202020204" pitchFamily="34" charset="0"/>
+              <a:buChar char="•"/>
+              <a:defRPr sz="2400" kern="1200">
+                <a:solidFill>
+                  <a:schemeClr val="tx1"/>
+                </a:solidFill>
+                <a:latin typeface="Avenir Book"/>
+                <a:ea typeface="+mn-ea"/>
+                <a:cs typeface="Avenir Book"/>
+              </a:defRPr>
+            </a:lvl2pPr>
+            <a:lvl3pPr marL="1143000" indent="-228600" algn="l" defTabSz="914400" rtl="0" eaLnBrk="1" latinLnBrk="0" hangingPunct="1">
+              <a:lnSpc>
+                <a:spcPct val="90000"/>
+              </a:lnSpc>
+              <a:spcBef>
+                <a:spcPts val="500"/>
+              </a:spcBef>
+              <a:buFont typeface="Arial" panose="020B0604020202020204" pitchFamily="34" charset="0"/>
+              <a:buChar char="•"/>
+              <a:defRPr sz="2400" kern="1200">
+                <a:solidFill>
+                  <a:schemeClr val="tx1"/>
+                </a:solidFill>
+                <a:latin typeface="Avenir Book"/>
+                <a:ea typeface="+mn-ea"/>
+                <a:cs typeface="Avenir Book"/>
+              </a:defRPr>
+            </a:lvl3pPr>
+            <a:lvl4pPr marL="1600200" indent="-228600" algn="l" defTabSz="914400" rtl="0" eaLnBrk="1" latinLnBrk="0" hangingPunct="1">
+              <a:lnSpc>
+                <a:spcPct val="90000"/>
+              </a:lnSpc>
+              <a:spcBef>
+                <a:spcPts val="500"/>
+              </a:spcBef>
+              <a:buFont typeface="Arial" panose="020B0604020202020204" pitchFamily="34" charset="0"/>
+              <a:buChar char="•"/>
+              <a:defRPr sz="2400" kern="1200">
+                <a:solidFill>
+                  <a:schemeClr val="tx1"/>
+                </a:solidFill>
+                <a:latin typeface="Avenir Book"/>
+                <a:ea typeface="+mn-ea"/>
+                <a:cs typeface="Avenir Book"/>
+              </a:defRPr>
+            </a:lvl4pPr>
+            <a:lvl5pPr marL="2057400" indent="-228600" algn="l" defTabSz="914400" rtl="0" eaLnBrk="1" latinLnBrk="0" hangingPunct="1">
+              <a:lnSpc>
+                <a:spcPct val="90000"/>
+              </a:lnSpc>
+              <a:spcBef>
+                <a:spcPts val="500"/>
+              </a:spcBef>
+              <a:buFont typeface="Arial" panose="020B0604020202020204" pitchFamily="34" charset="0"/>
+              <a:buChar char="•"/>
+              <a:defRPr sz="2400" kern="1200">
+                <a:solidFill>
+                  <a:schemeClr val="tx1"/>
+                </a:solidFill>
+                <a:latin typeface="Avenir Book"/>
+                <a:ea typeface="+mn-ea"/>
+                <a:cs typeface="Avenir Book"/>
+              </a:defRPr>
+            </a:lvl5pPr>
+            <a:lvl6pPr marL="2514600" indent="-228600" algn="l" defTabSz="914400" rtl="0" eaLnBrk="1" latinLnBrk="0" hangingPunct="1">
+              <a:lnSpc>
+                <a:spcPct val="90000"/>
+              </a:lnSpc>
+              <a:spcBef>
+                <a:spcPts val="500"/>
+              </a:spcBef>
+              <a:buFont typeface="Arial" panose="020B0604020202020204" pitchFamily="34" charset="0"/>
+              <a:buChar char="•"/>
+              <a:defRPr sz="1800" kern="1200">
+                <a:solidFill>
+                  <a:schemeClr val="tx1"/>
+                </a:solidFill>
+                <a:latin typeface="+mn-lt"/>
+                <a:ea typeface="+mn-ea"/>
+                <a:cs typeface="+mn-cs"/>
+              </a:defRPr>
+            </a:lvl6pPr>
+            <a:lvl7pPr marL="2971800" indent="-228600" algn="l" defTabSz="914400" rtl="0" eaLnBrk="1" latinLnBrk="0" hangingPunct="1">
+              <a:lnSpc>
+                <a:spcPct val="90000"/>
+              </a:lnSpc>
+              <a:spcBef>
+                <a:spcPts val="500"/>
+              </a:spcBef>
+              <a:buFont typeface="Arial" panose="020B0604020202020204" pitchFamily="34" charset="0"/>
+              <a:buChar char="•"/>
+              <a:defRPr sz="1800" kern="1200">
+                <a:solidFill>
+                  <a:schemeClr val="tx1"/>
+                </a:solidFill>
+                <a:latin typeface="+mn-lt"/>
+                <a:ea typeface="+mn-ea"/>
+                <a:cs typeface="+mn-cs"/>
+              </a:defRPr>
+            </a:lvl7pPr>
+            <a:lvl8pPr marL="3429000" indent="-228600" algn="l" defTabSz="914400" rtl="0" eaLnBrk="1" latinLnBrk="0" hangingPunct="1">
+              <a:lnSpc>
+                <a:spcPct val="90000"/>
+              </a:lnSpc>
+              <a:spcBef>
+                <a:spcPts val="500"/>
+              </a:spcBef>
+              <a:buFont typeface="Arial" panose="020B0604020202020204" pitchFamily="34" charset="0"/>
+              <a:buChar char="•"/>
+              <a:defRPr sz="1800" kern="1200">
+                <a:solidFill>
+                  <a:schemeClr val="tx1"/>
+                </a:solidFill>
+                <a:latin typeface="+mn-lt"/>
+                <a:ea typeface="+mn-ea"/>
+                <a:cs typeface="+mn-cs"/>
+              </a:defRPr>
+            </a:lvl8pPr>
+            <a:lvl9pPr marL="3886200" indent="-228600" algn="l" defTabSz="914400" rtl="0" eaLnBrk="1" latinLnBrk="0" hangingPunct="1">
+              <a:lnSpc>
+                <a:spcPct val="90000"/>
+              </a:lnSpc>
+              <a:spcBef>
+                <a:spcPts val="500"/>
+              </a:spcBef>
+              <a:buFont typeface="Arial" panose="020B0604020202020204" pitchFamily="34" charset="0"/>
+              <a:buChar char="•"/>
+              <a:defRPr sz="1800" kern="1200">
+                <a:solidFill>
+                  <a:schemeClr val="tx1"/>
+                </a:solidFill>
+                <a:latin typeface="+mn-lt"/>
+                <a:ea typeface="+mn-ea"/>
+                <a:cs typeface="+mn-cs"/>
+              </a:defRPr>
+            </a:lvl9pPr>
+          </a:lstStyle>
+          <a:p>
+            <a:endParaRPr lang="en-US" dirty="0"/>
+          </a:p>
+        </p:txBody>
+      </p:sp>
+      <p:sp>
+        <p:nvSpPr>
+          <p:cNvPr id="13" name="Content Placeholder 2">
+            <a:extLst>
+              <a:ext uri="{FF2B5EF4-FFF2-40B4-BE49-F238E27FC236}">
+                <a16:creationId xmlns:a16="http://schemas.microsoft.com/office/drawing/2014/main" id="{C5407D35-E624-1549-8316-7FC787B4327D}"/>
+              </a:ext>
+            </a:extLst>
+          </p:cNvPr>
+          <p:cNvSpPr txBox="1">
+            <a:spLocks/>
+          </p:cNvSpPr>
+          <p:nvPr/>
+        </p:nvSpPr>
+        <p:spPr>
+          <a:xfrm>
+            <a:off x="629841" y="1617368"/>
+            <a:ext cx="4249890" cy="2901878"/>
+          </a:xfrm>
+          <a:prstGeom prst="rect">
+            <a:avLst/>
+          </a:prstGeom>
+        </p:spPr>
+        <p:txBody>
+          <a:bodyPr vert="horz" lIns="91440" tIns="45720" rIns="91440" bIns="45720" rtlCol="0">
+            <a:normAutofit/>
+          </a:bodyPr>
+          <a:lstStyle>
+            <a:lvl1pPr marL="228600" indent="-228600" algn="l" defTabSz="914400" rtl="0" eaLnBrk="1" latinLnBrk="0" hangingPunct="1">
+              <a:lnSpc>
+                <a:spcPct val="90000"/>
+              </a:lnSpc>
+              <a:spcBef>
+                <a:spcPts val="1000"/>
+              </a:spcBef>
+              <a:buFont typeface="Arial" panose="020B0604020202020204" pitchFamily="34" charset="0"/>
+              <a:buChar char="•"/>
+              <a:defRPr sz="2400" kern="1200">
+                <a:solidFill>
+                  <a:schemeClr val="tx1"/>
+                </a:solidFill>
+                <a:latin typeface="Avenir Book"/>
+                <a:ea typeface="+mn-ea"/>
+                <a:cs typeface="Avenir Book"/>
+              </a:defRPr>
+            </a:lvl1pPr>
+            <a:lvl2pPr marL="685800" indent="-228600" algn="l" defTabSz="914400" rtl="0" eaLnBrk="1" latinLnBrk="0" hangingPunct="1">
+              <a:lnSpc>
+                <a:spcPct val="90000"/>
+              </a:lnSpc>
+              <a:spcBef>
+                <a:spcPts val="500"/>
+              </a:spcBef>
+              <a:buFont typeface="Arial" panose="020B0604020202020204" pitchFamily="34" charset="0"/>
+              <a:buChar char="•"/>
+              <a:defRPr sz="2400" kern="1200">
+                <a:solidFill>
+                  <a:schemeClr val="tx1"/>
+                </a:solidFill>
+                <a:latin typeface="Avenir Book"/>
+                <a:ea typeface="+mn-ea"/>
+                <a:cs typeface="Avenir Book"/>
+              </a:defRPr>
+            </a:lvl2pPr>
+            <a:lvl3pPr marL="1143000" indent="-228600" algn="l" defTabSz="914400" rtl="0" eaLnBrk="1" latinLnBrk="0" hangingPunct="1">
+              <a:lnSpc>
+                <a:spcPct val="90000"/>
+              </a:lnSpc>
+              <a:spcBef>
+                <a:spcPts val="500"/>
+              </a:spcBef>
+              <a:buFont typeface="Arial" panose="020B0604020202020204" pitchFamily="34" charset="0"/>
+              <a:buChar char="•"/>
+              <a:defRPr sz="2400" kern="1200">
+                <a:solidFill>
+                  <a:schemeClr val="tx1"/>
+                </a:solidFill>
+                <a:latin typeface="Avenir Book"/>
+                <a:ea typeface="+mn-ea"/>
+                <a:cs typeface="Avenir Book"/>
+              </a:defRPr>
+            </a:lvl3pPr>
+            <a:lvl4pPr marL="1600200" indent="-228600" algn="l" defTabSz="914400" rtl="0" eaLnBrk="1" latinLnBrk="0" hangingPunct="1">
+              <a:lnSpc>
+                <a:spcPct val="90000"/>
+              </a:lnSpc>
+              <a:spcBef>
+                <a:spcPts val="500"/>
+              </a:spcBef>
+              <a:buFont typeface="Arial" panose="020B0604020202020204" pitchFamily="34" charset="0"/>
+              <a:buChar char="•"/>
+              <a:defRPr sz="2400" kern="1200">
+                <a:solidFill>
+                  <a:schemeClr val="tx1"/>
+                </a:solidFill>
+                <a:latin typeface="Avenir Book"/>
+                <a:ea typeface="+mn-ea"/>
+                <a:cs typeface="Avenir Book"/>
+              </a:defRPr>
+            </a:lvl4pPr>
+            <a:lvl5pPr marL="2057400" indent="-228600" algn="l" defTabSz="914400" rtl="0" eaLnBrk="1" latinLnBrk="0" hangingPunct="1">
+              <a:lnSpc>
+                <a:spcPct val="90000"/>
+              </a:lnSpc>
+              <a:spcBef>
+                <a:spcPts val="500"/>
+              </a:spcBef>
+              <a:buFont typeface="Arial" panose="020B0604020202020204" pitchFamily="34" charset="0"/>
+              <a:buChar char="•"/>
+              <a:defRPr sz="2400" kern="1200">
+                <a:solidFill>
+                  <a:schemeClr val="tx1"/>
+                </a:solidFill>
+                <a:latin typeface="Avenir Book"/>
+                <a:ea typeface="+mn-ea"/>
+                <a:cs typeface="Avenir Book"/>
+              </a:defRPr>
+            </a:lvl5pPr>
+            <a:lvl6pPr marL="2514600" indent="-228600" algn="l" defTabSz="914400" rtl="0" eaLnBrk="1" latinLnBrk="0" hangingPunct="1">
+              <a:lnSpc>
+                <a:spcPct val="90000"/>
+              </a:lnSpc>
+              <a:spcBef>
+                <a:spcPts val="500"/>
+              </a:spcBef>
+              <a:buFont typeface="Arial" panose="020B0604020202020204" pitchFamily="34" charset="0"/>
+              <a:buChar char="•"/>
+              <a:defRPr sz="1800" kern="1200">
+                <a:solidFill>
+                  <a:schemeClr val="tx1"/>
+                </a:solidFill>
+                <a:latin typeface="+mn-lt"/>
+                <a:ea typeface="+mn-ea"/>
+                <a:cs typeface="+mn-cs"/>
+              </a:defRPr>
+            </a:lvl6pPr>
+            <a:lvl7pPr marL="2971800" indent="-228600" algn="l" defTabSz="914400" rtl="0" eaLnBrk="1" latinLnBrk="0" hangingPunct="1">
+              <a:lnSpc>
+                <a:spcPct val="90000"/>
+              </a:lnSpc>
+              <a:spcBef>
+                <a:spcPts val="500"/>
+              </a:spcBef>
+              <a:buFont typeface="Arial" panose="020B0604020202020204" pitchFamily="34" charset="0"/>
+              <a:buChar char="•"/>
+              <a:defRPr sz="1800" kern="1200">
+                <a:solidFill>
+                  <a:schemeClr val="tx1"/>
+                </a:solidFill>
+                <a:latin typeface="+mn-lt"/>
+                <a:ea typeface="+mn-ea"/>
+                <a:cs typeface="+mn-cs"/>
+              </a:defRPr>
+            </a:lvl7pPr>
+            <a:lvl8pPr marL="3429000" indent="-228600" algn="l" defTabSz="914400" rtl="0" eaLnBrk="1" latinLnBrk="0" hangingPunct="1">
+              <a:lnSpc>
+                <a:spcPct val="90000"/>
+              </a:lnSpc>
+              <a:spcBef>
+                <a:spcPts val="500"/>
+              </a:spcBef>
+              <a:buFont typeface="Arial" panose="020B0604020202020204" pitchFamily="34" charset="0"/>
+              <a:buChar char="•"/>
+              <a:defRPr sz="1800" kern="1200">
+                <a:solidFill>
+                  <a:schemeClr val="tx1"/>
+                </a:solidFill>
+                <a:latin typeface="+mn-lt"/>
+                <a:ea typeface="+mn-ea"/>
+                <a:cs typeface="+mn-cs"/>
+              </a:defRPr>
+            </a:lvl8pPr>
+            <a:lvl9pPr marL="3886200" indent="-228600" algn="l" defTabSz="914400" rtl="0" eaLnBrk="1" latinLnBrk="0" hangingPunct="1">
+              <a:lnSpc>
+                <a:spcPct val="90000"/>
+              </a:lnSpc>
+              <a:spcBef>
+                <a:spcPts val="500"/>
+              </a:spcBef>
+              <a:buFont typeface="Arial" panose="020B0604020202020204" pitchFamily="34" charset="0"/>
+              <a:buChar char="•"/>
+              <a:defRPr sz="1800" kern="1200">
+                <a:solidFill>
+                  <a:schemeClr val="tx1"/>
+                </a:solidFill>
+                <a:latin typeface="+mn-lt"/>
+                <a:ea typeface="+mn-ea"/>
+                <a:cs typeface="+mn-cs"/>
+              </a:defRPr>
+            </a:lvl9pPr>
+          </a:lstStyle>
+          <a:p>
+            <a:r>
+              <a:rPr lang="en-US" dirty="0"/>
+              <a:t>Move the </a:t>
+            </a:r>
+            <a:r>
+              <a:rPr lang="en-US" b="1" i="1" dirty="0"/>
+              <a:t>top chunk pointer </a:t>
+            </a:r>
+            <a:r>
+              <a:rPr lang="en-US" dirty="0"/>
+              <a:t>just before the target</a:t>
+            </a:r>
+          </a:p>
+          <a:p>
+            <a:r>
+              <a:rPr lang="en-US" dirty="0"/>
+              <a:t>Ready to overwrite our target </a:t>
+            </a:r>
+            <a:r>
+              <a:rPr lang="en-US" dirty="0">
+                <a:sym typeface="Wingdings" pitchFamily="2" charset="2"/>
+              </a:rPr>
+              <a:t> </a:t>
+            </a:r>
+            <a:endParaRPr lang="en-US" dirty="0"/>
+          </a:p>
+        </p:txBody>
+      </p:sp>
+      <p:pic>
+        <p:nvPicPr>
+          <p:cNvPr id="16" name="Picture 15" descr="Top Chunk After Corruption">
+            <a:extLst>
+              <a:ext uri="{FF2B5EF4-FFF2-40B4-BE49-F238E27FC236}">
+                <a16:creationId xmlns:a16="http://schemas.microsoft.com/office/drawing/2014/main" id="{DA156D46-B53C-BE44-8FA4-AE17E228C6B3}"/>
+              </a:ext>
+            </a:extLst>
+          </p:cNvPr>
+          <p:cNvPicPr>
+            <a:picLocks noChangeAspect="1"/>
+          </p:cNvPicPr>
+          <p:nvPr/>
+        </p:nvPicPr>
+        <p:blipFill>
+          <a:blip r:embed="rId2"/>
+          <a:stretch>
+            <a:fillRect/>
+          </a:stretch>
+        </p:blipFill>
+        <p:spPr>
+          <a:xfrm>
+            <a:off x="6230278" y="1626846"/>
+            <a:ext cx="2595180" cy="3431878"/>
+          </a:xfrm>
+          <a:prstGeom prst="rect">
+            <a:avLst/>
+          </a:prstGeom>
+          <a:noFill/>
+        </p:spPr>
+      </p:pic>
+      <p:sp>
+        <p:nvSpPr>
+          <p:cNvPr id="17" name="TextBox 16">
+            <a:extLst>
+              <a:ext uri="{FF2B5EF4-FFF2-40B4-BE49-F238E27FC236}">
+                <a16:creationId xmlns:a16="http://schemas.microsoft.com/office/drawing/2014/main" id="{99ED4C11-32BC-0149-8B92-58154E581988}"/>
+              </a:ext>
+            </a:extLst>
+          </p:cNvPr>
+          <p:cNvSpPr txBox="1"/>
+          <p:nvPr/>
+        </p:nvSpPr>
+        <p:spPr>
+          <a:xfrm>
+            <a:off x="4695846" y="4757475"/>
+            <a:ext cx="764697" cy="369332"/>
+          </a:xfrm>
+          <a:prstGeom prst="rect">
+            <a:avLst/>
+          </a:prstGeom>
+          <a:noFill/>
+        </p:spPr>
+        <p:txBody>
+          <a:bodyPr wrap="none" rtlCol="0">
+            <a:spAutoFit/>
+          </a:bodyPr>
+          <a:lstStyle/>
+          <a:p>
+            <a:r>
+              <a:rPr lang="en-US" dirty="0">
+                <a:solidFill>
+                  <a:srgbClr val="FF0000"/>
+                </a:solidFill>
+              </a:rPr>
+              <a:t>Target</a:t>
+            </a:r>
+          </a:p>
+        </p:txBody>
+      </p:sp>
+      <p:sp>
+        <p:nvSpPr>
+          <p:cNvPr id="18" name="TextBox 17">
+            <a:extLst>
+              <a:ext uri="{FF2B5EF4-FFF2-40B4-BE49-F238E27FC236}">
+                <a16:creationId xmlns:a16="http://schemas.microsoft.com/office/drawing/2014/main" id="{675B7781-515A-B248-BB9E-75D714AFF458}"/>
+              </a:ext>
+            </a:extLst>
+          </p:cNvPr>
+          <p:cNvSpPr txBox="1"/>
+          <p:nvPr/>
+        </p:nvSpPr>
+        <p:spPr>
+          <a:xfrm>
+            <a:off x="4438926" y="4394725"/>
+            <a:ext cx="1140377" cy="369332"/>
+          </a:xfrm>
+          <a:prstGeom prst="rect">
+            <a:avLst/>
+          </a:prstGeom>
+          <a:noFill/>
+        </p:spPr>
+        <p:txBody>
+          <a:bodyPr wrap="none" rtlCol="0">
+            <a:spAutoFit/>
+          </a:bodyPr>
+          <a:lstStyle/>
+          <a:p>
+            <a:r>
+              <a:rPr lang="en-US" dirty="0">
+                <a:solidFill>
+                  <a:srgbClr val="00B050"/>
+                </a:solidFill>
+              </a:rPr>
+              <a:t>Top chunk</a:t>
+            </a:r>
+          </a:p>
+        </p:txBody>
+      </p:sp>
+      <p:cxnSp>
+        <p:nvCxnSpPr>
+          <p:cNvPr id="19" name="Straight Arrow Connector 18">
+            <a:extLst>
+              <a:ext uri="{FF2B5EF4-FFF2-40B4-BE49-F238E27FC236}">
+                <a16:creationId xmlns:a16="http://schemas.microsoft.com/office/drawing/2014/main" id="{EC671739-32B2-EE41-A3A5-C6917420E85A}"/>
+              </a:ext>
+            </a:extLst>
+          </p:cNvPr>
+          <p:cNvCxnSpPr>
+            <a:cxnSpLocks/>
+          </p:cNvCxnSpPr>
+          <p:nvPr/>
+        </p:nvCxnSpPr>
+        <p:spPr>
+          <a:xfrm>
+            <a:off x="5514495" y="4592394"/>
+            <a:ext cx="719601" cy="0"/>
+          </a:xfrm>
+          <a:prstGeom prst="straightConnector1">
+            <a:avLst/>
+          </a:prstGeom>
+          <a:ln w="57150">
+            <a:solidFill>
+              <a:srgbClr val="FF0000"/>
+            </a:solidFill>
+            <a:tailEnd type="triangle"/>
+          </a:ln>
+        </p:spPr>
+        <p:style>
+          <a:lnRef idx="1">
+            <a:schemeClr val="accent1"/>
+          </a:lnRef>
+          <a:fillRef idx="0">
+            <a:schemeClr val="accent1"/>
+          </a:fillRef>
+          <a:effectRef idx="0">
+            <a:schemeClr val="accent1"/>
+          </a:effectRef>
+          <a:fontRef idx="minor">
+            <a:schemeClr val="tx1"/>
+          </a:fontRef>
+        </p:style>
+      </p:cxnSp>
+      <p:cxnSp>
+        <p:nvCxnSpPr>
+          <p:cNvPr id="20" name="Straight Connector 19">
+            <a:extLst>
+              <a:ext uri="{FF2B5EF4-FFF2-40B4-BE49-F238E27FC236}">
+                <a16:creationId xmlns:a16="http://schemas.microsoft.com/office/drawing/2014/main" id="{EDD92D28-863D-354F-A99A-706ACECC8F17}"/>
+              </a:ext>
+            </a:extLst>
+          </p:cNvPr>
+          <p:cNvCxnSpPr>
+            <a:cxnSpLocks/>
+          </p:cNvCxnSpPr>
+          <p:nvPr/>
+        </p:nvCxnSpPr>
+        <p:spPr>
+          <a:xfrm>
+            <a:off x="5511837" y="4592394"/>
+            <a:ext cx="2658" cy="343325"/>
+          </a:xfrm>
+          <a:prstGeom prst="line">
+            <a:avLst/>
+          </a:prstGeom>
+          <a:ln w="47625">
+            <a:solidFill>
+              <a:srgbClr val="FF0000"/>
+            </a:solidFill>
+          </a:ln>
+        </p:spPr>
+        <p:style>
+          <a:lnRef idx="1">
+            <a:schemeClr val="accent1"/>
+          </a:lnRef>
+          <a:fillRef idx="0">
+            <a:schemeClr val="accent1"/>
+          </a:fillRef>
+          <a:effectRef idx="0">
+            <a:schemeClr val="accent1"/>
+          </a:effectRef>
+          <a:fontRef idx="minor">
+            <a:schemeClr val="tx1"/>
+          </a:fontRef>
+        </p:style>
+      </p:cxnSp>
+      <p:cxnSp>
+        <p:nvCxnSpPr>
+          <p:cNvPr id="21" name="Straight Arrow Connector 20">
+            <a:extLst>
+              <a:ext uri="{FF2B5EF4-FFF2-40B4-BE49-F238E27FC236}">
+                <a16:creationId xmlns:a16="http://schemas.microsoft.com/office/drawing/2014/main" id="{49D61C90-A9BE-2D45-8754-AACA8A01B3AE}"/>
+              </a:ext>
+            </a:extLst>
+          </p:cNvPr>
+          <p:cNvCxnSpPr>
+            <a:cxnSpLocks/>
+          </p:cNvCxnSpPr>
+          <p:nvPr/>
+        </p:nvCxnSpPr>
+        <p:spPr>
+          <a:xfrm>
+            <a:off x="5514495" y="4935719"/>
+            <a:ext cx="719601" cy="0"/>
+          </a:xfrm>
+          <a:prstGeom prst="straightConnector1">
+            <a:avLst/>
+          </a:prstGeom>
+          <a:ln w="57150">
+            <a:solidFill>
+              <a:srgbClr val="FF0000"/>
+            </a:solidFill>
+            <a:tailEnd type="triangle"/>
+          </a:ln>
+        </p:spPr>
+        <p:style>
+          <a:lnRef idx="1">
+            <a:schemeClr val="accent1"/>
+          </a:lnRef>
+          <a:fillRef idx="0">
+            <a:schemeClr val="accent1"/>
+          </a:fillRef>
+          <a:effectRef idx="0">
+            <a:schemeClr val="accent1"/>
+          </a:effectRef>
+          <a:fontRef idx="minor">
+            <a:schemeClr val="tx1"/>
+          </a:fontRef>
+        </p:style>
+      </p:cxnSp>
+    </p:spTree>
+    <p:extLst>
+      <p:ext uri="{BB962C8B-B14F-4D97-AF65-F5344CB8AC3E}">
+        <p14:creationId xmlns:p14="http://schemas.microsoft.com/office/powerpoint/2010/main" val="601213896"/>
+      </p:ext>
+    </p:extLst>
+  </p:cSld>
+  <p:clrMapOvr>
+    <a:masterClrMapping/>
+  </p:clrMapOvr>
+</p:sld>
+</file>
+
+<file path=ppt/slides/slide26.xml><?xml version="1.0" encoding="utf-8"?>
+<p:sld xmlns:a="http://schemas.openxmlformats.org/drawingml/2006/main" xmlns:r="http://schemas.openxmlformats.org/officeDocument/2006/relationships" xmlns:p="http://schemas.openxmlformats.org/presentationml/2006/main">
+  <p:cSld>
+    <p:spTree>
+      <p:nvGrpSpPr>
+        <p:cNvPr id="1" name=""/>
+        <p:cNvGrpSpPr/>
+        <p:nvPr/>
+      </p:nvGrpSpPr>
+      <p:grpSpPr>
+        <a:xfrm>
+          <a:off x="0" y="0"/>
+          <a:ext cx="0" cy="0"/>
+          <a:chOff x="0" y="0"/>
+          <a:chExt cx="0" cy="0"/>
+        </a:xfrm>
+      </p:grpSpPr>
+      <p:sp>
+        <p:nvSpPr>
+          <p:cNvPr id="2" name="Title 1">
+            <a:extLst>
+              <a:ext uri="{FF2B5EF4-FFF2-40B4-BE49-F238E27FC236}">
+                <a16:creationId xmlns:a16="http://schemas.microsoft.com/office/drawing/2014/main" id="{FCB0CC07-4340-E940-9C92-652BD57A446B}"/>
+              </a:ext>
+            </a:extLst>
+          </p:cNvPr>
+          <p:cNvSpPr>
+            <a:spLocks noGrp="1"/>
+          </p:cNvSpPr>
+          <p:nvPr>
+            <p:ph type="title"/>
+          </p:nvPr>
+        </p:nvSpPr>
+        <p:spPr>
+          <a:xfrm>
+            <a:off x="629841" y="342900"/>
+            <a:ext cx="2949178" cy="1200150"/>
+          </a:xfrm>
+        </p:spPr>
+        <p:txBody>
+          <a:bodyPr anchor="b">
+            <a:normAutofit/>
+          </a:bodyPr>
+          <a:lstStyle/>
+          <a:p>
+            <a:r>
+              <a:rPr lang="en-US" dirty="0"/>
+              <a:t>Havoc Causing </a:t>
+            </a:r>
+            <a:r>
+              <a:rPr lang="en-US" dirty="0">
+                <a:sym typeface="Wingdings" pitchFamily="2" charset="2"/>
+              </a:rPr>
+              <a:t></a:t>
+            </a:r>
+            <a:endParaRPr lang="en-US" dirty="0"/>
+          </a:p>
+        </p:txBody>
+      </p:sp>
+      <p:sp>
+        <p:nvSpPr>
+          <p:cNvPr id="14" name="Text Placeholder 3">
+            <a:extLst>
+              <a:ext uri="{FF2B5EF4-FFF2-40B4-BE49-F238E27FC236}">
+                <a16:creationId xmlns:a16="http://schemas.microsoft.com/office/drawing/2014/main" id="{60FA88BD-D51B-474C-A880-FE8812476686}"/>
+              </a:ext>
+            </a:extLst>
+          </p:cNvPr>
+          <p:cNvSpPr>
+            <a:spLocks noGrp="1"/>
+          </p:cNvSpPr>
+          <p:nvPr>
+            <p:ph type="body" sz="half" idx="2"/>
+          </p:nvPr>
+        </p:nvSpPr>
+        <p:spPr>
+          <a:xfrm>
+            <a:off x="629841" y="1543052"/>
+            <a:ext cx="2949178" cy="2858691"/>
+          </a:xfrm>
+        </p:spPr>
+        <p:txBody>
+          <a:bodyPr>
+            <a:normAutofit lnSpcReduction="10000"/>
+          </a:bodyPr>
+          <a:lstStyle/>
+          <a:p>
+            <a:pPr marL="285750" indent="-285750">
+              <a:buFont typeface="Arial" panose="020B0604020202020204" pitchFamily="34" charset="0"/>
+              <a:buChar char="•"/>
+            </a:pPr>
+            <a:r>
+              <a:rPr lang="en-US" dirty="0"/>
+              <a:t>Victim: </a:t>
+            </a:r>
+          </a:p>
+          <a:p>
+            <a:pPr marL="742950" lvl="1" indent="-285750">
+              <a:buFont typeface="Arial" panose="020B0604020202020204" pitchFamily="34" charset="0"/>
+              <a:buChar char="•"/>
+            </a:pPr>
+            <a:r>
+              <a:rPr lang="en-US" dirty="0"/>
+              <a:t>Pointer to the top chunk</a:t>
+            </a:r>
+          </a:p>
+          <a:p>
+            <a:pPr marL="285750" indent="-285750">
+              <a:buFont typeface="Arial" panose="020B0604020202020204" pitchFamily="34" charset="0"/>
+              <a:buChar char="•"/>
+            </a:pPr>
+            <a:r>
+              <a:rPr lang="en-US" dirty="0"/>
+              <a:t>Size: </a:t>
+            </a:r>
+          </a:p>
+          <a:p>
+            <a:pPr marL="742950" lvl="1" indent="-285750">
+              <a:buFont typeface="Arial" panose="020B0604020202020204" pitchFamily="34" charset="0"/>
+              <a:buChar char="•"/>
+            </a:pPr>
+            <a:r>
+              <a:rPr lang="en-US" dirty="0"/>
+              <a:t>Size of the top chunk</a:t>
+            </a:r>
+          </a:p>
+          <a:p>
+            <a:pPr marL="285750" indent="-285750">
+              <a:buFont typeface="Arial" panose="020B0604020202020204" pitchFamily="34" charset="0"/>
+              <a:buChar char="•"/>
+            </a:pPr>
+            <a:r>
+              <a:rPr lang="en-US" dirty="0" err="1"/>
+              <a:t>Nb</a:t>
+            </a:r>
+            <a:r>
+              <a:rPr lang="en-US" dirty="0"/>
+              <a:t>: </a:t>
+            </a:r>
+          </a:p>
+          <a:p>
+            <a:pPr marL="742950" lvl="1" indent="-285750">
+              <a:buFont typeface="Arial" panose="020B0604020202020204" pitchFamily="34" charset="0"/>
+              <a:buChar char="•"/>
+            </a:pPr>
+            <a:r>
+              <a:rPr lang="en-US" dirty="0"/>
+              <a:t>Amount of memory asked for</a:t>
+            </a:r>
+          </a:p>
+          <a:p>
+            <a:pPr marL="285750" indent="-285750">
+              <a:buFont typeface="Arial" panose="020B0604020202020204" pitchFamily="34" charset="0"/>
+              <a:buChar char="•"/>
+            </a:pPr>
+            <a:endParaRPr lang="en-US" dirty="0"/>
+          </a:p>
+          <a:p>
+            <a:pPr marL="285750" indent="-285750">
+              <a:buFont typeface="Arial" panose="020B0604020202020204" pitchFamily="34" charset="0"/>
+              <a:buChar char="•"/>
+            </a:pPr>
+            <a:r>
+              <a:rPr lang="en-US" dirty="0"/>
+              <a:t>No logic for protections against crazy large chunk sizes!</a:t>
+            </a:r>
+          </a:p>
+          <a:p>
+            <a:pPr marL="285750" indent="-285750">
+              <a:buFont typeface="Arial" panose="020B0604020202020204" pitchFamily="34" charset="0"/>
+              <a:buChar char="•"/>
+            </a:pPr>
+            <a:endParaRPr lang="en-US" dirty="0"/>
+          </a:p>
+          <a:p>
+            <a:pPr marL="285750" indent="-285750">
+              <a:buFont typeface="Arial" panose="020B0604020202020204" pitchFamily="34" charset="0"/>
+              <a:buChar char="•"/>
+            </a:pPr>
+            <a:endParaRPr lang="en-US" dirty="0"/>
+          </a:p>
+        </p:txBody>
+      </p:sp>
+      <p:pic>
+        <p:nvPicPr>
+          <p:cNvPr id="9" name="Content Placeholder 8" descr="A picture containing text&#10;&#10;Description automatically generated">
+            <a:extLst>
+              <a:ext uri="{FF2B5EF4-FFF2-40B4-BE49-F238E27FC236}">
+                <a16:creationId xmlns:a16="http://schemas.microsoft.com/office/drawing/2014/main" id="{D5EDF6A9-B44C-2145-901C-8B24E0197154}"/>
+              </a:ext>
+            </a:extLst>
+          </p:cNvPr>
+          <p:cNvPicPr>
+            <a:picLocks noChangeAspect="1"/>
+          </p:cNvPicPr>
+          <p:nvPr/>
+        </p:nvPicPr>
+        <p:blipFill rotWithShape="1">
+          <a:blip r:embed="rId3"/>
+          <a:srcRect r="48098"/>
+          <a:stretch/>
+        </p:blipFill>
+        <p:spPr>
+          <a:xfrm>
+            <a:off x="3885009" y="483021"/>
+            <a:ext cx="4629150" cy="2574226"/>
+          </a:xfrm>
+          <a:prstGeom prst="rect">
+            <a:avLst/>
+          </a:prstGeom>
+          <a:noFill/>
+        </p:spPr>
+      </p:pic>
+      <p:pic>
+        <p:nvPicPr>
+          <p:cNvPr id="6" name="Content Placeholder 5" descr="Creating the new user chunk">
+            <a:extLst>
+              <a:ext uri="{FF2B5EF4-FFF2-40B4-BE49-F238E27FC236}">
+                <a16:creationId xmlns:a16="http://schemas.microsoft.com/office/drawing/2014/main" id="{3A8F00F6-6826-CE4F-B819-470015E05B0A}"/>
+              </a:ext>
+            </a:extLst>
+          </p:cNvPr>
+          <p:cNvPicPr>
+            <a:picLocks noGrp="1" noChangeAspect="1"/>
+          </p:cNvPicPr>
+          <p:nvPr>
+            <p:ph idx="1"/>
+          </p:nvPr>
+        </p:nvPicPr>
+        <p:blipFill>
+          <a:blip r:embed="rId4"/>
+          <a:stretch>
+            <a:fillRect/>
+          </a:stretch>
+        </p:blipFill>
+        <p:spPr>
+          <a:xfrm>
+            <a:off x="4429326" y="1862545"/>
+            <a:ext cx="4519365" cy="1014550"/>
+          </a:xfrm>
+        </p:spPr>
+      </p:pic>
+      <p:cxnSp>
+        <p:nvCxnSpPr>
+          <p:cNvPr id="11" name="Straight Connector 10">
+            <a:extLst>
+              <a:ext uri="{FF2B5EF4-FFF2-40B4-BE49-F238E27FC236}">
+                <a16:creationId xmlns:a16="http://schemas.microsoft.com/office/drawing/2014/main" id="{8E4F8849-3C75-FB49-8C5A-052FAA6BF5E2}"/>
+              </a:ext>
+            </a:extLst>
+          </p:cNvPr>
+          <p:cNvCxnSpPr>
+            <a:cxnSpLocks/>
+          </p:cNvCxnSpPr>
+          <p:nvPr/>
+        </p:nvCxnSpPr>
+        <p:spPr>
+          <a:xfrm>
+            <a:off x="4572000" y="2491851"/>
+            <a:ext cx="4190260" cy="0"/>
+          </a:xfrm>
+          <a:prstGeom prst="line">
+            <a:avLst/>
+          </a:prstGeom>
+          <a:ln w="57150">
+            <a:solidFill>
+              <a:srgbClr val="FF0000"/>
+            </a:solidFill>
+          </a:ln>
+        </p:spPr>
+        <p:style>
+          <a:lnRef idx="1">
+            <a:schemeClr val="accent2"/>
+          </a:lnRef>
+          <a:fillRef idx="0">
+            <a:schemeClr val="accent2"/>
+          </a:fillRef>
+          <a:effectRef idx="0">
+            <a:schemeClr val="accent2"/>
+          </a:effectRef>
+          <a:fontRef idx="minor">
+            <a:schemeClr val="tx1"/>
+          </a:fontRef>
+        </p:style>
+      </p:cxnSp>
+    </p:spTree>
+    <p:extLst>
+      <p:ext uri="{BB962C8B-B14F-4D97-AF65-F5344CB8AC3E}">
+        <p14:creationId xmlns:p14="http://schemas.microsoft.com/office/powerpoint/2010/main" val="3376890541"/>
+      </p:ext>
+    </p:extLst>
+  </p:cSld>
+  <p:clrMapOvr>
+    <a:masterClrMapping/>
+  </p:clrMapOvr>
+</p:sld>
+</file>
+
+<file path=ppt/slides/slide27.xml><?xml version="1.0" encoding="utf-8"?>
+<p:sld xmlns:a="http://schemas.openxmlformats.org/drawingml/2006/main" xmlns:r="http://schemas.openxmlformats.org/officeDocument/2006/relationships" xmlns:p="http://schemas.openxmlformats.org/presentationml/2006/main">
+  <p:cSld>
+    <p:spTree>
+      <p:nvGrpSpPr>
+        <p:cNvPr id="1" name=""/>
+        <p:cNvGrpSpPr/>
+        <p:nvPr/>
+      </p:nvGrpSpPr>
+      <p:grpSpPr>
+        <a:xfrm>
+          <a:off x="0" y="0"/>
+          <a:ext cx="0" cy="0"/>
+          <a:chOff x="0" y="0"/>
+          <a:chExt cx="0" cy="0"/>
+        </a:xfrm>
+      </p:grpSpPr>
+      <p:sp>
+        <p:nvSpPr>
+          <p:cNvPr id="2" name="Title 1">
+            <a:extLst>
+              <a:ext uri="{FF2B5EF4-FFF2-40B4-BE49-F238E27FC236}">
                 <a16:creationId xmlns:a16="http://schemas.microsoft.com/office/drawing/2014/main" id="{A10A7709-FD6C-B04E-8F0B-FE511A82C787}"/>
               </a:ext>
             </a:extLst>
@@ -37328,7 +39039,7 @@
 </p:sld>
 </file>
 
-<file path=ppt/slides/slide26.xml><?xml version="1.0" encoding="utf-8"?>
+<file path=ppt/slides/slide28.xml><?xml version="1.0" encoding="utf-8"?>
 <p:sld xmlns:a="http://schemas.openxmlformats.org/drawingml/2006/main" xmlns:r="http://schemas.openxmlformats.org/officeDocument/2006/relationships" xmlns:p="http://schemas.openxmlformats.org/presentationml/2006/main">
   <p:cSld>
     <p:spTree>
@@ -37572,7 +39283,7 @@
 </p:sld>
 </file>
 
-<file path=ppt/slides/slide27.xml><?xml version="1.0" encoding="utf-8"?>
+<file path=ppt/slides/slide29.xml><?xml version="1.0" encoding="utf-8"?>
 <p:sld xmlns:a="http://schemas.openxmlformats.org/drawingml/2006/main" xmlns:r="http://schemas.openxmlformats.org/officeDocument/2006/relationships" xmlns:p="http://schemas.openxmlformats.org/presentationml/2006/main">
   <p:cSld>
     <p:spTree>
@@ -37730,7 +39441,325 @@
 </p:sld>
 </file>
 
-<file path=ppt/slides/slide28.xml><?xml version="1.0" encoding="utf-8"?>
+<file path=ppt/slides/slide3.xml><?xml version="1.0" encoding="utf-8"?>
+<p:sld xmlns:a="http://schemas.openxmlformats.org/drawingml/2006/main" xmlns:r="http://schemas.openxmlformats.org/officeDocument/2006/relationships" xmlns:p="http://schemas.openxmlformats.org/presentationml/2006/main">
+  <p:cSld>
+    <p:spTree>
+      <p:nvGrpSpPr>
+        <p:cNvPr id="1" name=""/>
+        <p:cNvGrpSpPr/>
+        <p:nvPr/>
+      </p:nvGrpSpPr>
+      <p:grpSpPr>
+        <a:xfrm>
+          <a:off x="0" y="0"/>
+          <a:ext cx="0" cy="0"/>
+          <a:chOff x="0" y="0"/>
+          <a:chExt cx="0" cy="0"/>
+        </a:xfrm>
+      </p:grpSpPr>
+      <p:sp>
+        <p:nvSpPr>
+          <p:cNvPr id="2" name="Title 1">
+            <a:extLst>
+              <a:ext uri="{FF2B5EF4-FFF2-40B4-BE49-F238E27FC236}">
+                <a16:creationId xmlns:a16="http://schemas.microsoft.com/office/drawing/2014/main" id="{496A2660-C8FE-1445-B170-34232396C7B1}"/>
+              </a:ext>
+            </a:extLst>
+          </p:cNvPr>
+          <p:cNvSpPr>
+            <a:spLocks noGrp="1"/>
+          </p:cNvSpPr>
+          <p:nvPr>
+            <p:ph type="title"/>
+          </p:nvPr>
+        </p:nvSpPr>
+        <p:spPr/>
+        <p:txBody>
+          <a:bodyPr/>
+          <a:lstStyle/>
+          <a:p>
+            <a:r>
+              <a:rPr lang="en-US" dirty="0"/>
+              <a:t>Top Chunk - 1</a:t>
+            </a:r>
+          </a:p>
+        </p:txBody>
+      </p:sp>
+      <p:sp>
+        <p:nvSpPr>
+          <p:cNvPr id="3" name="Content Placeholder 2">
+            <a:extLst>
+              <a:ext uri="{FF2B5EF4-FFF2-40B4-BE49-F238E27FC236}">
+                <a16:creationId xmlns:a16="http://schemas.microsoft.com/office/drawing/2014/main" id="{19A651E9-27DF-FA46-9C12-B918D240929A}"/>
+              </a:ext>
+            </a:extLst>
+          </p:cNvPr>
+          <p:cNvSpPr>
+            <a:spLocks noGrp="1"/>
+          </p:cNvSpPr>
+          <p:nvPr>
+            <p:ph idx="1"/>
+          </p:nvPr>
+        </p:nvSpPr>
+        <p:spPr>
+          <a:xfrm>
+            <a:off x="628650" y="1236540"/>
+            <a:ext cx="4506620" cy="3814853"/>
+          </a:xfrm>
+        </p:spPr>
+        <p:txBody>
+          <a:bodyPr>
+            <a:normAutofit/>
+          </a:bodyPr>
+          <a:lstStyle/>
+          <a:p>
+            <a:r>
+              <a:rPr lang="en-US" dirty="0"/>
+              <a:t>Remember the </a:t>
+            </a:r>
+            <a:r>
+              <a:rPr lang="en-US" b="1" i="1" dirty="0" err="1"/>
+              <a:t>sbrk</a:t>
+            </a:r>
+            <a:r>
+              <a:rPr lang="en-US" dirty="0"/>
+              <a:t> allocation at the beginning?</a:t>
+            </a:r>
+          </a:p>
+          <a:p>
+            <a:r>
+              <a:rPr lang="en-US" dirty="0"/>
+              <a:t>Just holds a size for the total amount of </a:t>
+            </a:r>
+            <a:r>
+              <a:rPr lang="en-US" b="1" i="1" dirty="0"/>
+              <a:t>memory left </a:t>
+            </a:r>
+            <a:r>
+              <a:rPr lang="en-US" dirty="0"/>
+              <a:t>in this </a:t>
+            </a:r>
+            <a:r>
+              <a:rPr lang="en-US" b="1" i="1" dirty="0" err="1"/>
+              <a:t>sbrk</a:t>
+            </a:r>
+            <a:r>
+              <a:rPr lang="en-US" dirty="0"/>
+              <a:t> allocation</a:t>
+            </a:r>
+          </a:p>
+          <a:p>
+            <a:r>
+              <a:rPr lang="en-US" dirty="0"/>
+              <a:t>At the top of the heap segment</a:t>
+            </a:r>
+          </a:p>
+          <a:p>
+            <a:r>
+              <a:rPr lang="en-US" dirty="0">
+                <a:solidFill>
+                  <a:srgbClr val="FF0000"/>
+                </a:solidFill>
+              </a:rPr>
+              <a:t>Redlines</a:t>
+            </a:r>
+            <a:r>
+              <a:rPr lang="en-US" dirty="0"/>
+              <a:t> is the </a:t>
+            </a:r>
+            <a:r>
+              <a:rPr lang="en-US" i="1" dirty="0"/>
+              <a:t>entire</a:t>
+            </a:r>
+            <a:r>
+              <a:rPr lang="en-US" dirty="0"/>
+              <a:t> size of the top chunk</a:t>
+            </a:r>
+          </a:p>
+          <a:p>
+            <a:pPr marL="0" indent="0">
+              <a:buNone/>
+            </a:pPr>
+            <a:endParaRPr lang="en-US" dirty="0"/>
+          </a:p>
+        </p:txBody>
+      </p:sp>
+      <p:pic>
+        <p:nvPicPr>
+          <p:cNvPr id="5" name="Picture 4" descr="Top Chunk">
+            <a:extLst>
+              <a:ext uri="{FF2B5EF4-FFF2-40B4-BE49-F238E27FC236}">
+                <a16:creationId xmlns:a16="http://schemas.microsoft.com/office/drawing/2014/main" id="{CEE51AF2-F9D0-8942-876F-E0AD7F4853B3}"/>
+              </a:ext>
+            </a:extLst>
+          </p:cNvPr>
+          <p:cNvPicPr>
+            <a:picLocks noChangeAspect="1"/>
+          </p:cNvPicPr>
+          <p:nvPr/>
+        </p:nvPicPr>
+        <p:blipFill>
+          <a:blip r:embed="rId2"/>
+          <a:stretch>
+            <a:fillRect/>
+          </a:stretch>
+        </p:blipFill>
+        <p:spPr>
+          <a:xfrm>
+            <a:off x="6169263" y="147871"/>
+            <a:ext cx="2753030" cy="4235430"/>
+          </a:xfrm>
+          <a:prstGeom prst="rect">
+            <a:avLst/>
+          </a:prstGeom>
+        </p:spPr>
+      </p:pic>
+      <p:cxnSp>
+        <p:nvCxnSpPr>
+          <p:cNvPr id="6" name="Straight Arrow Connector 5">
+            <a:extLst>
+              <a:ext uri="{FF2B5EF4-FFF2-40B4-BE49-F238E27FC236}">
+                <a16:creationId xmlns:a16="http://schemas.microsoft.com/office/drawing/2014/main" id="{EDD0F7A8-1CDA-944C-A465-21BADE43F523}"/>
+              </a:ext>
+            </a:extLst>
+          </p:cNvPr>
+          <p:cNvCxnSpPr>
+            <a:cxnSpLocks/>
+          </p:cNvCxnSpPr>
+          <p:nvPr/>
+        </p:nvCxnSpPr>
+        <p:spPr>
+          <a:xfrm>
+            <a:off x="5449662" y="1387088"/>
+            <a:ext cx="719601" cy="0"/>
+          </a:xfrm>
+          <a:prstGeom prst="straightConnector1">
+            <a:avLst/>
+          </a:prstGeom>
+          <a:ln w="57150">
+            <a:solidFill>
+              <a:srgbClr val="FF0000"/>
+            </a:solidFill>
+            <a:tailEnd type="triangle"/>
+          </a:ln>
+        </p:spPr>
+        <p:style>
+          <a:lnRef idx="1">
+            <a:schemeClr val="accent1"/>
+          </a:lnRef>
+          <a:fillRef idx="0">
+            <a:schemeClr val="accent1"/>
+          </a:fillRef>
+          <a:effectRef idx="0">
+            <a:schemeClr val="accent1"/>
+          </a:effectRef>
+          <a:fontRef idx="minor">
+            <a:schemeClr val="tx1"/>
+          </a:fontRef>
+        </p:style>
+      </p:cxnSp>
+      <p:cxnSp>
+        <p:nvCxnSpPr>
+          <p:cNvPr id="7" name="Straight Connector 6">
+            <a:extLst>
+              <a:ext uri="{FF2B5EF4-FFF2-40B4-BE49-F238E27FC236}">
+                <a16:creationId xmlns:a16="http://schemas.microsoft.com/office/drawing/2014/main" id="{9AF68EA6-F65F-0F4B-A06F-A572267718A5}"/>
+              </a:ext>
+            </a:extLst>
+          </p:cNvPr>
+          <p:cNvCxnSpPr>
+            <a:cxnSpLocks/>
+          </p:cNvCxnSpPr>
+          <p:nvPr/>
+        </p:nvCxnSpPr>
+        <p:spPr>
+          <a:xfrm>
+            <a:off x="5477166" y="1387088"/>
+            <a:ext cx="17905" cy="2244135"/>
+          </a:xfrm>
+          <a:prstGeom prst="line">
+            <a:avLst/>
+          </a:prstGeom>
+          <a:ln w="47625">
+            <a:solidFill>
+              <a:srgbClr val="FF0000"/>
+            </a:solidFill>
+          </a:ln>
+        </p:spPr>
+        <p:style>
+          <a:lnRef idx="1">
+            <a:schemeClr val="accent1"/>
+          </a:lnRef>
+          <a:fillRef idx="0">
+            <a:schemeClr val="accent1"/>
+          </a:fillRef>
+          <a:effectRef idx="0">
+            <a:schemeClr val="accent1"/>
+          </a:effectRef>
+          <a:fontRef idx="minor">
+            <a:schemeClr val="tx1"/>
+          </a:fontRef>
+        </p:style>
+      </p:cxnSp>
+      <p:cxnSp>
+        <p:nvCxnSpPr>
+          <p:cNvPr id="8" name="Straight Arrow Connector 7">
+            <a:extLst>
+              <a:ext uri="{FF2B5EF4-FFF2-40B4-BE49-F238E27FC236}">
+                <a16:creationId xmlns:a16="http://schemas.microsoft.com/office/drawing/2014/main" id="{64F6C6EF-DDE4-254F-AD92-49C71D22E36F}"/>
+              </a:ext>
+            </a:extLst>
+          </p:cNvPr>
+          <p:cNvCxnSpPr>
+            <a:cxnSpLocks/>
+          </p:cNvCxnSpPr>
+          <p:nvPr/>
+        </p:nvCxnSpPr>
+        <p:spPr>
+          <a:xfrm>
+            <a:off x="5495071" y="3631223"/>
+            <a:ext cx="719601" cy="0"/>
+          </a:xfrm>
+          <a:prstGeom prst="straightConnector1">
+            <a:avLst/>
+          </a:prstGeom>
+          <a:ln w="57150">
+            <a:solidFill>
+              <a:srgbClr val="FF0000"/>
+            </a:solidFill>
+            <a:tailEnd type="triangle"/>
+          </a:ln>
+        </p:spPr>
+        <p:style>
+          <a:lnRef idx="1">
+            <a:schemeClr val="accent1"/>
+          </a:lnRef>
+          <a:fillRef idx="0">
+            <a:schemeClr val="accent1"/>
+          </a:fillRef>
+          <a:effectRef idx="0">
+            <a:schemeClr val="accent1"/>
+          </a:effectRef>
+          <a:fontRef idx="minor">
+            <a:schemeClr val="tx1"/>
+          </a:fontRef>
+        </p:style>
+      </p:cxnSp>
+    </p:spTree>
+    <p:extLst>
+      <p:ext uri="{BB962C8B-B14F-4D97-AF65-F5344CB8AC3E}">
+        <p14:creationId xmlns:p14="http://schemas.microsoft.com/office/powerpoint/2010/main" val="3303566305"/>
+      </p:ext>
+    </p:extLst>
+  </p:cSld>
+  <p:clrMapOvr>
+    <a:masterClrMapping/>
+  </p:clrMapOvr>
+</p:sld>
+</file>
+
+<file path=ppt/slides/slide30.xml><?xml version="1.0" encoding="utf-8"?>
 <p:sld xmlns:a="http://schemas.openxmlformats.org/drawingml/2006/main" xmlns:r="http://schemas.openxmlformats.org/officeDocument/2006/relationships" xmlns:p="http://schemas.openxmlformats.org/presentationml/2006/main">
   <p:cSld>
     <p:spTree>
@@ -37877,7 +39906,7 @@
 </p:sld>
 </file>
 
-<file path=ppt/slides/slide29.xml><?xml version="1.0" encoding="utf-8"?>
+<file path=ppt/slides/slide31.xml><?xml version="1.0" encoding="utf-8"?>
 <p:sld xmlns:a="http://schemas.openxmlformats.org/drawingml/2006/main" xmlns:r="http://schemas.openxmlformats.org/officeDocument/2006/relationships" xmlns:p="http://schemas.openxmlformats.org/presentationml/2006/main">
   <p:cSld>
     <p:spTree>
@@ -38862,325 +40891,7 @@
 </p:sld>
 </file>
 
-<file path=ppt/slides/slide3.xml><?xml version="1.0" encoding="utf-8"?>
-<p:sld xmlns:a="http://schemas.openxmlformats.org/drawingml/2006/main" xmlns:r="http://schemas.openxmlformats.org/officeDocument/2006/relationships" xmlns:p="http://schemas.openxmlformats.org/presentationml/2006/main">
-  <p:cSld>
-    <p:spTree>
-      <p:nvGrpSpPr>
-        <p:cNvPr id="1" name=""/>
-        <p:cNvGrpSpPr/>
-        <p:nvPr/>
-      </p:nvGrpSpPr>
-      <p:grpSpPr>
-        <a:xfrm>
-          <a:off x="0" y="0"/>
-          <a:ext cx="0" cy="0"/>
-          <a:chOff x="0" y="0"/>
-          <a:chExt cx="0" cy="0"/>
-        </a:xfrm>
-      </p:grpSpPr>
-      <p:sp>
-        <p:nvSpPr>
-          <p:cNvPr id="2" name="Title 1">
-            <a:extLst>
-              <a:ext uri="{FF2B5EF4-FFF2-40B4-BE49-F238E27FC236}">
-                <a16:creationId xmlns:a16="http://schemas.microsoft.com/office/drawing/2014/main" id="{496A2660-C8FE-1445-B170-34232396C7B1}"/>
-              </a:ext>
-            </a:extLst>
-          </p:cNvPr>
-          <p:cNvSpPr>
-            <a:spLocks noGrp="1"/>
-          </p:cNvSpPr>
-          <p:nvPr>
-            <p:ph type="title"/>
-          </p:nvPr>
-        </p:nvSpPr>
-        <p:spPr/>
-        <p:txBody>
-          <a:bodyPr/>
-          <a:lstStyle/>
-          <a:p>
-            <a:r>
-              <a:rPr lang="en-US" dirty="0"/>
-              <a:t>Top Chunk - 1</a:t>
-            </a:r>
-          </a:p>
-        </p:txBody>
-      </p:sp>
-      <p:sp>
-        <p:nvSpPr>
-          <p:cNvPr id="3" name="Content Placeholder 2">
-            <a:extLst>
-              <a:ext uri="{FF2B5EF4-FFF2-40B4-BE49-F238E27FC236}">
-                <a16:creationId xmlns:a16="http://schemas.microsoft.com/office/drawing/2014/main" id="{19A651E9-27DF-FA46-9C12-B918D240929A}"/>
-              </a:ext>
-            </a:extLst>
-          </p:cNvPr>
-          <p:cNvSpPr>
-            <a:spLocks noGrp="1"/>
-          </p:cNvSpPr>
-          <p:nvPr>
-            <p:ph idx="1"/>
-          </p:nvPr>
-        </p:nvSpPr>
-        <p:spPr>
-          <a:xfrm>
-            <a:off x="628650" y="1236540"/>
-            <a:ext cx="4506620" cy="3814853"/>
-          </a:xfrm>
-        </p:spPr>
-        <p:txBody>
-          <a:bodyPr>
-            <a:normAutofit/>
-          </a:bodyPr>
-          <a:lstStyle/>
-          <a:p>
-            <a:r>
-              <a:rPr lang="en-US" dirty="0"/>
-              <a:t>Remember the </a:t>
-            </a:r>
-            <a:r>
-              <a:rPr lang="en-US" b="1" i="1" dirty="0" err="1"/>
-              <a:t>sbrk</a:t>
-            </a:r>
-            <a:r>
-              <a:rPr lang="en-US" dirty="0"/>
-              <a:t> allocation at the beginning?</a:t>
-            </a:r>
-          </a:p>
-          <a:p>
-            <a:r>
-              <a:rPr lang="en-US" dirty="0"/>
-              <a:t>Just holds a size for the total amount of </a:t>
-            </a:r>
-            <a:r>
-              <a:rPr lang="en-US" b="1" i="1" dirty="0"/>
-              <a:t>memory left </a:t>
-            </a:r>
-            <a:r>
-              <a:rPr lang="en-US" dirty="0"/>
-              <a:t>in this </a:t>
-            </a:r>
-            <a:r>
-              <a:rPr lang="en-US" b="1" i="1" dirty="0" err="1"/>
-              <a:t>sbrk</a:t>
-            </a:r>
-            <a:r>
-              <a:rPr lang="en-US" dirty="0"/>
-              <a:t> allocation</a:t>
-            </a:r>
-          </a:p>
-          <a:p>
-            <a:r>
-              <a:rPr lang="en-US" dirty="0"/>
-              <a:t>At the top of the heap segment</a:t>
-            </a:r>
-          </a:p>
-          <a:p>
-            <a:r>
-              <a:rPr lang="en-US" dirty="0">
-                <a:solidFill>
-                  <a:srgbClr val="FF0000"/>
-                </a:solidFill>
-              </a:rPr>
-              <a:t>Redlines</a:t>
-            </a:r>
-            <a:r>
-              <a:rPr lang="en-US" dirty="0"/>
-              <a:t> is the </a:t>
-            </a:r>
-            <a:r>
-              <a:rPr lang="en-US" i="1" dirty="0"/>
-              <a:t>entire</a:t>
-            </a:r>
-            <a:r>
-              <a:rPr lang="en-US" dirty="0"/>
-              <a:t> size of the top chunk</a:t>
-            </a:r>
-          </a:p>
-          <a:p>
-            <a:pPr marL="0" indent="0">
-              <a:buNone/>
-            </a:pPr>
-            <a:endParaRPr lang="en-US" dirty="0"/>
-          </a:p>
-        </p:txBody>
-      </p:sp>
-      <p:pic>
-        <p:nvPicPr>
-          <p:cNvPr id="5" name="Picture 4" descr="Top Chunk">
-            <a:extLst>
-              <a:ext uri="{FF2B5EF4-FFF2-40B4-BE49-F238E27FC236}">
-                <a16:creationId xmlns:a16="http://schemas.microsoft.com/office/drawing/2014/main" id="{CEE51AF2-F9D0-8942-876F-E0AD7F4853B3}"/>
-              </a:ext>
-            </a:extLst>
-          </p:cNvPr>
-          <p:cNvPicPr>
-            <a:picLocks noChangeAspect="1"/>
-          </p:cNvPicPr>
-          <p:nvPr/>
-        </p:nvPicPr>
-        <p:blipFill>
-          <a:blip r:embed="rId2"/>
-          <a:stretch>
-            <a:fillRect/>
-          </a:stretch>
-        </p:blipFill>
-        <p:spPr>
-          <a:xfrm>
-            <a:off x="6169263" y="147871"/>
-            <a:ext cx="2753030" cy="4235430"/>
-          </a:xfrm>
-          <a:prstGeom prst="rect">
-            <a:avLst/>
-          </a:prstGeom>
-        </p:spPr>
-      </p:pic>
-      <p:cxnSp>
-        <p:nvCxnSpPr>
-          <p:cNvPr id="6" name="Straight Arrow Connector 5">
-            <a:extLst>
-              <a:ext uri="{FF2B5EF4-FFF2-40B4-BE49-F238E27FC236}">
-                <a16:creationId xmlns:a16="http://schemas.microsoft.com/office/drawing/2014/main" id="{EDD0F7A8-1CDA-944C-A465-21BADE43F523}"/>
-              </a:ext>
-            </a:extLst>
-          </p:cNvPr>
-          <p:cNvCxnSpPr>
-            <a:cxnSpLocks/>
-          </p:cNvCxnSpPr>
-          <p:nvPr/>
-        </p:nvCxnSpPr>
-        <p:spPr>
-          <a:xfrm>
-            <a:off x="5449662" y="1387088"/>
-            <a:ext cx="719601" cy="0"/>
-          </a:xfrm>
-          <a:prstGeom prst="straightConnector1">
-            <a:avLst/>
-          </a:prstGeom>
-          <a:ln w="57150">
-            <a:solidFill>
-              <a:srgbClr val="FF0000"/>
-            </a:solidFill>
-            <a:tailEnd type="triangle"/>
-          </a:ln>
-        </p:spPr>
-        <p:style>
-          <a:lnRef idx="1">
-            <a:schemeClr val="accent1"/>
-          </a:lnRef>
-          <a:fillRef idx="0">
-            <a:schemeClr val="accent1"/>
-          </a:fillRef>
-          <a:effectRef idx="0">
-            <a:schemeClr val="accent1"/>
-          </a:effectRef>
-          <a:fontRef idx="minor">
-            <a:schemeClr val="tx1"/>
-          </a:fontRef>
-        </p:style>
-      </p:cxnSp>
-      <p:cxnSp>
-        <p:nvCxnSpPr>
-          <p:cNvPr id="7" name="Straight Connector 6">
-            <a:extLst>
-              <a:ext uri="{FF2B5EF4-FFF2-40B4-BE49-F238E27FC236}">
-                <a16:creationId xmlns:a16="http://schemas.microsoft.com/office/drawing/2014/main" id="{9AF68EA6-F65F-0F4B-A06F-A572267718A5}"/>
-              </a:ext>
-            </a:extLst>
-          </p:cNvPr>
-          <p:cNvCxnSpPr>
-            <a:cxnSpLocks/>
-          </p:cNvCxnSpPr>
-          <p:nvPr/>
-        </p:nvCxnSpPr>
-        <p:spPr>
-          <a:xfrm>
-            <a:off x="5477166" y="1387088"/>
-            <a:ext cx="17905" cy="2244135"/>
-          </a:xfrm>
-          <a:prstGeom prst="line">
-            <a:avLst/>
-          </a:prstGeom>
-          <a:ln w="47625">
-            <a:solidFill>
-              <a:srgbClr val="FF0000"/>
-            </a:solidFill>
-          </a:ln>
-        </p:spPr>
-        <p:style>
-          <a:lnRef idx="1">
-            <a:schemeClr val="accent1"/>
-          </a:lnRef>
-          <a:fillRef idx="0">
-            <a:schemeClr val="accent1"/>
-          </a:fillRef>
-          <a:effectRef idx="0">
-            <a:schemeClr val="accent1"/>
-          </a:effectRef>
-          <a:fontRef idx="minor">
-            <a:schemeClr val="tx1"/>
-          </a:fontRef>
-        </p:style>
-      </p:cxnSp>
-      <p:cxnSp>
-        <p:nvCxnSpPr>
-          <p:cNvPr id="8" name="Straight Arrow Connector 7">
-            <a:extLst>
-              <a:ext uri="{FF2B5EF4-FFF2-40B4-BE49-F238E27FC236}">
-                <a16:creationId xmlns:a16="http://schemas.microsoft.com/office/drawing/2014/main" id="{64F6C6EF-DDE4-254F-AD92-49C71D22E36F}"/>
-              </a:ext>
-            </a:extLst>
-          </p:cNvPr>
-          <p:cNvCxnSpPr>
-            <a:cxnSpLocks/>
-          </p:cNvCxnSpPr>
-          <p:nvPr/>
-        </p:nvCxnSpPr>
-        <p:spPr>
-          <a:xfrm>
-            <a:off x="5495071" y="3631223"/>
-            <a:ext cx="719601" cy="0"/>
-          </a:xfrm>
-          <a:prstGeom prst="straightConnector1">
-            <a:avLst/>
-          </a:prstGeom>
-          <a:ln w="57150">
-            <a:solidFill>
-              <a:srgbClr val="FF0000"/>
-            </a:solidFill>
-            <a:tailEnd type="triangle"/>
-          </a:ln>
-        </p:spPr>
-        <p:style>
-          <a:lnRef idx="1">
-            <a:schemeClr val="accent1"/>
-          </a:lnRef>
-          <a:fillRef idx="0">
-            <a:schemeClr val="accent1"/>
-          </a:fillRef>
-          <a:effectRef idx="0">
-            <a:schemeClr val="accent1"/>
-          </a:effectRef>
-          <a:fontRef idx="minor">
-            <a:schemeClr val="tx1"/>
-          </a:fontRef>
-        </p:style>
-      </p:cxnSp>
-    </p:spTree>
-    <p:extLst>
-      <p:ext uri="{BB962C8B-B14F-4D97-AF65-F5344CB8AC3E}">
-        <p14:creationId xmlns:p14="http://schemas.microsoft.com/office/powerpoint/2010/main" val="3303566305"/>
-      </p:ext>
-    </p:extLst>
-  </p:cSld>
-  <p:clrMapOvr>
-    <a:masterClrMapping/>
-  </p:clrMapOvr>
-</p:sld>
-</file>
-
-<file path=ppt/slides/slide30.xml><?xml version="1.0" encoding="utf-8"?>
+<file path=ppt/slides/slide32.xml><?xml version="1.0" encoding="utf-8"?>
 <p:sld xmlns:a="http://schemas.openxmlformats.org/drawingml/2006/main" xmlns:r="http://schemas.openxmlformats.org/officeDocument/2006/relationships" xmlns:p="http://schemas.openxmlformats.org/presentationml/2006/main">
   <p:cSld>
     <p:spTree>
@@ -39313,7 +41024,7 @@
 </p:sld>
 </file>
 
-<file path=ppt/slides/slide31.xml><?xml version="1.0" encoding="utf-8"?>
+<file path=ppt/slides/slide33.xml><?xml version="1.0" encoding="utf-8"?>
 <p:sld xmlns:a="http://schemas.openxmlformats.org/drawingml/2006/main" xmlns:r="http://schemas.openxmlformats.org/officeDocument/2006/relationships" xmlns:p="http://schemas.openxmlformats.org/presentationml/2006/main">
   <p:cSld>
     <p:spTree>
@@ -39537,7 +41248,7 @@
 </p:sld>
 </file>
 
-<file path=ppt/slides/slide32.xml><?xml version="1.0" encoding="utf-8"?>
+<file path=ppt/slides/slide34.xml><?xml version="1.0" encoding="utf-8"?>
 <p:sld xmlns:a="http://schemas.openxmlformats.org/drawingml/2006/main" xmlns:r="http://schemas.openxmlformats.org/officeDocument/2006/relationships" xmlns:p="http://schemas.openxmlformats.org/presentationml/2006/main">
   <p:cSld>
     <p:spTree>
@@ -39687,7 +41398,7 @@
 </p:sld>
 </file>
 
-<file path=ppt/slides/slide33.xml><?xml version="1.0" encoding="utf-8"?>
+<file path=ppt/slides/slide35.xml><?xml version="1.0" encoding="utf-8"?>
 <p:sld xmlns:a="http://schemas.openxmlformats.org/drawingml/2006/main" xmlns:r="http://schemas.openxmlformats.org/officeDocument/2006/relationships" xmlns:p="http://schemas.openxmlformats.org/presentationml/2006/main">
   <p:cSld>
     <p:spTree>
@@ -39778,7 +41489,7 @@
 </p:sld>
 </file>
 
-<file path=ppt/slides/slide34.xml><?xml version="1.0" encoding="utf-8"?>
+<file path=ppt/slides/slide36.xml><?xml version="1.0" encoding="utf-8"?>
 <p:sld xmlns:a="http://schemas.openxmlformats.org/drawingml/2006/main" xmlns:r="http://schemas.openxmlformats.org/officeDocument/2006/relationships" xmlns:p="http://schemas.openxmlformats.org/presentationml/2006/main">
   <p:cSld>
     <p:spTree>
@@ -39874,7 +41585,7 @@
 </p:sld>
 </file>
 
-<file path=ppt/slides/slide35.xml><?xml version="1.0" encoding="utf-8"?>
+<file path=ppt/slides/slide37.xml><?xml version="1.0" encoding="utf-8"?>
 <p:sld xmlns:a="http://schemas.openxmlformats.org/drawingml/2006/main" xmlns:r="http://schemas.openxmlformats.org/officeDocument/2006/relationships" xmlns:p="http://schemas.openxmlformats.org/presentationml/2006/main">
   <p:cSld>
     <p:spTree>
@@ -40182,7 +41893,7 @@
 </p:sld>
 </file>
 
-<file path=ppt/slides/slide36.xml><?xml version="1.0" encoding="utf-8"?>
+<file path=ppt/slides/slide38.xml><?xml version="1.0" encoding="utf-8"?>
 <p:sld xmlns:a="http://schemas.openxmlformats.org/drawingml/2006/main" xmlns:r="http://schemas.openxmlformats.org/officeDocument/2006/relationships" xmlns:p="http://schemas.openxmlformats.org/presentationml/2006/main">
   <p:cSld>
     <p:spTree>
@@ -40488,7 +42199,7 @@
 </p:sld>
 </file>
 
-<file path=ppt/slides/slide37.xml><?xml version="1.0" encoding="utf-8"?>
+<file path=ppt/slides/slide39.xml><?xml version="1.0" encoding="utf-8"?>
 <p:sld xmlns:a="http://schemas.openxmlformats.org/drawingml/2006/main" xmlns:r="http://schemas.openxmlformats.org/officeDocument/2006/relationships" xmlns:p="http://schemas.openxmlformats.org/presentationml/2006/main">
   <p:cSld>
     <p:spTree>
@@ -40783,239 +42494,6 @@
 </p:sld>
 </file>
 
-<file path=ppt/slides/slide38.xml><?xml version="1.0" encoding="utf-8"?>
-<p:sld xmlns:a="http://schemas.openxmlformats.org/drawingml/2006/main" xmlns:r="http://schemas.openxmlformats.org/officeDocument/2006/relationships" xmlns:p="http://schemas.openxmlformats.org/presentationml/2006/main">
-  <p:cSld>
-    <p:spTree>
-      <p:nvGrpSpPr>
-        <p:cNvPr id="1" name=""/>
-        <p:cNvGrpSpPr/>
-        <p:nvPr/>
-      </p:nvGrpSpPr>
-      <p:grpSpPr>
-        <a:xfrm>
-          <a:off x="0" y="0"/>
-          <a:ext cx="0" cy="0"/>
-          <a:chOff x="0" y="0"/>
-          <a:chExt cx="0" cy="0"/>
-        </a:xfrm>
-      </p:grpSpPr>
-      <p:sp>
-        <p:nvSpPr>
-          <p:cNvPr id="2" name="Title 1">
-            <a:extLst>
-              <a:ext uri="{FF2B5EF4-FFF2-40B4-BE49-F238E27FC236}">
-                <a16:creationId xmlns:a16="http://schemas.microsoft.com/office/drawing/2014/main" id="{BC83AE41-BD04-274E-B2A3-A30AD7399D4F}"/>
-              </a:ext>
-            </a:extLst>
-          </p:cNvPr>
-          <p:cNvSpPr>
-            <a:spLocks noGrp="1"/>
-          </p:cNvSpPr>
-          <p:nvPr>
-            <p:ph type="title"/>
-          </p:nvPr>
-        </p:nvSpPr>
-        <p:spPr/>
-        <p:txBody>
-          <a:bodyPr/>
-          <a:lstStyle/>
-          <a:p>
-            <a:r>
-              <a:rPr lang="en-US" dirty="0"/>
-              <a:t>Actual Size?</a:t>
-            </a:r>
-          </a:p>
-        </p:txBody>
-      </p:sp>
-      <p:sp>
-        <p:nvSpPr>
-          <p:cNvPr id="3" name="Content Placeholder 2">
-            <a:extLst>
-              <a:ext uri="{FF2B5EF4-FFF2-40B4-BE49-F238E27FC236}">
-                <a16:creationId xmlns:a16="http://schemas.microsoft.com/office/drawing/2014/main" id="{C4E8CD84-5B36-804C-A64D-37C66B20E7CB}"/>
-              </a:ext>
-            </a:extLst>
-          </p:cNvPr>
-          <p:cNvSpPr>
-            <a:spLocks noGrp="1"/>
-          </p:cNvSpPr>
-          <p:nvPr>
-            <p:ph idx="1"/>
-          </p:nvPr>
-        </p:nvSpPr>
-        <p:spPr>
-          <a:xfrm>
-            <a:off x="628650" y="1236541"/>
-            <a:ext cx="4552950" cy="3263504"/>
-          </a:xfrm>
-        </p:spPr>
-        <p:txBody>
-          <a:bodyPr/>
-          <a:lstStyle/>
-          <a:p>
-            <a:r>
-              <a:rPr lang="en-US" dirty="0"/>
-              <a:t>Large enough for your allocation to an arbitrary location</a:t>
-            </a:r>
-          </a:p>
-          <a:p>
-            <a:r>
-              <a:rPr lang="en-US" dirty="0"/>
-              <a:t>-1 will always work</a:t>
-            </a:r>
-          </a:p>
-          <a:p>
-            <a:r>
-              <a:rPr lang="en-US" i="1" dirty="0"/>
-              <a:t>prev_size </a:t>
-            </a:r>
-            <a:r>
-              <a:rPr lang="en-US" dirty="0"/>
-              <a:t>does not matter</a:t>
-            </a:r>
-          </a:p>
-        </p:txBody>
-      </p:sp>
-      <p:pic>
-        <p:nvPicPr>
-          <p:cNvPr id="5" name="Picture 4" descr="-1 as the size of the chunk">
-            <a:extLst>
-              <a:ext uri="{FF2B5EF4-FFF2-40B4-BE49-F238E27FC236}">
-                <a16:creationId xmlns:a16="http://schemas.microsoft.com/office/drawing/2014/main" id="{84E80864-7BA9-E44E-9F18-BB69E9CAA1D6}"/>
-              </a:ext>
-            </a:extLst>
-          </p:cNvPr>
-          <p:cNvPicPr>
-            <a:picLocks noChangeAspect="1"/>
-          </p:cNvPicPr>
-          <p:nvPr/>
-        </p:nvPicPr>
-        <p:blipFill>
-          <a:blip r:embed="rId2"/>
-          <a:stretch>
-            <a:fillRect/>
-          </a:stretch>
-        </p:blipFill>
-        <p:spPr>
-          <a:xfrm>
-            <a:off x="5110662" y="1268019"/>
-            <a:ext cx="3846948" cy="3077558"/>
-          </a:xfrm>
-          <a:prstGeom prst="rect">
-            <a:avLst/>
-          </a:prstGeom>
-        </p:spPr>
-      </p:pic>
-    </p:spTree>
-    <p:extLst>
-      <p:ext uri="{BB962C8B-B14F-4D97-AF65-F5344CB8AC3E}">
-        <p14:creationId xmlns:p14="http://schemas.microsoft.com/office/powerpoint/2010/main" val="2406861539"/>
-      </p:ext>
-    </p:extLst>
-  </p:cSld>
-  <p:clrMapOvr>
-    <a:masterClrMapping/>
-  </p:clrMapOvr>
-</p:sld>
-</file>
-
-<file path=ppt/slides/slide39.xml><?xml version="1.0" encoding="utf-8"?>
-<p:sld xmlns:a="http://schemas.openxmlformats.org/drawingml/2006/main" xmlns:r="http://schemas.openxmlformats.org/officeDocument/2006/relationships" xmlns:p="http://schemas.openxmlformats.org/presentationml/2006/main">
-  <p:cSld>
-    <p:spTree>
-      <p:nvGrpSpPr>
-        <p:cNvPr id="1" name=""/>
-        <p:cNvGrpSpPr/>
-        <p:nvPr/>
-      </p:nvGrpSpPr>
-      <p:grpSpPr>
-        <a:xfrm>
-          <a:off x="0" y="0"/>
-          <a:ext cx="0" cy="0"/>
-          <a:chOff x="0" y="0"/>
-          <a:chExt cx="0" cy="0"/>
-        </a:xfrm>
-      </p:grpSpPr>
-      <p:sp>
-        <p:nvSpPr>
-          <p:cNvPr id="2" name="Title 1">
-            <a:extLst>
-              <a:ext uri="{FF2B5EF4-FFF2-40B4-BE49-F238E27FC236}">
-                <a16:creationId xmlns:a16="http://schemas.microsoft.com/office/drawing/2014/main" id="{F90744CA-AA12-694B-9EFD-DAE3C6B34B65}"/>
-              </a:ext>
-            </a:extLst>
-          </p:cNvPr>
-          <p:cNvSpPr>
-            <a:spLocks noGrp="1"/>
-          </p:cNvSpPr>
-          <p:nvPr>
-            <p:ph type="title"/>
-          </p:nvPr>
-        </p:nvSpPr>
-        <p:spPr>
-          <a:xfrm>
-            <a:off x="628650" y="273847"/>
-            <a:ext cx="7886700" cy="994172"/>
-          </a:xfrm>
-        </p:spPr>
-        <p:txBody>
-          <a:bodyPr anchor="ctr">
-            <a:normAutofit/>
-          </a:bodyPr>
-          <a:lstStyle/>
-          <a:p>
-            <a:r>
-              <a:rPr lang="en-US" dirty="0"/>
-              <a:t>Flow of the Attack</a:t>
-            </a:r>
-          </a:p>
-        </p:txBody>
-      </p:sp>
-      <p:graphicFrame>
-        <p:nvGraphicFramePr>
-          <p:cNvPr id="7" name="Content Placeholder 2">
-            <a:extLst>
-              <a:ext uri="{FF2B5EF4-FFF2-40B4-BE49-F238E27FC236}">
-                <a16:creationId xmlns:a16="http://schemas.microsoft.com/office/drawing/2014/main" id="{16AFF43D-D95F-43D7-9B17-22E96F279462}"/>
-              </a:ext>
-            </a:extLst>
-          </p:cNvPr>
-          <p:cNvGraphicFramePr>
-            <a:graphicFrameLocks noGrp="1"/>
-          </p:cNvGraphicFramePr>
-          <p:nvPr>
-            <p:ph idx="1"/>
-            <p:extLst>
-              <p:ext uri="{D42A27DB-BD31-4B8C-83A1-F6EECF244321}">
-                <p14:modId xmlns:p14="http://schemas.microsoft.com/office/powerpoint/2010/main" val="325064606"/>
-              </p:ext>
-            </p:extLst>
-          </p:nvPr>
-        </p:nvGraphicFramePr>
-        <p:xfrm>
-          <a:off x="628650" y="1236541"/>
-          <a:ext cx="7886700" cy="3263504"/>
-        </p:xfrm>
-        <a:graphic>
-          <a:graphicData uri="http://schemas.openxmlformats.org/drawingml/2006/diagram">
-            <dgm:relIds xmlns:dgm="http://schemas.openxmlformats.org/drawingml/2006/diagram" xmlns:r="http://schemas.openxmlformats.org/officeDocument/2006/relationships" r:dm="rId2" r:lo="rId3" r:qs="rId4" r:cs="rId5"/>
-          </a:graphicData>
-        </a:graphic>
-      </p:graphicFrame>
-    </p:spTree>
-    <p:extLst>
-      <p:ext uri="{BB962C8B-B14F-4D97-AF65-F5344CB8AC3E}">
-        <p14:creationId xmlns:p14="http://schemas.microsoft.com/office/powerpoint/2010/main" val="2158100681"/>
-      </p:ext>
-    </p:extLst>
-  </p:cSld>
-  <p:clrMapOvr>
-    <a:masterClrMapping/>
-  </p:clrMapOvr>
-</p:sld>
-</file>
-
 <file path=ppt/slides/slide4.xml><?xml version="1.0" encoding="utf-8"?>
 <p:sld xmlns:a="http://schemas.openxmlformats.org/drawingml/2006/main" xmlns:r="http://schemas.openxmlformats.org/officeDocument/2006/relationships" xmlns:p="http://schemas.openxmlformats.org/presentationml/2006/main">
   <p:cSld>
@@ -41313,6 +42791,239 @@
 </file>
 
 <file path=ppt/slides/slide40.xml><?xml version="1.0" encoding="utf-8"?>
+<p:sld xmlns:a="http://schemas.openxmlformats.org/drawingml/2006/main" xmlns:r="http://schemas.openxmlformats.org/officeDocument/2006/relationships" xmlns:p="http://schemas.openxmlformats.org/presentationml/2006/main">
+  <p:cSld>
+    <p:spTree>
+      <p:nvGrpSpPr>
+        <p:cNvPr id="1" name=""/>
+        <p:cNvGrpSpPr/>
+        <p:nvPr/>
+      </p:nvGrpSpPr>
+      <p:grpSpPr>
+        <a:xfrm>
+          <a:off x="0" y="0"/>
+          <a:ext cx="0" cy="0"/>
+          <a:chOff x="0" y="0"/>
+          <a:chExt cx="0" cy="0"/>
+        </a:xfrm>
+      </p:grpSpPr>
+      <p:sp>
+        <p:nvSpPr>
+          <p:cNvPr id="2" name="Title 1">
+            <a:extLst>
+              <a:ext uri="{FF2B5EF4-FFF2-40B4-BE49-F238E27FC236}">
+                <a16:creationId xmlns:a16="http://schemas.microsoft.com/office/drawing/2014/main" id="{BC83AE41-BD04-274E-B2A3-A30AD7399D4F}"/>
+              </a:ext>
+            </a:extLst>
+          </p:cNvPr>
+          <p:cNvSpPr>
+            <a:spLocks noGrp="1"/>
+          </p:cNvSpPr>
+          <p:nvPr>
+            <p:ph type="title"/>
+          </p:nvPr>
+        </p:nvSpPr>
+        <p:spPr/>
+        <p:txBody>
+          <a:bodyPr/>
+          <a:lstStyle/>
+          <a:p>
+            <a:r>
+              <a:rPr lang="en-US" dirty="0"/>
+              <a:t>Actual Size?</a:t>
+            </a:r>
+          </a:p>
+        </p:txBody>
+      </p:sp>
+      <p:sp>
+        <p:nvSpPr>
+          <p:cNvPr id="3" name="Content Placeholder 2">
+            <a:extLst>
+              <a:ext uri="{FF2B5EF4-FFF2-40B4-BE49-F238E27FC236}">
+                <a16:creationId xmlns:a16="http://schemas.microsoft.com/office/drawing/2014/main" id="{C4E8CD84-5B36-804C-A64D-37C66B20E7CB}"/>
+              </a:ext>
+            </a:extLst>
+          </p:cNvPr>
+          <p:cNvSpPr>
+            <a:spLocks noGrp="1"/>
+          </p:cNvSpPr>
+          <p:nvPr>
+            <p:ph idx="1"/>
+          </p:nvPr>
+        </p:nvSpPr>
+        <p:spPr>
+          <a:xfrm>
+            <a:off x="628650" y="1236541"/>
+            <a:ext cx="4552950" cy="3263504"/>
+          </a:xfrm>
+        </p:spPr>
+        <p:txBody>
+          <a:bodyPr/>
+          <a:lstStyle/>
+          <a:p>
+            <a:r>
+              <a:rPr lang="en-US" dirty="0"/>
+              <a:t>Large enough for your allocation to an arbitrary location</a:t>
+            </a:r>
+          </a:p>
+          <a:p>
+            <a:r>
+              <a:rPr lang="en-US" dirty="0"/>
+              <a:t>0xFFFFFFFFFFFFFFFF (-1) will always work</a:t>
+            </a:r>
+          </a:p>
+          <a:p>
+            <a:r>
+              <a:rPr lang="en-US" i="1" dirty="0"/>
+              <a:t>prev_size </a:t>
+            </a:r>
+            <a:r>
+              <a:rPr lang="en-US" dirty="0"/>
+              <a:t>does not matter</a:t>
+            </a:r>
+          </a:p>
+        </p:txBody>
+      </p:sp>
+      <p:pic>
+        <p:nvPicPr>
+          <p:cNvPr id="5" name="Picture 4" descr="-1 as the size of the chunk">
+            <a:extLst>
+              <a:ext uri="{FF2B5EF4-FFF2-40B4-BE49-F238E27FC236}">
+                <a16:creationId xmlns:a16="http://schemas.microsoft.com/office/drawing/2014/main" id="{84E80864-7BA9-E44E-9F18-BB69E9CAA1D6}"/>
+              </a:ext>
+            </a:extLst>
+          </p:cNvPr>
+          <p:cNvPicPr>
+            <a:picLocks noChangeAspect="1"/>
+          </p:cNvPicPr>
+          <p:nvPr/>
+        </p:nvPicPr>
+        <p:blipFill>
+          <a:blip r:embed="rId2"/>
+          <a:stretch>
+            <a:fillRect/>
+          </a:stretch>
+        </p:blipFill>
+        <p:spPr>
+          <a:xfrm>
+            <a:off x="5110662" y="1268019"/>
+            <a:ext cx="3846948" cy="3077558"/>
+          </a:xfrm>
+          <a:prstGeom prst="rect">
+            <a:avLst/>
+          </a:prstGeom>
+        </p:spPr>
+      </p:pic>
+    </p:spTree>
+    <p:extLst>
+      <p:ext uri="{BB962C8B-B14F-4D97-AF65-F5344CB8AC3E}">
+        <p14:creationId xmlns:p14="http://schemas.microsoft.com/office/powerpoint/2010/main" val="2406861539"/>
+      </p:ext>
+    </p:extLst>
+  </p:cSld>
+  <p:clrMapOvr>
+    <a:masterClrMapping/>
+  </p:clrMapOvr>
+</p:sld>
+</file>
+
+<file path=ppt/slides/slide41.xml><?xml version="1.0" encoding="utf-8"?>
+<p:sld xmlns:a="http://schemas.openxmlformats.org/drawingml/2006/main" xmlns:r="http://schemas.openxmlformats.org/officeDocument/2006/relationships" xmlns:p="http://schemas.openxmlformats.org/presentationml/2006/main">
+  <p:cSld>
+    <p:spTree>
+      <p:nvGrpSpPr>
+        <p:cNvPr id="1" name=""/>
+        <p:cNvGrpSpPr/>
+        <p:nvPr/>
+      </p:nvGrpSpPr>
+      <p:grpSpPr>
+        <a:xfrm>
+          <a:off x="0" y="0"/>
+          <a:ext cx="0" cy="0"/>
+          <a:chOff x="0" y="0"/>
+          <a:chExt cx="0" cy="0"/>
+        </a:xfrm>
+      </p:grpSpPr>
+      <p:sp>
+        <p:nvSpPr>
+          <p:cNvPr id="2" name="Title 1">
+            <a:extLst>
+              <a:ext uri="{FF2B5EF4-FFF2-40B4-BE49-F238E27FC236}">
+                <a16:creationId xmlns:a16="http://schemas.microsoft.com/office/drawing/2014/main" id="{F90744CA-AA12-694B-9EFD-DAE3C6B34B65}"/>
+              </a:ext>
+            </a:extLst>
+          </p:cNvPr>
+          <p:cNvSpPr>
+            <a:spLocks noGrp="1"/>
+          </p:cNvSpPr>
+          <p:nvPr>
+            <p:ph type="title"/>
+          </p:nvPr>
+        </p:nvSpPr>
+        <p:spPr>
+          <a:xfrm>
+            <a:off x="628650" y="273847"/>
+            <a:ext cx="7886700" cy="994172"/>
+          </a:xfrm>
+        </p:spPr>
+        <p:txBody>
+          <a:bodyPr anchor="ctr">
+            <a:normAutofit/>
+          </a:bodyPr>
+          <a:lstStyle/>
+          <a:p>
+            <a:r>
+              <a:rPr lang="en-US" dirty="0"/>
+              <a:t>Flow of the Attack</a:t>
+            </a:r>
+          </a:p>
+        </p:txBody>
+      </p:sp>
+      <p:graphicFrame>
+        <p:nvGraphicFramePr>
+          <p:cNvPr id="7" name="Content Placeholder 2">
+            <a:extLst>
+              <a:ext uri="{FF2B5EF4-FFF2-40B4-BE49-F238E27FC236}">
+                <a16:creationId xmlns:a16="http://schemas.microsoft.com/office/drawing/2014/main" id="{16AFF43D-D95F-43D7-9B17-22E96F279462}"/>
+              </a:ext>
+            </a:extLst>
+          </p:cNvPr>
+          <p:cNvGraphicFramePr>
+            <a:graphicFrameLocks noGrp="1"/>
+          </p:cNvGraphicFramePr>
+          <p:nvPr>
+            <p:ph idx="1"/>
+            <p:extLst>
+              <p:ext uri="{D42A27DB-BD31-4B8C-83A1-F6EECF244321}">
+                <p14:modId xmlns:p14="http://schemas.microsoft.com/office/powerpoint/2010/main" val="325064606"/>
+              </p:ext>
+            </p:extLst>
+          </p:nvPr>
+        </p:nvGraphicFramePr>
+        <p:xfrm>
+          <a:off x="628650" y="1236541"/>
+          <a:ext cx="7886700" cy="3263504"/>
+        </p:xfrm>
+        <a:graphic>
+          <a:graphicData uri="http://schemas.openxmlformats.org/drawingml/2006/diagram">
+            <dgm:relIds xmlns:dgm="http://schemas.openxmlformats.org/drawingml/2006/diagram" xmlns:r="http://schemas.openxmlformats.org/officeDocument/2006/relationships" r:dm="rId2" r:lo="rId3" r:qs="rId4" r:cs="rId5"/>
+          </a:graphicData>
+        </a:graphic>
+      </p:graphicFrame>
+    </p:spTree>
+    <p:extLst>
+      <p:ext uri="{BB962C8B-B14F-4D97-AF65-F5344CB8AC3E}">
+        <p14:creationId xmlns:p14="http://schemas.microsoft.com/office/powerpoint/2010/main" val="2158100681"/>
+      </p:ext>
+    </p:extLst>
+  </p:cSld>
+  <p:clrMapOvr>
+    <a:masterClrMapping/>
+  </p:clrMapOvr>
+</p:sld>
+</file>
+
+<file path=ppt/slides/slide42.xml><?xml version="1.0" encoding="utf-8"?>
 <p:sld xmlns:a="http://schemas.openxmlformats.org/drawingml/2006/main" xmlns:r="http://schemas.openxmlformats.org/officeDocument/2006/relationships" xmlns:p="http://schemas.openxmlformats.org/presentationml/2006/main">
   <p:cSld>
     <p:spTree>
@@ -42029,7 +43740,7 @@
 </p:sld>
 </file>
 
-<file path=ppt/slides/slide41.xml><?xml version="1.0" encoding="utf-8"?>
+<file path=ppt/slides/slide43.xml><?xml version="1.0" encoding="utf-8"?>
 <p:sld xmlns:a="http://schemas.openxmlformats.org/drawingml/2006/main" xmlns:r="http://schemas.openxmlformats.org/officeDocument/2006/relationships" xmlns:p="http://schemas.openxmlformats.org/presentationml/2006/main">
   <p:cSld>
     <p:spTree>
@@ -42773,7 +44484,7 @@
 </p:sld>
 </file>
 
-<file path=ppt/slides/slide42.xml><?xml version="1.0" encoding="utf-8"?>
+<file path=ppt/slides/slide44.xml><?xml version="1.0" encoding="utf-8"?>
 <p:sld xmlns:a="http://schemas.openxmlformats.org/drawingml/2006/main" xmlns:r="http://schemas.openxmlformats.org/officeDocument/2006/relationships" xmlns:p="http://schemas.openxmlformats.org/presentationml/2006/main">
   <p:cSld>
     <p:spTree>
@@ -43680,7 +45391,7 @@
 </p:sld>
 </file>
 
-<file path=ppt/slides/slide43.xml><?xml version="1.0" encoding="utf-8"?>
+<file path=ppt/slides/slide45.xml><?xml version="1.0" encoding="utf-8"?>
 <p:sld xmlns:a="http://schemas.openxmlformats.org/drawingml/2006/main" xmlns:r="http://schemas.openxmlformats.org/officeDocument/2006/relationships" xmlns:p="http://schemas.openxmlformats.org/presentationml/2006/main">
   <p:cSld>
     <p:spTree>
@@ -44391,7 +46102,7 @@
 </p:sld>
 </file>
 
-<file path=ppt/slides/slide44.xml><?xml version="1.0" encoding="utf-8"?>
+<file path=ppt/slides/slide46.xml><?xml version="1.0" encoding="utf-8"?>
 <p:sld xmlns:a="http://schemas.openxmlformats.org/drawingml/2006/main" xmlns:r="http://schemas.openxmlformats.org/officeDocument/2006/relationships" xmlns:p="http://schemas.openxmlformats.org/presentationml/2006/main">
   <p:cSld>
     <p:spTree>
@@ -45320,7 +47031,7 @@
 </p:sld>
 </file>
 
-<file path=ppt/slides/slide45.xml><?xml version="1.0" encoding="utf-8"?>
+<file path=ppt/slides/slide47.xml><?xml version="1.0" encoding="utf-8"?>
 <p:sld xmlns:a="http://schemas.openxmlformats.org/drawingml/2006/main" xmlns:r="http://schemas.openxmlformats.org/officeDocument/2006/relationships" xmlns:p="http://schemas.openxmlformats.org/presentationml/2006/main">
   <p:cSld>
     <p:spTree>
@@ -46181,7 +47892,7 @@
 </p:sld>
 </file>
 
-<file path=ppt/slides/slide46.xml><?xml version="1.0" encoding="utf-8"?>
+<file path=ppt/slides/slide48.xml><?xml version="1.0" encoding="utf-8"?>
 <p:sld xmlns:a="http://schemas.openxmlformats.org/drawingml/2006/main" xmlns:r="http://schemas.openxmlformats.org/officeDocument/2006/relationships" xmlns:p="http://schemas.openxmlformats.org/presentationml/2006/main">
   <p:cSld>
     <p:spTree>
@@ -46542,7 +48253,7 @@
 </p:sld>
 </file>
 
-<file path=ppt/slides/slide47.xml><?xml version="1.0" encoding="utf-8"?>
+<file path=ppt/slides/slide49.xml><?xml version="1.0" encoding="utf-8"?>
 <p:sld xmlns:a="http://schemas.openxmlformats.org/drawingml/2006/main" xmlns:r="http://schemas.openxmlformats.org/officeDocument/2006/relationships" xmlns:p="http://schemas.openxmlformats.org/presentationml/2006/main">
   <p:cSld>
     <p:spTree>
@@ -46698,198 +48409,6 @@
     <p:extLst>
       <p:ext uri="{BB962C8B-B14F-4D97-AF65-F5344CB8AC3E}">
         <p14:creationId xmlns:p14="http://schemas.microsoft.com/office/powerpoint/2010/main" val="947500770"/>
-      </p:ext>
-    </p:extLst>
-  </p:cSld>
-  <p:clrMapOvr>
-    <a:masterClrMapping/>
-  </p:clrMapOvr>
-</p:sld>
-</file>
-
-<file path=ppt/slides/slide48.xml><?xml version="1.0" encoding="utf-8"?>
-<p:sld xmlns:a="http://schemas.openxmlformats.org/drawingml/2006/main" xmlns:r="http://schemas.openxmlformats.org/officeDocument/2006/relationships" xmlns:p="http://schemas.openxmlformats.org/presentationml/2006/main">
-  <p:cSld>
-    <p:spTree>
-      <p:nvGrpSpPr>
-        <p:cNvPr id="1" name=""/>
-        <p:cNvGrpSpPr/>
-        <p:nvPr/>
-      </p:nvGrpSpPr>
-      <p:grpSpPr>
-        <a:xfrm>
-          <a:off x="0" y="0"/>
-          <a:ext cx="0" cy="0"/>
-          <a:chOff x="0" y="0"/>
-          <a:chExt cx="0" cy="0"/>
-        </a:xfrm>
-      </p:grpSpPr>
-      <p:sp>
-        <p:nvSpPr>
-          <p:cNvPr id="2" name="Title 1">
-            <a:extLst>
-              <a:ext uri="{FF2B5EF4-FFF2-40B4-BE49-F238E27FC236}">
-                <a16:creationId xmlns:a16="http://schemas.microsoft.com/office/drawing/2014/main" id="{555011BE-04DB-7240-B9E9-FCECE223C870}"/>
-              </a:ext>
-            </a:extLst>
-          </p:cNvPr>
-          <p:cNvSpPr>
-            <a:spLocks noGrp="1"/>
-          </p:cNvSpPr>
-          <p:nvPr>
-            <p:ph type="title"/>
-          </p:nvPr>
-        </p:nvSpPr>
-        <p:spPr>
-          <a:xfrm>
-            <a:off x="628650" y="273847"/>
-            <a:ext cx="7886700" cy="994172"/>
-          </a:xfrm>
-        </p:spPr>
-        <p:txBody>
-          <a:bodyPr anchor="ctr">
-            <a:normAutofit/>
-          </a:bodyPr>
-          <a:lstStyle/>
-          <a:p>
-            <a:r>
-              <a:rPr lang="en-US" dirty="0"/>
-              <a:t>Allocate Close to Target - Other </a:t>
-            </a:r>
-          </a:p>
-        </p:txBody>
-      </p:sp>
-      <p:graphicFrame>
-        <p:nvGraphicFramePr>
-          <p:cNvPr id="5" name="Content Placeholder 2">
-            <a:extLst>
-              <a:ext uri="{FF2B5EF4-FFF2-40B4-BE49-F238E27FC236}">
-                <a16:creationId xmlns:a16="http://schemas.microsoft.com/office/drawing/2014/main" id="{DDFCC697-53C9-4842-B150-F9442EE4D888}"/>
-              </a:ext>
-            </a:extLst>
-          </p:cNvPr>
-          <p:cNvGraphicFramePr>
-            <a:graphicFrameLocks noGrp="1"/>
-          </p:cNvGraphicFramePr>
-          <p:nvPr>
-            <p:ph idx="1"/>
-            <p:extLst>
-              <p:ext uri="{D42A27DB-BD31-4B8C-83A1-F6EECF244321}">
-                <p14:modId xmlns:p14="http://schemas.microsoft.com/office/powerpoint/2010/main" val="2193847542"/>
-              </p:ext>
-            </p:extLst>
-          </p:nvPr>
-        </p:nvGraphicFramePr>
-        <p:xfrm>
-          <a:off x="628650" y="1236541"/>
-          <a:ext cx="7886700" cy="3263504"/>
-        </p:xfrm>
-        <a:graphic>
-          <a:graphicData uri="http://schemas.openxmlformats.org/drawingml/2006/diagram">
-            <dgm:relIds xmlns:dgm="http://schemas.openxmlformats.org/drawingml/2006/diagram" xmlns:r="http://schemas.openxmlformats.org/officeDocument/2006/relationships" r:dm="rId2" r:lo="rId3" r:qs="rId4" r:cs="rId5"/>
-          </a:graphicData>
-        </a:graphic>
-      </p:graphicFrame>
-    </p:spTree>
-    <p:extLst>
-      <p:ext uri="{BB962C8B-B14F-4D97-AF65-F5344CB8AC3E}">
-        <p14:creationId xmlns:p14="http://schemas.microsoft.com/office/powerpoint/2010/main" val="3595735604"/>
-      </p:ext>
-    </p:extLst>
-  </p:cSld>
-  <p:clrMapOvr>
-    <a:masterClrMapping/>
-  </p:clrMapOvr>
-</p:sld>
-</file>
-
-<file path=ppt/slides/slide49.xml><?xml version="1.0" encoding="utf-8"?>
-<p:sld xmlns:a="http://schemas.openxmlformats.org/drawingml/2006/main" xmlns:r="http://schemas.openxmlformats.org/officeDocument/2006/relationships" xmlns:p="http://schemas.openxmlformats.org/presentationml/2006/main">
-  <p:cSld>
-    <p:spTree>
-      <p:nvGrpSpPr>
-        <p:cNvPr id="1" name=""/>
-        <p:cNvGrpSpPr/>
-        <p:nvPr/>
-      </p:nvGrpSpPr>
-      <p:grpSpPr>
-        <a:xfrm>
-          <a:off x="0" y="0"/>
-          <a:ext cx="0" cy="0"/>
-          <a:chOff x="0" y="0"/>
-          <a:chExt cx="0" cy="0"/>
-        </a:xfrm>
-      </p:grpSpPr>
-      <p:sp>
-        <p:nvSpPr>
-          <p:cNvPr id="2" name="Title 1">
-            <a:extLst>
-              <a:ext uri="{FF2B5EF4-FFF2-40B4-BE49-F238E27FC236}">
-                <a16:creationId xmlns:a16="http://schemas.microsoft.com/office/drawing/2014/main" id="{F90744CA-AA12-694B-9EFD-DAE3C6B34B65}"/>
-              </a:ext>
-            </a:extLst>
-          </p:cNvPr>
-          <p:cNvSpPr>
-            <a:spLocks noGrp="1"/>
-          </p:cNvSpPr>
-          <p:nvPr>
-            <p:ph type="title"/>
-          </p:nvPr>
-        </p:nvSpPr>
-        <p:spPr>
-          <a:xfrm>
-            <a:off x="628650" y="273847"/>
-            <a:ext cx="7886700" cy="994172"/>
-          </a:xfrm>
-        </p:spPr>
-        <p:txBody>
-          <a:bodyPr anchor="ctr">
-            <a:normAutofit/>
-          </a:bodyPr>
-          <a:lstStyle/>
-          <a:p>
-            <a:r>
-              <a:rPr lang="en-US" dirty="0"/>
-              <a:t>Flow of the Attack</a:t>
-            </a:r>
-          </a:p>
-        </p:txBody>
-      </p:sp>
-      <p:graphicFrame>
-        <p:nvGraphicFramePr>
-          <p:cNvPr id="7" name="Content Placeholder 2">
-            <a:extLst>
-              <a:ext uri="{FF2B5EF4-FFF2-40B4-BE49-F238E27FC236}">
-                <a16:creationId xmlns:a16="http://schemas.microsoft.com/office/drawing/2014/main" id="{16AFF43D-D95F-43D7-9B17-22E96F279462}"/>
-              </a:ext>
-            </a:extLst>
-          </p:cNvPr>
-          <p:cNvGraphicFramePr>
-            <a:graphicFrameLocks noGrp="1"/>
-          </p:cNvGraphicFramePr>
-          <p:nvPr>
-            <p:ph idx="1"/>
-            <p:extLst>
-              <p:ext uri="{D42A27DB-BD31-4B8C-83A1-F6EECF244321}">
-                <p14:modId xmlns:p14="http://schemas.microsoft.com/office/powerpoint/2010/main" val="2551833715"/>
-              </p:ext>
-            </p:extLst>
-          </p:nvPr>
-        </p:nvGraphicFramePr>
-        <p:xfrm>
-          <a:off x="628650" y="1236541"/>
-          <a:ext cx="7886700" cy="3263504"/>
-        </p:xfrm>
-        <a:graphic>
-          <a:graphicData uri="http://schemas.openxmlformats.org/drawingml/2006/diagram">
-            <dgm:relIds xmlns:dgm="http://schemas.openxmlformats.org/drawingml/2006/diagram" xmlns:r="http://schemas.openxmlformats.org/officeDocument/2006/relationships" r:dm="rId2" r:lo="rId3" r:qs="rId4" r:cs="rId5"/>
-          </a:graphicData>
-        </a:graphic>
-      </p:graphicFrame>
-    </p:spTree>
-    <p:extLst>
-      <p:ext uri="{BB962C8B-B14F-4D97-AF65-F5344CB8AC3E}">
-        <p14:creationId xmlns:p14="http://schemas.microsoft.com/office/powerpoint/2010/main" val="2426609233"/>
       </p:ext>
     </p:extLst>
   </p:cSld>
@@ -47357,6 +48876,198 @@
           <p:cNvPr id="2" name="Title 1">
             <a:extLst>
               <a:ext uri="{FF2B5EF4-FFF2-40B4-BE49-F238E27FC236}">
+                <a16:creationId xmlns:a16="http://schemas.microsoft.com/office/drawing/2014/main" id="{555011BE-04DB-7240-B9E9-FCECE223C870}"/>
+              </a:ext>
+            </a:extLst>
+          </p:cNvPr>
+          <p:cNvSpPr>
+            <a:spLocks noGrp="1"/>
+          </p:cNvSpPr>
+          <p:nvPr>
+            <p:ph type="title"/>
+          </p:nvPr>
+        </p:nvSpPr>
+        <p:spPr>
+          <a:xfrm>
+            <a:off x="628650" y="273847"/>
+            <a:ext cx="7886700" cy="994172"/>
+          </a:xfrm>
+        </p:spPr>
+        <p:txBody>
+          <a:bodyPr anchor="ctr">
+            <a:normAutofit/>
+          </a:bodyPr>
+          <a:lstStyle/>
+          <a:p>
+            <a:r>
+              <a:rPr lang="en-US" dirty="0"/>
+              <a:t>Allocate Close to Target - Other </a:t>
+            </a:r>
+          </a:p>
+        </p:txBody>
+      </p:sp>
+      <p:graphicFrame>
+        <p:nvGraphicFramePr>
+          <p:cNvPr id="5" name="Content Placeholder 2">
+            <a:extLst>
+              <a:ext uri="{FF2B5EF4-FFF2-40B4-BE49-F238E27FC236}">
+                <a16:creationId xmlns:a16="http://schemas.microsoft.com/office/drawing/2014/main" id="{DDFCC697-53C9-4842-B150-F9442EE4D888}"/>
+              </a:ext>
+            </a:extLst>
+          </p:cNvPr>
+          <p:cNvGraphicFramePr>
+            <a:graphicFrameLocks noGrp="1"/>
+          </p:cNvGraphicFramePr>
+          <p:nvPr>
+            <p:ph idx="1"/>
+            <p:extLst>
+              <p:ext uri="{D42A27DB-BD31-4B8C-83A1-F6EECF244321}">
+                <p14:modId xmlns:p14="http://schemas.microsoft.com/office/powerpoint/2010/main" val="2193847542"/>
+              </p:ext>
+            </p:extLst>
+          </p:nvPr>
+        </p:nvGraphicFramePr>
+        <p:xfrm>
+          <a:off x="628650" y="1236541"/>
+          <a:ext cx="7886700" cy="3263504"/>
+        </p:xfrm>
+        <a:graphic>
+          <a:graphicData uri="http://schemas.openxmlformats.org/drawingml/2006/diagram">
+            <dgm:relIds xmlns:dgm="http://schemas.openxmlformats.org/drawingml/2006/diagram" xmlns:r="http://schemas.openxmlformats.org/officeDocument/2006/relationships" r:dm="rId2" r:lo="rId3" r:qs="rId4" r:cs="rId5"/>
+          </a:graphicData>
+        </a:graphic>
+      </p:graphicFrame>
+    </p:spTree>
+    <p:extLst>
+      <p:ext uri="{BB962C8B-B14F-4D97-AF65-F5344CB8AC3E}">
+        <p14:creationId xmlns:p14="http://schemas.microsoft.com/office/powerpoint/2010/main" val="3595735604"/>
+      </p:ext>
+    </p:extLst>
+  </p:cSld>
+  <p:clrMapOvr>
+    <a:masterClrMapping/>
+  </p:clrMapOvr>
+</p:sld>
+</file>
+
+<file path=ppt/slides/slide51.xml><?xml version="1.0" encoding="utf-8"?>
+<p:sld xmlns:a="http://schemas.openxmlformats.org/drawingml/2006/main" xmlns:r="http://schemas.openxmlformats.org/officeDocument/2006/relationships" xmlns:p="http://schemas.openxmlformats.org/presentationml/2006/main">
+  <p:cSld>
+    <p:spTree>
+      <p:nvGrpSpPr>
+        <p:cNvPr id="1" name=""/>
+        <p:cNvGrpSpPr/>
+        <p:nvPr/>
+      </p:nvGrpSpPr>
+      <p:grpSpPr>
+        <a:xfrm>
+          <a:off x="0" y="0"/>
+          <a:ext cx="0" cy="0"/>
+          <a:chOff x="0" y="0"/>
+          <a:chExt cx="0" cy="0"/>
+        </a:xfrm>
+      </p:grpSpPr>
+      <p:sp>
+        <p:nvSpPr>
+          <p:cNvPr id="2" name="Title 1">
+            <a:extLst>
+              <a:ext uri="{FF2B5EF4-FFF2-40B4-BE49-F238E27FC236}">
+                <a16:creationId xmlns:a16="http://schemas.microsoft.com/office/drawing/2014/main" id="{F90744CA-AA12-694B-9EFD-DAE3C6B34B65}"/>
+              </a:ext>
+            </a:extLst>
+          </p:cNvPr>
+          <p:cNvSpPr>
+            <a:spLocks noGrp="1"/>
+          </p:cNvSpPr>
+          <p:nvPr>
+            <p:ph type="title"/>
+          </p:nvPr>
+        </p:nvSpPr>
+        <p:spPr>
+          <a:xfrm>
+            <a:off x="628650" y="273847"/>
+            <a:ext cx="7886700" cy="994172"/>
+          </a:xfrm>
+        </p:spPr>
+        <p:txBody>
+          <a:bodyPr anchor="ctr">
+            <a:normAutofit/>
+          </a:bodyPr>
+          <a:lstStyle/>
+          <a:p>
+            <a:r>
+              <a:rPr lang="en-US" dirty="0"/>
+              <a:t>Flow of the Attack</a:t>
+            </a:r>
+          </a:p>
+        </p:txBody>
+      </p:sp>
+      <p:graphicFrame>
+        <p:nvGraphicFramePr>
+          <p:cNvPr id="7" name="Content Placeholder 2">
+            <a:extLst>
+              <a:ext uri="{FF2B5EF4-FFF2-40B4-BE49-F238E27FC236}">
+                <a16:creationId xmlns:a16="http://schemas.microsoft.com/office/drawing/2014/main" id="{16AFF43D-D95F-43D7-9B17-22E96F279462}"/>
+              </a:ext>
+            </a:extLst>
+          </p:cNvPr>
+          <p:cNvGraphicFramePr>
+            <a:graphicFrameLocks noGrp="1"/>
+          </p:cNvGraphicFramePr>
+          <p:nvPr>
+            <p:ph idx="1"/>
+            <p:extLst>
+              <p:ext uri="{D42A27DB-BD31-4B8C-83A1-F6EECF244321}">
+                <p14:modId xmlns:p14="http://schemas.microsoft.com/office/powerpoint/2010/main" val="2551833715"/>
+              </p:ext>
+            </p:extLst>
+          </p:nvPr>
+        </p:nvGraphicFramePr>
+        <p:xfrm>
+          <a:off x="628650" y="1236541"/>
+          <a:ext cx="7886700" cy="3263504"/>
+        </p:xfrm>
+        <a:graphic>
+          <a:graphicData uri="http://schemas.openxmlformats.org/drawingml/2006/diagram">
+            <dgm:relIds xmlns:dgm="http://schemas.openxmlformats.org/drawingml/2006/diagram" xmlns:r="http://schemas.openxmlformats.org/officeDocument/2006/relationships" r:dm="rId2" r:lo="rId3" r:qs="rId4" r:cs="rId5"/>
+          </a:graphicData>
+        </a:graphic>
+      </p:graphicFrame>
+    </p:spTree>
+    <p:extLst>
+      <p:ext uri="{BB962C8B-B14F-4D97-AF65-F5344CB8AC3E}">
+        <p14:creationId xmlns:p14="http://schemas.microsoft.com/office/powerpoint/2010/main" val="2426609233"/>
+      </p:ext>
+    </p:extLst>
+  </p:cSld>
+  <p:clrMapOvr>
+    <a:masterClrMapping/>
+  </p:clrMapOvr>
+</p:sld>
+</file>
+
+<file path=ppt/slides/slide52.xml><?xml version="1.0" encoding="utf-8"?>
+<p:sld xmlns:a="http://schemas.openxmlformats.org/drawingml/2006/main" xmlns:r="http://schemas.openxmlformats.org/officeDocument/2006/relationships" xmlns:p="http://schemas.openxmlformats.org/presentationml/2006/main">
+  <p:cSld>
+    <p:spTree>
+      <p:nvGrpSpPr>
+        <p:cNvPr id="1" name=""/>
+        <p:cNvGrpSpPr/>
+        <p:nvPr/>
+      </p:nvGrpSpPr>
+      <p:grpSpPr>
+        <a:xfrm>
+          <a:off x="0" y="0"/>
+          <a:ext cx="0" cy="0"/>
+          <a:chOff x="0" y="0"/>
+          <a:chExt cx="0" cy="0"/>
+        </a:xfrm>
+      </p:grpSpPr>
+      <p:sp>
+        <p:nvSpPr>
+          <p:cNvPr id="2" name="Title 1">
+            <a:extLst>
+              <a:ext uri="{FF2B5EF4-FFF2-40B4-BE49-F238E27FC236}">
                 <a16:creationId xmlns:a16="http://schemas.microsoft.com/office/drawing/2014/main" id="{F90744CA-AA12-694B-9EFD-DAE3C6B34B65}"/>
               </a:ext>
             </a:extLst>
@@ -47431,7 +49142,7 @@
 </p:sld>
 </file>
 
-<file path=ppt/slides/slide51.xml><?xml version="1.0" encoding="utf-8"?>
+<file path=ppt/slides/slide53.xml><?xml version="1.0" encoding="utf-8"?>
 <p:sld xmlns:a="http://schemas.openxmlformats.org/drawingml/2006/main" xmlns:r="http://schemas.openxmlformats.org/officeDocument/2006/relationships" xmlns:p="http://schemas.openxmlformats.org/presentationml/2006/main">
   <p:cSld>
     <p:spTree>
@@ -47580,7 +49291,7 @@
 </p:sld>
 </file>
 
-<file path=ppt/slides/slide52.xml><?xml version="1.0" encoding="utf-8"?>
+<file path=ppt/slides/slide54.xml><?xml version="1.0" encoding="utf-8"?>
 <p:sld xmlns:a="http://schemas.openxmlformats.org/drawingml/2006/main" xmlns:r="http://schemas.openxmlformats.org/officeDocument/2006/relationships" xmlns:p="http://schemas.openxmlformats.org/presentationml/2006/main">
   <p:cSld>
     <p:spTree>
@@ -47733,7 +49444,7 @@
 </p:sld>
 </file>
 
-<file path=ppt/slides/slide53.xml><?xml version="1.0" encoding="utf-8"?>
+<file path=ppt/slides/slide55.xml><?xml version="1.0" encoding="utf-8"?>
 <p:sld xmlns:a="http://schemas.openxmlformats.org/drawingml/2006/main" xmlns:r="http://schemas.openxmlformats.org/officeDocument/2006/relationships" xmlns:p="http://schemas.openxmlformats.org/presentationml/2006/main">
   <p:cSld>
     <p:spTree>
@@ -47881,7 +49592,7 @@
 </p:sld>
 </file>
 
-<file path=ppt/slides/slide54.xml><?xml version="1.0" encoding="utf-8"?>
+<file path=ppt/slides/slide56.xml><?xml version="1.0" encoding="utf-8"?>
 <p:sld xmlns:a="http://schemas.openxmlformats.org/drawingml/2006/main" xmlns:r="http://schemas.openxmlformats.org/officeDocument/2006/relationships" xmlns:p="http://schemas.openxmlformats.org/presentationml/2006/main">
   <p:cSld>
     <p:spTree>
@@ -48204,7 +49915,7 @@
 </p:sld>
 </file>
 
-<file path=ppt/slides/slide55.xml><?xml version="1.0" encoding="utf-8"?>
+<file path=ppt/slides/slide57.xml><?xml version="1.0" encoding="utf-8"?>
 <p:sld xmlns:a="http://schemas.openxmlformats.org/drawingml/2006/main" xmlns:r="http://schemas.openxmlformats.org/officeDocument/2006/relationships" xmlns:p="http://schemas.openxmlformats.org/presentationml/2006/main">
   <p:cSld>
     <p:spTree>
@@ -48300,7 +50011,7 @@
 </p:sld>
 </file>
 
-<file path=ppt/slides/slide56.xml><?xml version="1.0" encoding="utf-8"?>
+<file path=ppt/slides/slide58.xml><?xml version="1.0" encoding="utf-8"?>
 <p:sld xmlns:a="http://schemas.openxmlformats.org/drawingml/2006/main" xmlns:r="http://schemas.openxmlformats.org/officeDocument/2006/relationships" xmlns:p="http://schemas.openxmlformats.org/presentationml/2006/main">
   <p:cSld>
     <p:spTree>
@@ -48482,7 +50193,7 @@
 </p:sld>
 </file>
 
-<file path=ppt/slides/slide57.xml><?xml version="1.0" encoding="utf-8"?>
+<file path=ppt/slides/slide59.xml><?xml version="1.0" encoding="utf-8"?>
 <p:sld xmlns:a="http://schemas.openxmlformats.org/drawingml/2006/main" xmlns:r="http://schemas.openxmlformats.org/officeDocument/2006/relationships" xmlns:p="http://schemas.openxmlformats.org/presentationml/2006/main">
   <p:cSld>
     <p:spTree>
@@ -48583,330 +50294,6 @@
     <p:extLst>
       <p:ext uri="{BB962C8B-B14F-4D97-AF65-F5344CB8AC3E}">
         <p14:creationId xmlns:p14="http://schemas.microsoft.com/office/powerpoint/2010/main" val="2336927160"/>
-      </p:ext>
-    </p:extLst>
-  </p:cSld>
-  <p:clrMapOvr>
-    <a:masterClrMapping/>
-  </p:clrMapOvr>
-</p:sld>
-</file>
-
-<file path=ppt/slides/slide58.xml><?xml version="1.0" encoding="utf-8"?>
-<p:sld xmlns:a="http://schemas.openxmlformats.org/drawingml/2006/main" xmlns:r="http://schemas.openxmlformats.org/officeDocument/2006/relationships" xmlns:p="http://schemas.openxmlformats.org/presentationml/2006/main">
-  <p:cSld>
-    <p:spTree>
-      <p:nvGrpSpPr>
-        <p:cNvPr id="1" name=""/>
-        <p:cNvGrpSpPr/>
-        <p:nvPr/>
-      </p:nvGrpSpPr>
-      <p:grpSpPr>
-        <a:xfrm>
-          <a:off x="0" y="0"/>
-          <a:ext cx="0" cy="0"/>
-          <a:chOff x="0" y="0"/>
-          <a:chExt cx="0" cy="0"/>
-        </a:xfrm>
-      </p:grpSpPr>
-      <p:sp>
-        <p:nvSpPr>
-          <p:cNvPr id="2" name="Title 1">
-            <a:extLst>
-              <a:ext uri="{FF2B5EF4-FFF2-40B4-BE49-F238E27FC236}">
-                <a16:creationId xmlns:a16="http://schemas.microsoft.com/office/drawing/2014/main" id="{5A2C7F9C-1BBE-8A43-97B8-7835CCBDB8B9}"/>
-              </a:ext>
-            </a:extLst>
-          </p:cNvPr>
-          <p:cNvSpPr>
-            <a:spLocks noGrp="1"/>
-          </p:cNvSpPr>
-          <p:nvPr>
-            <p:ph type="title"/>
-          </p:nvPr>
-        </p:nvSpPr>
-        <p:spPr>
-          <a:xfrm>
-            <a:off x="629841" y="342900"/>
-            <a:ext cx="2949178" cy="1200150"/>
-          </a:xfrm>
-        </p:spPr>
-        <p:txBody>
-          <a:bodyPr anchor="b">
-            <a:normAutofit/>
-          </a:bodyPr>
-          <a:lstStyle/>
-          <a:p>
-            <a:r>
-              <a:rPr lang="en-US" dirty="0"/>
-              <a:t>Final Thoughts</a:t>
-            </a:r>
-          </a:p>
-        </p:txBody>
-      </p:sp>
-      <p:pic>
-        <p:nvPicPr>
-          <p:cNvPr id="2050" name="Picture 2" descr="Use the Force Luke | League of Imaginary Heroes">
-            <a:extLst>
-              <a:ext uri="{FF2B5EF4-FFF2-40B4-BE49-F238E27FC236}">
-                <a16:creationId xmlns:a16="http://schemas.microsoft.com/office/drawing/2014/main" id="{C575ECEA-C02F-2349-98FC-72DB6C03822E}"/>
-              </a:ext>
-            </a:extLst>
-          </p:cNvPr>
-          <p:cNvPicPr>
-            <a:picLocks noChangeAspect="1" noChangeArrowheads="1"/>
-          </p:cNvPicPr>
-          <p:nvPr/>
-        </p:nvPicPr>
-        <p:blipFill rotWithShape="1">
-          <a:blip r:embed="rId2">
-            <a:extLst>
-              <a:ext uri="{28A0092B-C50C-407E-A947-70E740481C1C}">
-                <a14:useLocalDpi xmlns:a14="http://schemas.microsoft.com/office/drawing/2010/main" val="0"/>
-              </a:ext>
-            </a:extLst>
-          </a:blip>
-          <a:srcRect l="5016" r="-1" b="-1"/>
-          <a:stretch/>
-        </p:blipFill>
-        <p:spPr bwMode="auto">
-          <a:xfrm>
-            <a:off x="3887391" y="740572"/>
-            <a:ext cx="4629150" cy="3655219"/>
-          </a:xfrm>
-          <a:prstGeom prst="rect">
-            <a:avLst/>
-          </a:prstGeom>
-          <a:noFill/>
-        </p:spPr>
-      </p:pic>
-      <p:sp>
-        <p:nvSpPr>
-          <p:cNvPr id="3" name="Content Placeholder 2">
-            <a:extLst>
-              <a:ext uri="{FF2B5EF4-FFF2-40B4-BE49-F238E27FC236}">
-                <a16:creationId xmlns:a16="http://schemas.microsoft.com/office/drawing/2014/main" id="{860F7593-10E2-EE4F-9D20-F04A7EDB08FB}"/>
-              </a:ext>
-            </a:extLst>
-          </p:cNvPr>
-          <p:cNvSpPr>
-            <a:spLocks noGrp="1"/>
-          </p:cNvSpPr>
-          <p:nvPr>
-            <p:ph type="body" sz="half" idx="2"/>
-          </p:nvPr>
-        </p:nvSpPr>
-        <p:spPr>
-          <a:xfrm>
-            <a:off x="629841" y="1543052"/>
-            <a:ext cx="2949178" cy="2858691"/>
-          </a:xfrm>
-        </p:spPr>
-        <p:txBody>
-          <a:bodyPr>
-            <a:normAutofit/>
-          </a:bodyPr>
-          <a:lstStyle/>
-          <a:p>
-            <a:r>
-              <a:rPr lang="en-US"/>
-              <a:t>Awesome attack! Gives the ability to overwrite an arbitrary location in memory. </a:t>
-            </a:r>
-          </a:p>
-        </p:txBody>
-      </p:sp>
-    </p:spTree>
-    <p:extLst>
-      <p:ext uri="{BB962C8B-B14F-4D97-AF65-F5344CB8AC3E}">
-        <p14:creationId xmlns:p14="http://schemas.microsoft.com/office/powerpoint/2010/main" val="3759711070"/>
-      </p:ext>
-    </p:extLst>
-  </p:cSld>
-  <p:clrMapOvr>
-    <a:masterClrMapping/>
-  </p:clrMapOvr>
-</p:sld>
-</file>
-
-<file path=ppt/slides/slide59.xml><?xml version="1.0" encoding="utf-8"?>
-<p:sld xmlns:a="http://schemas.openxmlformats.org/drawingml/2006/main" xmlns:r="http://schemas.openxmlformats.org/officeDocument/2006/relationships" xmlns:p="http://schemas.openxmlformats.org/presentationml/2006/main">
-  <p:cSld>
-    <p:spTree>
-      <p:nvGrpSpPr>
-        <p:cNvPr id="1" name=""/>
-        <p:cNvGrpSpPr/>
-        <p:nvPr/>
-      </p:nvGrpSpPr>
-      <p:grpSpPr>
-        <a:xfrm>
-          <a:off x="0" y="0"/>
-          <a:ext cx="0" cy="0"/>
-          <a:chOff x="0" y="0"/>
-          <a:chExt cx="0" cy="0"/>
-        </a:xfrm>
-      </p:grpSpPr>
-      <p:sp>
-        <p:nvSpPr>
-          <p:cNvPr id="2" name="Title 1">
-            <a:extLst>
-              <a:ext uri="{FF2B5EF4-FFF2-40B4-BE49-F238E27FC236}">
-                <a16:creationId xmlns:a16="http://schemas.microsoft.com/office/drawing/2014/main" id="{AE175557-99A5-9746-8F05-48A96BA70E04}"/>
-              </a:ext>
-            </a:extLst>
-          </p:cNvPr>
-          <p:cNvSpPr>
-            <a:spLocks noGrp="1"/>
-          </p:cNvSpPr>
-          <p:nvPr>
-            <p:ph type="title"/>
-          </p:nvPr>
-        </p:nvSpPr>
-        <p:spPr/>
-        <p:txBody>
-          <a:bodyPr/>
-          <a:lstStyle/>
-          <a:p>
-            <a:r>
-              <a:rPr lang="en-US" dirty="0"/>
-              <a:t>Resources</a:t>
-            </a:r>
-          </a:p>
-        </p:txBody>
-      </p:sp>
-      <p:sp>
-        <p:nvSpPr>
-          <p:cNvPr id="3" name="Content Placeholder 2">
-            <a:extLst>
-              <a:ext uri="{FF2B5EF4-FFF2-40B4-BE49-F238E27FC236}">
-                <a16:creationId xmlns:a16="http://schemas.microsoft.com/office/drawing/2014/main" id="{69C00B45-D100-B94B-91DC-FA8C917E3995}"/>
-              </a:ext>
-            </a:extLst>
-          </p:cNvPr>
-          <p:cNvSpPr>
-            <a:spLocks noGrp="1"/>
-          </p:cNvSpPr>
-          <p:nvPr>
-            <p:ph idx="1"/>
-          </p:nvPr>
-        </p:nvSpPr>
-        <p:spPr/>
-        <p:txBody>
-          <a:bodyPr>
-            <a:normAutofit fontScale="85000" lnSpcReduction="10000"/>
-          </a:bodyPr>
-          <a:lstStyle/>
-          <a:p>
-            <a:r>
-              <a:rPr lang="en-US" dirty="0"/>
-              <a:t>Real world House of Force exploitation : </a:t>
-            </a:r>
-            <a:r>
-              <a:rPr lang="en-US" dirty="0">
-                <a:hlinkClick r:id="rId2"/>
-              </a:rPr>
-              <a:t>https://securitylab.github.com/research/last-orders-at-the-house-of-force</a:t>
-            </a:r>
-            <a:r>
-              <a:rPr lang="en-US" dirty="0"/>
-              <a:t> </a:t>
-            </a:r>
-          </a:p>
-          <a:p>
-            <a:r>
-              <a:rPr lang="en-US" dirty="0"/>
-              <a:t>House of Force Explanation : </a:t>
-            </a:r>
-          </a:p>
-          <a:p>
-            <a:pPr lvl="1"/>
-            <a:r>
-              <a:rPr lang="en-US" dirty="0">
-                <a:hlinkClick r:id="rId3"/>
-              </a:rPr>
-              <a:t>https://sploitfun.wordpress.com/tag/house-of-force/</a:t>
-            </a:r>
-            <a:endParaRPr lang="en-US" dirty="0"/>
-          </a:p>
-          <a:p>
-            <a:pPr lvl="1"/>
-            <a:r>
-              <a:rPr lang="en-US" dirty="0">
-                <a:hlinkClick r:id="rId4"/>
-              </a:rPr>
-              <a:t>https://heap-exploitation.dhavalkapil.com/attacks/house_of_force</a:t>
-            </a:r>
-            <a:endParaRPr lang="en-US" dirty="0"/>
-          </a:p>
-          <a:p>
-            <a:pPr lvl="1"/>
-            <a:r>
-              <a:rPr lang="en-US" dirty="0">
-                <a:hlinkClick r:id="rId5"/>
-              </a:rPr>
-              <a:t>https://raydenchia.com/glibc-heap-exploitation-house-of-force/</a:t>
-            </a:r>
-            <a:r>
-              <a:rPr lang="en-US" dirty="0"/>
-              <a:t> </a:t>
-            </a:r>
-          </a:p>
-          <a:p>
-            <a:r>
-              <a:rPr lang="en-US" dirty="0"/>
-              <a:t>Good examples : </a:t>
-            </a:r>
-          </a:p>
-          <a:p>
-            <a:pPr lvl="1"/>
-            <a:r>
-              <a:rPr lang="en-US" dirty="0">
-                <a:hlinkClick r:id="rId6"/>
-              </a:rPr>
-              <a:t>https://ctf-wiki.github.io/ctf-wiki/pwn/linux/glibc-heap/house_of_force/</a:t>
-            </a:r>
-            <a:r>
-              <a:rPr lang="en-US" dirty="0"/>
-              <a:t> </a:t>
-            </a:r>
-          </a:p>
-          <a:p>
-            <a:pPr lvl="1"/>
-            <a:r>
-              <a:rPr lang="en-US" dirty="0">
-                <a:hlinkClick r:id="rId7"/>
-              </a:rPr>
-              <a:t>https://www.youtube.com/watch?v=PISoSH8KGVI</a:t>
-            </a:r>
-            <a:r>
-              <a:rPr lang="en-US" dirty="0"/>
-              <a:t> </a:t>
-            </a:r>
-          </a:p>
-          <a:p>
-            <a:r>
-              <a:rPr lang="en-US" dirty="0"/>
-              <a:t>Malloc MALEFICARUM (DES): </a:t>
-            </a:r>
-            <a:r>
-              <a:rPr lang="en-US" dirty="0">
-                <a:hlinkClick r:id="rId8"/>
-              </a:rPr>
-              <a:t>http://phrack.org/issues/66/10.html</a:t>
-            </a:r>
-            <a:r>
-              <a:rPr lang="en-US" dirty="0"/>
-              <a:t> </a:t>
-            </a:r>
-          </a:p>
-          <a:p>
-            <a:endParaRPr lang="en-US" dirty="0"/>
-          </a:p>
-        </p:txBody>
-      </p:sp>
-    </p:spTree>
-    <p:extLst>
-      <p:ext uri="{BB962C8B-B14F-4D97-AF65-F5344CB8AC3E}">
-        <p14:creationId xmlns:p14="http://schemas.microsoft.com/office/powerpoint/2010/main" val="365515686"/>
       </p:ext>
     </p:extLst>
   </p:cSld>
@@ -49230,6 +50617,330 @@
     <p:extLst>
       <p:ext uri="{BB962C8B-B14F-4D97-AF65-F5344CB8AC3E}">
         <p14:creationId xmlns:p14="http://schemas.microsoft.com/office/powerpoint/2010/main" val="3810720592"/>
+      </p:ext>
+    </p:extLst>
+  </p:cSld>
+  <p:clrMapOvr>
+    <a:masterClrMapping/>
+  </p:clrMapOvr>
+</p:sld>
+</file>
+
+<file path=ppt/slides/slide60.xml><?xml version="1.0" encoding="utf-8"?>
+<p:sld xmlns:a="http://schemas.openxmlformats.org/drawingml/2006/main" xmlns:r="http://schemas.openxmlformats.org/officeDocument/2006/relationships" xmlns:p="http://schemas.openxmlformats.org/presentationml/2006/main">
+  <p:cSld>
+    <p:spTree>
+      <p:nvGrpSpPr>
+        <p:cNvPr id="1" name=""/>
+        <p:cNvGrpSpPr/>
+        <p:nvPr/>
+      </p:nvGrpSpPr>
+      <p:grpSpPr>
+        <a:xfrm>
+          <a:off x="0" y="0"/>
+          <a:ext cx="0" cy="0"/>
+          <a:chOff x="0" y="0"/>
+          <a:chExt cx="0" cy="0"/>
+        </a:xfrm>
+      </p:grpSpPr>
+      <p:sp>
+        <p:nvSpPr>
+          <p:cNvPr id="2" name="Title 1">
+            <a:extLst>
+              <a:ext uri="{FF2B5EF4-FFF2-40B4-BE49-F238E27FC236}">
+                <a16:creationId xmlns:a16="http://schemas.microsoft.com/office/drawing/2014/main" id="{5A2C7F9C-1BBE-8A43-97B8-7835CCBDB8B9}"/>
+              </a:ext>
+            </a:extLst>
+          </p:cNvPr>
+          <p:cNvSpPr>
+            <a:spLocks noGrp="1"/>
+          </p:cNvSpPr>
+          <p:nvPr>
+            <p:ph type="title"/>
+          </p:nvPr>
+        </p:nvSpPr>
+        <p:spPr>
+          <a:xfrm>
+            <a:off x="629841" y="342900"/>
+            <a:ext cx="2949178" cy="1200150"/>
+          </a:xfrm>
+        </p:spPr>
+        <p:txBody>
+          <a:bodyPr anchor="b">
+            <a:normAutofit/>
+          </a:bodyPr>
+          <a:lstStyle/>
+          <a:p>
+            <a:r>
+              <a:rPr lang="en-US" dirty="0"/>
+              <a:t>Final Thoughts</a:t>
+            </a:r>
+          </a:p>
+        </p:txBody>
+      </p:sp>
+      <p:pic>
+        <p:nvPicPr>
+          <p:cNvPr id="2050" name="Picture 2" descr="Use the Force Luke | League of Imaginary Heroes">
+            <a:extLst>
+              <a:ext uri="{FF2B5EF4-FFF2-40B4-BE49-F238E27FC236}">
+                <a16:creationId xmlns:a16="http://schemas.microsoft.com/office/drawing/2014/main" id="{C575ECEA-C02F-2349-98FC-72DB6C03822E}"/>
+              </a:ext>
+            </a:extLst>
+          </p:cNvPr>
+          <p:cNvPicPr>
+            <a:picLocks noChangeAspect="1" noChangeArrowheads="1"/>
+          </p:cNvPicPr>
+          <p:nvPr/>
+        </p:nvPicPr>
+        <p:blipFill rotWithShape="1">
+          <a:blip r:embed="rId2">
+            <a:extLst>
+              <a:ext uri="{28A0092B-C50C-407E-A947-70E740481C1C}">
+                <a14:useLocalDpi xmlns:a14="http://schemas.microsoft.com/office/drawing/2010/main" val="0"/>
+              </a:ext>
+            </a:extLst>
+          </a:blip>
+          <a:srcRect l="5016" r="-1" b="-1"/>
+          <a:stretch/>
+        </p:blipFill>
+        <p:spPr bwMode="auto">
+          <a:xfrm>
+            <a:off x="3887391" y="740572"/>
+            <a:ext cx="4629150" cy="3655219"/>
+          </a:xfrm>
+          <a:prstGeom prst="rect">
+            <a:avLst/>
+          </a:prstGeom>
+          <a:noFill/>
+        </p:spPr>
+      </p:pic>
+      <p:sp>
+        <p:nvSpPr>
+          <p:cNvPr id="3" name="Content Placeholder 2">
+            <a:extLst>
+              <a:ext uri="{FF2B5EF4-FFF2-40B4-BE49-F238E27FC236}">
+                <a16:creationId xmlns:a16="http://schemas.microsoft.com/office/drawing/2014/main" id="{860F7593-10E2-EE4F-9D20-F04A7EDB08FB}"/>
+              </a:ext>
+            </a:extLst>
+          </p:cNvPr>
+          <p:cNvSpPr>
+            <a:spLocks noGrp="1"/>
+          </p:cNvSpPr>
+          <p:nvPr>
+            <p:ph type="body" sz="half" idx="2"/>
+          </p:nvPr>
+        </p:nvSpPr>
+        <p:spPr>
+          <a:xfrm>
+            <a:off x="629841" y="1543052"/>
+            <a:ext cx="2949178" cy="2858691"/>
+          </a:xfrm>
+        </p:spPr>
+        <p:txBody>
+          <a:bodyPr>
+            <a:normAutofit/>
+          </a:bodyPr>
+          <a:lstStyle/>
+          <a:p>
+            <a:r>
+              <a:rPr lang="en-US"/>
+              <a:t>Awesome attack! Gives the ability to overwrite an arbitrary location in memory. </a:t>
+            </a:r>
+          </a:p>
+        </p:txBody>
+      </p:sp>
+    </p:spTree>
+    <p:extLst>
+      <p:ext uri="{BB962C8B-B14F-4D97-AF65-F5344CB8AC3E}">
+        <p14:creationId xmlns:p14="http://schemas.microsoft.com/office/powerpoint/2010/main" val="3759711070"/>
+      </p:ext>
+    </p:extLst>
+  </p:cSld>
+  <p:clrMapOvr>
+    <a:masterClrMapping/>
+  </p:clrMapOvr>
+</p:sld>
+</file>
+
+<file path=ppt/slides/slide61.xml><?xml version="1.0" encoding="utf-8"?>
+<p:sld xmlns:a="http://schemas.openxmlformats.org/drawingml/2006/main" xmlns:r="http://schemas.openxmlformats.org/officeDocument/2006/relationships" xmlns:p="http://schemas.openxmlformats.org/presentationml/2006/main">
+  <p:cSld>
+    <p:spTree>
+      <p:nvGrpSpPr>
+        <p:cNvPr id="1" name=""/>
+        <p:cNvGrpSpPr/>
+        <p:nvPr/>
+      </p:nvGrpSpPr>
+      <p:grpSpPr>
+        <a:xfrm>
+          <a:off x="0" y="0"/>
+          <a:ext cx="0" cy="0"/>
+          <a:chOff x="0" y="0"/>
+          <a:chExt cx="0" cy="0"/>
+        </a:xfrm>
+      </p:grpSpPr>
+      <p:sp>
+        <p:nvSpPr>
+          <p:cNvPr id="2" name="Title 1">
+            <a:extLst>
+              <a:ext uri="{FF2B5EF4-FFF2-40B4-BE49-F238E27FC236}">
+                <a16:creationId xmlns:a16="http://schemas.microsoft.com/office/drawing/2014/main" id="{AE175557-99A5-9746-8F05-48A96BA70E04}"/>
+              </a:ext>
+            </a:extLst>
+          </p:cNvPr>
+          <p:cNvSpPr>
+            <a:spLocks noGrp="1"/>
+          </p:cNvSpPr>
+          <p:nvPr>
+            <p:ph type="title"/>
+          </p:nvPr>
+        </p:nvSpPr>
+        <p:spPr/>
+        <p:txBody>
+          <a:bodyPr/>
+          <a:lstStyle/>
+          <a:p>
+            <a:r>
+              <a:rPr lang="en-US" dirty="0"/>
+              <a:t>Resources</a:t>
+            </a:r>
+          </a:p>
+        </p:txBody>
+      </p:sp>
+      <p:sp>
+        <p:nvSpPr>
+          <p:cNvPr id="3" name="Content Placeholder 2">
+            <a:extLst>
+              <a:ext uri="{FF2B5EF4-FFF2-40B4-BE49-F238E27FC236}">
+                <a16:creationId xmlns:a16="http://schemas.microsoft.com/office/drawing/2014/main" id="{69C00B45-D100-B94B-91DC-FA8C917E3995}"/>
+              </a:ext>
+            </a:extLst>
+          </p:cNvPr>
+          <p:cNvSpPr>
+            <a:spLocks noGrp="1"/>
+          </p:cNvSpPr>
+          <p:nvPr>
+            <p:ph idx="1"/>
+          </p:nvPr>
+        </p:nvSpPr>
+        <p:spPr/>
+        <p:txBody>
+          <a:bodyPr>
+            <a:normAutofit fontScale="85000" lnSpcReduction="10000"/>
+          </a:bodyPr>
+          <a:lstStyle/>
+          <a:p>
+            <a:r>
+              <a:rPr lang="en-US" dirty="0"/>
+              <a:t>Real world House of Force exploitation : </a:t>
+            </a:r>
+            <a:r>
+              <a:rPr lang="en-US" dirty="0">
+                <a:hlinkClick r:id="rId2"/>
+              </a:rPr>
+              <a:t>https://securitylab.github.com/research/last-orders-at-the-house-of-force</a:t>
+            </a:r>
+            <a:r>
+              <a:rPr lang="en-US" dirty="0"/>
+              <a:t> </a:t>
+            </a:r>
+          </a:p>
+          <a:p>
+            <a:r>
+              <a:rPr lang="en-US" dirty="0"/>
+              <a:t>House of Force Explanation : </a:t>
+            </a:r>
+          </a:p>
+          <a:p>
+            <a:pPr lvl="1"/>
+            <a:r>
+              <a:rPr lang="en-US" dirty="0">
+                <a:hlinkClick r:id="rId3"/>
+              </a:rPr>
+              <a:t>https://sploitfun.wordpress.com/tag/house-of-force/</a:t>
+            </a:r>
+            <a:endParaRPr lang="en-US" dirty="0"/>
+          </a:p>
+          <a:p>
+            <a:pPr lvl="1"/>
+            <a:r>
+              <a:rPr lang="en-US" dirty="0">
+                <a:hlinkClick r:id="rId4"/>
+              </a:rPr>
+              <a:t>https://heap-exploitation.dhavalkapil.com/attacks/house_of_force</a:t>
+            </a:r>
+            <a:endParaRPr lang="en-US" dirty="0"/>
+          </a:p>
+          <a:p>
+            <a:pPr lvl="1"/>
+            <a:r>
+              <a:rPr lang="en-US" dirty="0">
+                <a:hlinkClick r:id="rId5"/>
+              </a:rPr>
+              <a:t>https://raydenchia.com/glibc-heap-exploitation-house-of-force/</a:t>
+            </a:r>
+            <a:r>
+              <a:rPr lang="en-US" dirty="0"/>
+              <a:t> </a:t>
+            </a:r>
+          </a:p>
+          <a:p>
+            <a:r>
+              <a:rPr lang="en-US" dirty="0"/>
+              <a:t>Good examples : </a:t>
+            </a:r>
+          </a:p>
+          <a:p>
+            <a:pPr lvl="1"/>
+            <a:r>
+              <a:rPr lang="en-US" dirty="0">
+                <a:hlinkClick r:id="rId6"/>
+              </a:rPr>
+              <a:t>https://ctf-wiki.github.io/ctf-wiki/pwn/linux/glibc-heap/house_of_force/</a:t>
+            </a:r>
+            <a:r>
+              <a:rPr lang="en-US" dirty="0"/>
+              <a:t> </a:t>
+            </a:r>
+          </a:p>
+          <a:p>
+            <a:pPr lvl="1"/>
+            <a:r>
+              <a:rPr lang="en-US" dirty="0">
+                <a:hlinkClick r:id="rId7"/>
+              </a:rPr>
+              <a:t>https://www.youtube.com/watch?v=PISoSH8KGVI</a:t>
+            </a:r>
+            <a:r>
+              <a:rPr lang="en-US" dirty="0"/>
+              <a:t> </a:t>
+            </a:r>
+          </a:p>
+          <a:p>
+            <a:r>
+              <a:rPr lang="en-US" dirty="0"/>
+              <a:t>Malloc MALEFICARUM (DES): </a:t>
+            </a:r>
+            <a:r>
+              <a:rPr lang="en-US" dirty="0">
+                <a:hlinkClick r:id="rId8"/>
+              </a:rPr>
+              <a:t>http://phrack.org/issues/66/10.html</a:t>
+            </a:r>
+            <a:r>
+              <a:rPr lang="en-US" dirty="0"/>
+              <a:t> </a:t>
+            </a:r>
+          </a:p>
+          <a:p>
+            <a:endParaRPr lang="en-US" dirty="0"/>
+          </a:p>
+        </p:txBody>
+      </p:sp>
+    </p:spTree>
+    <p:extLst>
+      <p:ext uri="{BB962C8B-B14F-4D97-AF65-F5344CB8AC3E}">
+        <p14:creationId xmlns:p14="http://schemas.microsoft.com/office/powerpoint/2010/main" val="365515686"/>
       </p:ext>
     </p:extLst>
   </p:cSld>

</xml_diff>

<commit_message>
Touch up House of Force after Israeli group
</commit_message>
<xml_diff>
--- a/modules/house_of_force/house_of_force.pptx
+++ b/modules/house_of_force/house_of_force.pptx
@@ -26446,7 +26446,7 @@
           <a:p>
             <a:fld id="{2DA23E8D-1792-1541-9147-970A8DD8A355}" type="datetimeFigureOut">
               <a:rPr lang="en-US" smtClean="0"/>
-              <a:t>9/22/21</a:t>
+              <a:t>10/5/21</a:t>
             </a:fld>
             <a:endParaRPr lang="en-US" dirty="0"/>
           </a:p>
@@ -27316,7 +27316,7 @@
                 <a:latin typeface="Calibri"/>
               </a:rPr>
               <a:pPr/>
-              <a:t>9/22/21</a:t>
+              <a:t>10/5/21</a:t>
             </a:fld>
             <a:endParaRPr lang="en-US" dirty="0">
               <a:solidFill>
@@ -27569,7 +27569,7 @@
                 <a:latin typeface="Calibri"/>
               </a:rPr>
               <a:pPr/>
-              <a:t>9/22/21</a:t>
+              <a:t>10/5/21</a:t>
             </a:fld>
             <a:endParaRPr lang="en-US" dirty="0">
               <a:solidFill>
@@ -27784,7 +27784,7 @@
                 <a:latin typeface="Calibri"/>
               </a:rPr>
               <a:pPr/>
-              <a:t>9/22/21</a:t>
+              <a:t>10/5/21</a:t>
             </a:fld>
             <a:endParaRPr lang="en-US" dirty="0">
               <a:solidFill>
@@ -28068,7 +28068,7 @@
                 <a:latin typeface="Calibri"/>
               </a:rPr>
               <a:pPr/>
-              <a:t>9/22/21</a:t>
+              <a:t>10/5/21</a:t>
             </a:fld>
             <a:endParaRPr lang="en-US" dirty="0">
               <a:solidFill>
@@ -28410,7 +28410,7 @@
                 <a:latin typeface="Calibri"/>
               </a:rPr>
               <a:pPr/>
-              <a:t>9/22/21</a:t>
+              <a:t>10/5/21</a:t>
             </a:fld>
             <a:endParaRPr lang="en-US" dirty="0">
               <a:solidFill>
@@ -28738,7 +28738,7 @@
                 <a:latin typeface="Calibri"/>
               </a:rPr>
               <a:pPr/>
-              <a:t>9/22/21</a:t>
+              <a:t>10/5/21</a:t>
             </a:fld>
             <a:endParaRPr lang="en-US" dirty="0">
               <a:solidFill>
@@ -29227,7 +29227,7 @@
                 <a:latin typeface="Calibri"/>
               </a:rPr>
               <a:pPr/>
-              <a:t>9/22/21</a:t>
+              <a:t>10/5/21</a:t>
             </a:fld>
             <a:endParaRPr lang="en-US" dirty="0">
               <a:solidFill>
@@ -29410,7 +29410,7 @@
                 <a:latin typeface="Calibri"/>
               </a:rPr>
               <a:pPr/>
-              <a:t>9/22/21</a:t>
+              <a:t>10/5/21</a:t>
             </a:fld>
             <a:endParaRPr lang="en-US" dirty="0">
               <a:solidFill>
@@ -29656,7 +29656,7 @@
                 <a:latin typeface="Calibri"/>
               </a:rPr>
               <a:pPr/>
-              <a:t>9/22/21</a:t>
+              <a:t>10/5/21</a:t>
             </a:fld>
             <a:endParaRPr lang="en-US" dirty="0">
               <a:solidFill>
@@ -29998,7 +29998,7 @@
                 <a:latin typeface="Calibri"/>
               </a:rPr>
               <a:pPr/>
-              <a:t>9/22/21</a:t>
+              <a:t>10/5/21</a:t>
             </a:fld>
             <a:endParaRPr lang="en-US" dirty="0">
               <a:solidFill>
@@ -30290,7 +30290,7 @@
                 <a:latin typeface="Calibri"/>
               </a:rPr>
               <a:pPr/>
-              <a:t>9/22/21</a:t>
+              <a:t>10/5/21</a:t>
             </a:fld>
             <a:endParaRPr lang="en-US" dirty="0">
               <a:solidFill>
@@ -30540,7 +30540,7 @@
                 <a:latin typeface="Calibri"/>
               </a:rPr>
               <a:pPr defTabSz="914400"/>
-              <a:t>9/22/21</a:t>
+              <a:t>10/5/21</a:t>
             </a:fld>
             <a:endParaRPr lang="en-US" dirty="0">
               <a:solidFill>

</xml_diff>

<commit_message>
Add slides for DEFCON
</commit_message>
<xml_diff>
--- a/modules/house_of_force/house_of_force.pptx
+++ b/modules/house_of_force/house_of_force.pptx
@@ -5,7 +5,7 @@
     <p:sldMasterId id="2147483660" r:id="rId1"/>
   </p:sldMasterIdLst>
   <p:notesMasterIdLst>
-    <p:notesMasterId r:id="rId63"/>
+    <p:notesMasterId r:id="rId64"/>
   </p:notesMasterIdLst>
   <p:sldIdLst>
     <p:sldId id="327" r:id="rId2"/>
@@ -67,8 +67,9 @@
     <p:sldId id="556" r:id="rId58"/>
     <p:sldId id="505" r:id="rId59"/>
     <p:sldId id="565" r:id="rId60"/>
-    <p:sldId id="557" r:id="rId61"/>
-    <p:sldId id="524" r:id="rId62"/>
+    <p:sldId id="568" r:id="rId61"/>
+    <p:sldId id="557" r:id="rId62"/>
+    <p:sldId id="524" r:id="rId63"/>
   </p:sldIdLst>
   <p:sldSz cx="9144000" cy="5143500" type="screen16x9"/>
   <p:notesSz cx="6858000" cy="9144000"/>
@@ -26441,7 +26442,7 @@
           <a:p>
             <a:fld id="{2DA23E8D-1792-1541-9147-970A8DD8A355}" type="datetimeFigureOut">
               <a:rPr lang="en-US" smtClean="0"/>
-              <a:t>5/3/22</a:t>
+              <a:t>7/2/22</a:t>
             </a:fld>
             <a:endParaRPr lang="en-US" dirty="0"/>
           </a:p>
@@ -27192,6 +27193,93 @@
 </p:notes>
 </file>
 
+<file path=ppt/notesSlides/notesSlide6.xml><?xml version="1.0" encoding="utf-8"?>
+<p:notes xmlns:a="http://schemas.openxmlformats.org/drawingml/2006/main" xmlns:r="http://schemas.openxmlformats.org/officeDocument/2006/relationships" xmlns:p="http://schemas.openxmlformats.org/presentationml/2006/main">
+  <p:cSld>
+    <p:spTree>
+      <p:nvGrpSpPr>
+        <p:cNvPr id="1" name=""/>
+        <p:cNvGrpSpPr/>
+        <p:nvPr/>
+      </p:nvGrpSpPr>
+      <p:grpSpPr>
+        <a:xfrm>
+          <a:off x="0" y="0"/>
+          <a:ext cx="0" cy="0"/>
+          <a:chOff x="0" y="0"/>
+          <a:chExt cx="0" cy="0"/>
+        </a:xfrm>
+      </p:grpSpPr>
+      <p:sp>
+        <p:nvSpPr>
+          <p:cNvPr id="2" name="Slide Image Placeholder 1"/>
+          <p:cNvSpPr>
+            <a:spLocks noGrp="1" noRot="1" noChangeAspect="1"/>
+          </p:cNvSpPr>
+          <p:nvPr>
+            <p:ph type="sldImg"/>
+          </p:nvPr>
+        </p:nvSpPr>
+        <p:spPr/>
+      </p:sp>
+      <p:sp>
+        <p:nvSpPr>
+          <p:cNvPr id="3" name="Notes Placeholder 2"/>
+          <p:cNvSpPr>
+            <a:spLocks noGrp="1"/>
+          </p:cNvSpPr>
+          <p:nvPr>
+            <p:ph type="body" idx="1"/>
+          </p:nvPr>
+        </p:nvSpPr>
+        <p:spPr/>
+        <p:txBody>
+          <a:bodyPr/>
+          <a:lstStyle/>
+          <a:p>
+            <a:r>
+              <a:rPr lang="en-US" dirty="0"/>
+              <a:t>- Popping a shell is weird on this challenge for some reason… </a:t>
+            </a:r>
+          </a:p>
+        </p:txBody>
+      </p:sp>
+      <p:sp>
+        <p:nvSpPr>
+          <p:cNvPr id="4" name="Slide Number Placeholder 3"/>
+          <p:cNvSpPr>
+            <a:spLocks noGrp="1"/>
+          </p:cNvSpPr>
+          <p:nvPr>
+            <p:ph type="sldNum" sz="quarter" idx="5"/>
+          </p:nvPr>
+        </p:nvSpPr>
+        <p:spPr/>
+        <p:txBody>
+          <a:bodyPr/>
+          <a:lstStyle/>
+          <a:p>
+            <a:fld id="{AC55928C-CD14-454C-B617-1AFCF9A58596}" type="slidenum">
+              <a:rPr lang="en-US" smtClean="0"/>
+              <a:t>34</a:t>
+            </a:fld>
+            <a:endParaRPr lang="en-US" dirty="0"/>
+          </a:p>
+        </p:txBody>
+      </p:sp>
+    </p:spTree>
+    <p:extLst>
+      <p:ext uri="{BB962C8B-B14F-4D97-AF65-F5344CB8AC3E}">
+        <p14:creationId xmlns:p14="http://schemas.microsoft.com/office/powerpoint/2010/main" val="1378170947"/>
+      </p:ext>
+    </p:extLst>
+  </p:cSld>
+  <p:clrMapOvr>
+    <a:masterClrMapping/>
+  </p:clrMapOvr>
+</p:notes>
+</file>
+
 <file path=ppt/slideLayouts/slideLayout1.xml><?xml version="1.0" encoding="utf-8"?>
 <p:sldLayout xmlns:a="http://schemas.openxmlformats.org/drawingml/2006/main" xmlns:r="http://schemas.openxmlformats.org/officeDocument/2006/relationships" xmlns:p="http://schemas.openxmlformats.org/presentationml/2006/main" type="title" preserve="1">
   <p:cSld name="Title Slide">
@@ -27395,7 +27483,7 @@
                 <a:latin typeface="Calibri"/>
               </a:rPr>
               <a:pPr/>
-              <a:t>5/3/22</a:t>
+              <a:t>7/2/22</a:t>
             </a:fld>
             <a:endParaRPr lang="en-US" dirty="0">
               <a:solidFill>
@@ -27648,7 +27736,7 @@
                 <a:latin typeface="Calibri"/>
               </a:rPr>
               <a:pPr/>
-              <a:t>5/3/22</a:t>
+              <a:t>7/2/22</a:t>
             </a:fld>
             <a:endParaRPr lang="en-US" dirty="0">
               <a:solidFill>
@@ -27863,7 +27951,7 @@
                 <a:latin typeface="Calibri"/>
               </a:rPr>
               <a:pPr/>
-              <a:t>5/3/22</a:t>
+              <a:t>7/2/22</a:t>
             </a:fld>
             <a:endParaRPr lang="en-US" dirty="0">
               <a:solidFill>
@@ -28147,7 +28235,7 @@
                 <a:latin typeface="Calibri"/>
               </a:rPr>
               <a:pPr/>
-              <a:t>5/3/22</a:t>
+              <a:t>7/2/22</a:t>
             </a:fld>
             <a:endParaRPr lang="en-US" dirty="0">
               <a:solidFill>
@@ -28489,7 +28577,7 @@
                 <a:latin typeface="Calibri"/>
               </a:rPr>
               <a:pPr/>
-              <a:t>5/3/22</a:t>
+              <a:t>7/2/22</a:t>
             </a:fld>
             <a:endParaRPr lang="en-US" dirty="0">
               <a:solidFill>
@@ -28817,7 +28905,7 @@
                 <a:latin typeface="Calibri"/>
               </a:rPr>
               <a:pPr/>
-              <a:t>5/3/22</a:t>
+              <a:t>7/2/22</a:t>
             </a:fld>
             <a:endParaRPr lang="en-US" dirty="0">
               <a:solidFill>
@@ -29306,7 +29394,7 @@
                 <a:latin typeface="Calibri"/>
               </a:rPr>
               <a:pPr/>
-              <a:t>5/3/22</a:t>
+              <a:t>7/2/22</a:t>
             </a:fld>
             <a:endParaRPr lang="en-US" dirty="0">
               <a:solidFill>
@@ -29489,7 +29577,7 @@
                 <a:latin typeface="Calibri"/>
               </a:rPr>
               <a:pPr/>
-              <a:t>5/3/22</a:t>
+              <a:t>7/2/22</a:t>
             </a:fld>
             <a:endParaRPr lang="en-US" dirty="0">
               <a:solidFill>
@@ -29735,7 +29823,7 @@
                 <a:latin typeface="Calibri"/>
               </a:rPr>
               <a:pPr/>
-              <a:t>5/3/22</a:t>
+              <a:t>7/2/22</a:t>
             </a:fld>
             <a:endParaRPr lang="en-US" dirty="0">
               <a:solidFill>
@@ -30077,7 +30165,7 @@
                 <a:latin typeface="Calibri"/>
               </a:rPr>
               <a:pPr/>
-              <a:t>5/3/22</a:t>
+              <a:t>7/2/22</a:t>
             </a:fld>
             <a:endParaRPr lang="en-US" dirty="0">
               <a:solidFill>
@@ -30369,7 +30457,7 @@
                 <a:latin typeface="Calibri"/>
               </a:rPr>
               <a:pPr/>
-              <a:t>5/3/22</a:t>
+              <a:t>7/2/22</a:t>
             </a:fld>
             <a:endParaRPr lang="en-US" dirty="0">
               <a:solidFill>
@@ -30619,7 +30707,7 @@
                 <a:latin typeface="Calibri"/>
               </a:rPr>
               <a:pPr defTabSz="914400"/>
-              <a:t>5/3/22</a:t>
+              <a:t>7/2/22</a:t>
             </a:fld>
             <a:endParaRPr lang="en-US" dirty="0">
               <a:solidFill>
@@ -43222,7 +43310,7 @@
           <a:p>
             <a:r>
               <a:rPr lang="en-US" dirty="0"/>
-              <a:t>Challenge Time!</a:t>
+              <a:t>Exercise Time!</a:t>
             </a:r>
           </a:p>
         </p:txBody>
@@ -43254,13 +43342,8 @@
             </a:r>
             <a:r>
               <a:rPr lang="en-US" dirty="0"/>
-              <a:t>/</a:t>
-            </a:r>
-            <a:r>
-              <a:rPr lang="en-US" dirty="0" err="1"/>
-              <a:t>shining_moment</a:t>
-            </a:r>
-            <a:endParaRPr lang="en-US" dirty="0"/>
+              <a:t>/exercise1/</a:t>
+            </a:r>
           </a:p>
           <a:p>
             <a:r>
@@ -49284,22 +49367,26 @@
             <a:r>
               <a:rPr lang="en-US" dirty="0">
                 <a:solidFill>
+                  <a:srgbClr val="FF0000"/>
+                </a:solidFill>
+              </a:rPr>
+              <a:t>Malloc Hook </a:t>
+            </a:r>
+            <a:r>
+              <a:rPr lang="en-US" dirty="0" err="1"/>
+              <a:t>addr</a:t>
+            </a:r>
+            <a:r>
+              <a:rPr lang="en-US" dirty="0"/>
+              <a:t>) - (</a:t>
+            </a:r>
+            <a:r>
+              <a:rPr lang="en-US" dirty="0">
+                <a:solidFill>
                   <a:srgbClr val="00B050"/>
                 </a:solidFill>
               </a:rPr>
-              <a:t>Malloc Hook</a:t>
-            </a:r>
-            <a:r>
-              <a:rPr lang="en-US" dirty="0"/>
-              <a:t> </a:t>
-            </a:r>
-            <a:r>
-              <a:rPr lang="en-US" dirty="0" err="1"/>
-              <a:t>addr</a:t>
-            </a:r>
-            <a:r>
-              <a:rPr lang="en-US" dirty="0"/>
-              <a:t>) - (</a:t>
+              <a:t>Top Chunk</a:t>
             </a:r>
             <a:r>
               <a:rPr lang="en-US" dirty="0">
@@ -49307,7 +49394,7 @@
                   <a:srgbClr val="FF0000"/>
                 </a:solidFill>
               </a:rPr>
-              <a:t>Top Chunk </a:t>
+              <a:t> </a:t>
             </a:r>
             <a:r>
               <a:rPr lang="en-US" dirty="0" err="1"/>
@@ -53950,6 +54037,119 @@
           <p:cNvPr id="2" name="Title 1">
             <a:extLst>
               <a:ext uri="{FF2B5EF4-FFF2-40B4-BE49-F238E27FC236}">
+                <a16:creationId xmlns:a16="http://schemas.microsoft.com/office/drawing/2014/main" id="{4ECE968C-F447-1ED2-97A0-A15EF12B3B54}"/>
+              </a:ext>
+            </a:extLst>
+          </p:cNvPr>
+          <p:cNvSpPr>
+            <a:spLocks noGrp="1"/>
+          </p:cNvSpPr>
+          <p:nvPr>
+            <p:ph type="title"/>
+          </p:nvPr>
+        </p:nvSpPr>
+        <p:spPr>
+          <a:xfrm>
+            <a:off x="628650" y="273847"/>
+            <a:ext cx="7886700" cy="994172"/>
+          </a:xfrm>
+        </p:spPr>
+        <p:txBody>
+          <a:bodyPr anchor="ctr">
+            <a:normAutofit/>
+          </a:bodyPr>
+          <a:lstStyle/>
+          <a:p>
+            <a:r>
+              <a:rPr lang="en-US" dirty="0"/>
+              <a:t>House of Einherjar Demo</a:t>
+            </a:r>
+          </a:p>
+        </p:txBody>
+      </p:sp>
+      <p:pic>
+        <p:nvPicPr>
+          <p:cNvPr id="1026" name="Picture 2" descr="Image result for demo scene">
+            <a:extLst>
+              <a:ext uri="{FF2B5EF4-FFF2-40B4-BE49-F238E27FC236}">
+                <a16:creationId xmlns:a16="http://schemas.microsoft.com/office/drawing/2014/main" id="{4AD5474C-1945-E9A3-0264-A0FB4CE1BB91}"/>
+              </a:ext>
+            </a:extLst>
+          </p:cNvPr>
+          <p:cNvPicPr>
+            <a:picLocks noChangeAspect="1" noChangeArrowheads="1"/>
+          </p:cNvPicPr>
+          <p:nvPr/>
+        </p:nvPicPr>
+        <p:blipFill>
+          <a:blip r:embed="rId2">
+            <a:extLst>
+              <a:ext uri="{28A0092B-C50C-407E-A947-70E740481C1C}">
+                <a14:useLocalDpi xmlns:a14="http://schemas.microsoft.com/office/drawing/2010/main" val="0"/>
+              </a:ext>
+            </a:extLst>
+          </a:blip>
+          <a:stretch>
+            <a:fillRect/>
+          </a:stretch>
+        </p:blipFill>
+        <p:spPr bwMode="auto">
+          <a:xfrm>
+            <a:off x="1667481" y="1236541"/>
+            <a:ext cx="5809037" cy="3263504"/>
+          </a:xfrm>
+          <a:prstGeom prst="rect">
+            <a:avLst/>
+          </a:prstGeom>
+          <a:solidFill>
+            <a:srgbClr val="FFFFFF"/>
+          </a:solidFill>
+          <a:extLst>
+            <a:ext uri="{909E8E84-426E-40DD-AFC4-6F175D3DCCD1}">
+              <a14:hiddenFill xmlns:a14="http://schemas.microsoft.com/office/drawing/2010/main">
+                <a:solidFill>
+                  <a:srgbClr val="FFFFFF"/>
+                </a:solidFill>
+              </a14:hiddenFill>
+            </a:ext>
+          </a:extLst>
+        </p:spPr>
+      </p:pic>
+    </p:spTree>
+    <p:extLst>
+      <p:ext uri="{BB962C8B-B14F-4D97-AF65-F5344CB8AC3E}">
+        <p14:creationId xmlns:p14="http://schemas.microsoft.com/office/powerpoint/2010/main" val="2848765484"/>
+      </p:ext>
+    </p:extLst>
+  </p:cSld>
+  <p:clrMapOvr>
+    <a:masterClrMapping/>
+  </p:clrMapOvr>
+</p:sld>
+</file>
+
+<file path=ppt/slides/slide61.xml><?xml version="1.0" encoding="utf-8"?>
+<p:sld xmlns:a="http://schemas.openxmlformats.org/drawingml/2006/main" xmlns:r="http://schemas.openxmlformats.org/officeDocument/2006/relationships" xmlns:p="http://schemas.openxmlformats.org/presentationml/2006/main">
+  <p:cSld>
+    <p:spTree>
+      <p:nvGrpSpPr>
+        <p:cNvPr id="1" name=""/>
+        <p:cNvGrpSpPr/>
+        <p:nvPr/>
+      </p:nvGrpSpPr>
+      <p:grpSpPr>
+        <a:xfrm>
+          <a:off x="0" y="0"/>
+          <a:ext cx="0" cy="0"/>
+          <a:chOff x="0" y="0"/>
+          <a:chExt cx="0" cy="0"/>
+        </a:xfrm>
+      </p:grpSpPr>
+      <p:sp>
+        <p:nvSpPr>
+          <p:cNvPr id="2" name="Title 1">
+            <a:extLst>
+              <a:ext uri="{FF2B5EF4-FFF2-40B4-BE49-F238E27FC236}">
                 <a16:creationId xmlns:a16="http://schemas.microsoft.com/office/drawing/2014/main" id="{5A2C7F9C-1BBE-8A43-97B8-7835CCBDB8B9}"/>
               </a:ext>
             </a:extLst>
@@ -54064,7 +54264,7 @@
 </p:sld>
 </file>
 
-<file path=ppt/slides/slide61.xml><?xml version="1.0" encoding="utf-8"?>
+<file path=ppt/slides/slide62.xml><?xml version="1.0" encoding="utf-8"?>
 <p:sld xmlns:a="http://schemas.openxmlformats.org/drawingml/2006/main" xmlns:r="http://schemas.openxmlformats.org/officeDocument/2006/relationships" xmlns:p="http://schemas.openxmlformats.org/presentationml/2006/main">
   <p:cSld>
     <p:spTree>

</xml_diff>